<commit_message>
Actualizado pwp con sedes Alvaro
</commit_message>
<xml_diff>
--- a/P2/ppt.pptx
+++ b/P2/ppt.pptx
@@ -116,6 +116,11 @@
       </a:defRPr>
     </a:lvl9pPr>
   </p:defaultTextStyle>
+  <p:extLst>
+    <p:ext uri="{EFAFB233-063F-42B5-8137-9DF3F51BA10A}">
+      <p15:sldGuideLst xmlns:p15="http://schemas.microsoft.com/office/powerpoint/2012/main"/>
+    </p:ext>
+  </p:extLst>
 </p:presentation>
 </file>
 
@@ -268,7 +273,7 @@
           <a:p>
             <a:fld id="{85CE5CD3-CA6B-8A47-A3EF-5457F8D1AA2D}" type="datetimeFigureOut">
               <a:rPr lang="es-ES_tradnl" smtClean="0"/>
-              <a:t>2/5/19</a:t>
+              <a:t>05/05/2019</a:t>
             </a:fld>
             <a:endParaRPr lang="es-ES_tradnl"/>
           </a:p>
@@ -322,7 +327,7 @@
           <a:p>
             <a:fld id="{1F578D8B-37BB-2F4B-9D04-060C85A760FE}" type="slidenum">
               <a:rPr lang="es-ES_tradnl" smtClean="0"/>
-              <a:t>‹#›</a:t>
+              <a:t>‹Nº›</a:t>
             </a:fld>
             <a:endParaRPr lang="es-ES_tradnl"/>
           </a:p>
@@ -468,7 +473,7 @@
           <a:p>
             <a:fld id="{85CE5CD3-CA6B-8A47-A3EF-5457F8D1AA2D}" type="datetimeFigureOut">
               <a:rPr lang="es-ES_tradnl" smtClean="0"/>
-              <a:t>2/5/19</a:t>
+              <a:t>05/05/2019</a:t>
             </a:fld>
             <a:endParaRPr lang="es-ES_tradnl"/>
           </a:p>
@@ -522,7 +527,7 @@
           <a:p>
             <a:fld id="{1F578D8B-37BB-2F4B-9D04-060C85A760FE}" type="slidenum">
               <a:rPr lang="es-ES_tradnl" smtClean="0"/>
-              <a:t>‹#›</a:t>
+              <a:t>‹Nº›</a:t>
             </a:fld>
             <a:endParaRPr lang="es-ES_tradnl"/>
           </a:p>
@@ -678,7 +683,7 @@
           <a:p>
             <a:fld id="{85CE5CD3-CA6B-8A47-A3EF-5457F8D1AA2D}" type="datetimeFigureOut">
               <a:rPr lang="es-ES_tradnl" smtClean="0"/>
-              <a:t>2/5/19</a:t>
+              <a:t>05/05/2019</a:t>
             </a:fld>
             <a:endParaRPr lang="es-ES_tradnl"/>
           </a:p>
@@ -732,7 +737,7 @@
           <a:p>
             <a:fld id="{1F578D8B-37BB-2F4B-9D04-060C85A760FE}" type="slidenum">
               <a:rPr lang="es-ES_tradnl" smtClean="0"/>
-              <a:t>‹#›</a:t>
+              <a:t>‹Nº›</a:t>
             </a:fld>
             <a:endParaRPr lang="es-ES_tradnl"/>
           </a:p>
@@ -878,7 +883,7 @@
           <a:p>
             <a:fld id="{85CE5CD3-CA6B-8A47-A3EF-5457F8D1AA2D}" type="datetimeFigureOut">
               <a:rPr lang="es-ES_tradnl" smtClean="0"/>
-              <a:t>2/5/19</a:t>
+              <a:t>05/05/2019</a:t>
             </a:fld>
             <a:endParaRPr lang="es-ES_tradnl"/>
           </a:p>
@@ -932,7 +937,7 @@
           <a:p>
             <a:fld id="{1F578D8B-37BB-2F4B-9D04-060C85A760FE}" type="slidenum">
               <a:rPr lang="es-ES_tradnl" smtClean="0"/>
-              <a:t>‹#›</a:t>
+              <a:t>‹Nº›</a:t>
             </a:fld>
             <a:endParaRPr lang="es-ES_tradnl"/>
           </a:p>
@@ -1154,7 +1159,7 @@
           <a:p>
             <a:fld id="{85CE5CD3-CA6B-8A47-A3EF-5457F8D1AA2D}" type="datetimeFigureOut">
               <a:rPr lang="es-ES_tradnl" smtClean="0"/>
-              <a:t>2/5/19</a:t>
+              <a:t>05/05/2019</a:t>
             </a:fld>
             <a:endParaRPr lang="es-ES_tradnl"/>
           </a:p>
@@ -1208,7 +1213,7 @@
           <a:p>
             <a:fld id="{1F578D8B-37BB-2F4B-9D04-060C85A760FE}" type="slidenum">
               <a:rPr lang="es-ES_tradnl" smtClean="0"/>
-              <a:t>‹#›</a:t>
+              <a:t>‹Nº›</a:t>
             </a:fld>
             <a:endParaRPr lang="es-ES_tradnl"/>
           </a:p>
@@ -1422,7 +1427,7 @@
           <a:p>
             <a:fld id="{85CE5CD3-CA6B-8A47-A3EF-5457F8D1AA2D}" type="datetimeFigureOut">
               <a:rPr lang="es-ES_tradnl" smtClean="0"/>
-              <a:t>2/5/19</a:t>
+              <a:t>05/05/2019</a:t>
             </a:fld>
             <a:endParaRPr lang="es-ES_tradnl"/>
           </a:p>
@@ -1476,7 +1481,7 @@
           <a:p>
             <a:fld id="{1F578D8B-37BB-2F4B-9D04-060C85A760FE}" type="slidenum">
               <a:rPr lang="es-ES_tradnl" smtClean="0"/>
-              <a:t>‹#›</a:t>
+              <a:t>‹Nº›</a:t>
             </a:fld>
             <a:endParaRPr lang="es-ES_tradnl"/>
           </a:p>
@@ -1837,7 +1842,7 @@
           <a:p>
             <a:fld id="{85CE5CD3-CA6B-8A47-A3EF-5457F8D1AA2D}" type="datetimeFigureOut">
               <a:rPr lang="es-ES_tradnl" smtClean="0"/>
-              <a:t>2/5/19</a:t>
+              <a:t>05/05/2019</a:t>
             </a:fld>
             <a:endParaRPr lang="es-ES_tradnl"/>
           </a:p>
@@ -1891,7 +1896,7 @@
           <a:p>
             <a:fld id="{1F578D8B-37BB-2F4B-9D04-060C85A760FE}" type="slidenum">
               <a:rPr lang="es-ES_tradnl" smtClean="0"/>
-              <a:t>‹#›</a:t>
+              <a:t>‹Nº›</a:t>
             </a:fld>
             <a:endParaRPr lang="es-ES_tradnl"/>
           </a:p>
@@ -1979,7 +1984,7 @@
           <a:p>
             <a:fld id="{85CE5CD3-CA6B-8A47-A3EF-5457F8D1AA2D}" type="datetimeFigureOut">
               <a:rPr lang="es-ES_tradnl" smtClean="0"/>
-              <a:t>2/5/19</a:t>
+              <a:t>05/05/2019</a:t>
             </a:fld>
             <a:endParaRPr lang="es-ES_tradnl"/>
           </a:p>
@@ -2033,7 +2038,7 @@
           <a:p>
             <a:fld id="{1F578D8B-37BB-2F4B-9D04-060C85A760FE}" type="slidenum">
               <a:rPr lang="es-ES_tradnl" smtClean="0"/>
-              <a:t>‹#›</a:t>
+              <a:t>‹Nº›</a:t>
             </a:fld>
             <a:endParaRPr lang="es-ES_tradnl"/>
           </a:p>
@@ -2092,7 +2097,7 @@
           <a:p>
             <a:fld id="{85CE5CD3-CA6B-8A47-A3EF-5457F8D1AA2D}" type="datetimeFigureOut">
               <a:rPr lang="es-ES_tradnl" smtClean="0"/>
-              <a:t>2/5/19</a:t>
+              <a:t>05/05/2019</a:t>
             </a:fld>
             <a:endParaRPr lang="es-ES_tradnl"/>
           </a:p>
@@ -2146,7 +2151,7 @@
           <a:p>
             <a:fld id="{1F578D8B-37BB-2F4B-9D04-060C85A760FE}" type="slidenum">
               <a:rPr lang="es-ES_tradnl" smtClean="0"/>
-              <a:t>‹#›</a:t>
+              <a:t>‹Nº›</a:t>
             </a:fld>
             <a:endParaRPr lang="es-ES_tradnl"/>
           </a:p>
@@ -2405,7 +2410,7 @@
           <a:p>
             <a:fld id="{85CE5CD3-CA6B-8A47-A3EF-5457F8D1AA2D}" type="datetimeFigureOut">
               <a:rPr lang="es-ES_tradnl" smtClean="0"/>
-              <a:t>2/5/19</a:t>
+              <a:t>05/05/2019</a:t>
             </a:fld>
             <a:endParaRPr lang="es-ES_tradnl"/>
           </a:p>
@@ -2459,7 +2464,7 @@
           <a:p>
             <a:fld id="{1F578D8B-37BB-2F4B-9D04-060C85A760FE}" type="slidenum">
               <a:rPr lang="es-ES_tradnl" smtClean="0"/>
-              <a:t>‹#›</a:t>
+              <a:t>‹Nº›</a:t>
             </a:fld>
             <a:endParaRPr lang="es-ES_tradnl"/>
           </a:p>
@@ -2694,7 +2699,7 @@
           <a:p>
             <a:fld id="{85CE5CD3-CA6B-8A47-A3EF-5457F8D1AA2D}" type="datetimeFigureOut">
               <a:rPr lang="es-ES_tradnl" smtClean="0"/>
-              <a:t>2/5/19</a:t>
+              <a:t>05/05/2019</a:t>
             </a:fld>
             <a:endParaRPr lang="es-ES_tradnl"/>
           </a:p>
@@ -2748,7 +2753,7 @@
           <a:p>
             <a:fld id="{1F578D8B-37BB-2F4B-9D04-060C85A760FE}" type="slidenum">
               <a:rPr lang="es-ES_tradnl" smtClean="0"/>
-              <a:t>‹#›</a:t>
+              <a:t>‹Nº›</a:t>
             </a:fld>
             <a:endParaRPr lang="es-ES_tradnl"/>
           </a:p>
@@ -2937,7 +2942,7 @@
           <a:p>
             <a:fld id="{85CE5CD3-CA6B-8A47-A3EF-5457F8D1AA2D}" type="datetimeFigureOut">
               <a:rPr lang="es-ES_tradnl" smtClean="0"/>
-              <a:t>2/5/19</a:t>
+              <a:t>05/05/2019</a:t>
             </a:fld>
             <a:endParaRPr lang="es-ES_tradnl"/>
           </a:p>
@@ -3027,7 +3032,7 @@
           <a:p>
             <a:fld id="{1F578D8B-37BB-2F4B-9D04-060C85A760FE}" type="slidenum">
               <a:rPr lang="es-ES_tradnl" smtClean="0"/>
-              <a:t>‹#›</a:t>
+              <a:t>‹Nº›</a:t>
             </a:fld>
             <a:endParaRPr lang="es-ES_tradnl"/>
           </a:p>
@@ -6795,10 +6800,46 @@
       </p:pic>
       <p:pic>
         <p:nvPicPr>
-          <p:cNvPr id="16" name="Graphic 15" descr="Checkmark">
-            <a:extLst>
-              <a:ext uri="{FF2B5EF4-FFF2-40B4-BE49-F238E27FC236}">
-                <a16:creationId xmlns:a16="http://schemas.microsoft.com/office/drawing/2014/main" id="{9246CE06-CDB6-7A4F-8F7E-C4F3780C5D07}"/>
+          <p:cNvPr id="17" name="Graphic 16" descr="Close">
+            <a:extLst>
+              <a:ext uri="{FF2B5EF4-FFF2-40B4-BE49-F238E27FC236}">
+                <a16:creationId xmlns:a16="http://schemas.microsoft.com/office/drawing/2014/main" id="{77599698-FFB1-B64D-BD64-313D516852EB}"/>
+              </a:ext>
+            </a:extLst>
+          </p:cNvPr>
+          <p:cNvPicPr>
+            <a:picLocks noChangeAspect="1"/>
+          </p:cNvPicPr>
+          <p:nvPr/>
+        </p:nvPicPr>
+        <p:blipFill>
+          <a:blip r:embed="rId5">
+            <a:extLst>
+              <a:ext uri="{96DAC541-7B7A-43D3-8B79-37D633B846F1}">
+                <asvg:svgBlip xmlns:asvg="http://schemas.microsoft.com/office/drawing/2016/SVG/main" r:embed="rId6"/>
+              </a:ext>
+            </a:extLst>
+          </a:blip>
+          <a:stretch>
+            <a:fillRect/>
+          </a:stretch>
+        </p:blipFill>
+        <p:spPr>
+          <a:xfrm>
+            <a:off x="664352" y="3220754"/>
+            <a:ext cx="174433" cy="174433"/>
+          </a:xfrm>
+          <a:prstGeom prst="rect">
+            <a:avLst/>
+          </a:prstGeom>
+        </p:spPr>
+      </p:pic>
+      <p:pic>
+        <p:nvPicPr>
+          <p:cNvPr id="18" name="Graphic 17" descr="Checkmark">
+            <a:extLst>
+              <a:ext uri="{FF2B5EF4-FFF2-40B4-BE49-F238E27FC236}">
+                <a16:creationId xmlns:a16="http://schemas.microsoft.com/office/drawing/2014/main" id="{E550C4EC-CD3B-324D-9CC2-862A65B8A434}"/>
               </a:ext>
             </a:extLst>
           </p:cNvPr>
@@ -6821,20 +6862,164 @@
         </p:blipFill>
         <p:spPr>
           <a:xfrm>
-            <a:off x="663760" y="2979284"/>
-            <a:ext cx="174433" cy="174433"/>
-          </a:xfrm>
-          <a:prstGeom prst="rect">
-            <a:avLst/>
-          </a:prstGeom>
-        </p:spPr>
-      </p:pic>
-      <p:pic>
-        <p:nvPicPr>
-          <p:cNvPr id="17" name="Graphic 16" descr="Close">
-            <a:extLst>
-              <a:ext uri="{FF2B5EF4-FFF2-40B4-BE49-F238E27FC236}">
-                <a16:creationId xmlns:a16="http://schemas.microsoft.com/office/drawing/2014/main" id="{77599698-FFB1-B64D-BD64-313D516852EB}"/>
+            <a:off x="663759" y="3462799"/>
+            <a:ext cx="174433" cy="174433"/>
+          </a:xfrm>
+          <a:prstGeom prst="rect">
+            <a:avLst/>
+          </a:prstGeom>
+        </p:spPr>
+      </p:pic>
+      <p:pic>
+        <p:nvPicPr>
+          <p:cNvPr id="21" name="Graphic 20" descr="Checkmark">
+            <a:extLst>
+              <a:ext uri="{FF2B5EF4-FFF2-40B4-BE49-F238E27FC236}">
+                <a16:creationId xmlns:a16="http://schemas.microsoft.com/office/drawing/2014/main" id="{D51D8159-520E-7E4D-ADC7-31943F87A4DD}"/>
+              </a:ext>
+            </a:extLst>
+          </p:cNvPr>
+          <p:cNvPicPr>
+            <a:picLocks noChangeAspect="1"/>
+          </p:cNvPicPr>
+          <p:nvPr/>
+        </p:nvPicPr>
+        <p:blipFill>
+          <a:blip r:embed="rId3">
+            <a:extLst>
+              <a:ext uri="{96DAC541-7B7A-43D3-8B79-37D633B846F1}">
+                <asvg:svgBlip xmlns:asvg="http://schemas.microsoft.com/office/drawing/2016/SVG/main" r:embed="rId4"/>
+              </a:ext>
+            </a:extLst>
+          </a:blip>
+          <a:stretch>
+            <a:fillRect/>
+          </a:stretch>
+        </p:blipFill>
+        <p:spPr>
+          <a:xfrm>
+            <a:off x="663758" y="4215241"/>
+            <a:ext cx="174433" cy="174433"/>
+          </a:xfrm>
+          <a:prstGeom prst="rect">
+            <a:avLst/>
+          </a:prstGeom>
+        </p:spPr>
+      </p:pic>
+      <p:pic>
+        <p:nvPicPr>
+          <p:cNvPr id="22" name="Graphic 21" descr="Checkmark">
+            <a:extLst>
+              <a:ext uri="{FF2B5EF4-FFF2-40B4-BE49-F238E27FC236}">
+                <a16:creationId xmlns:a16="http://schemas.microsoft.com/office/drawing/2014/main" id="{08AF0FD4-4145-A74B-A86E-BC9C4AE3F827}"/>
+              </a:ext>
+            </a:extLst>
+          </p:cNvPr>
+          <p:cNvPicPr>
+            <a:picLocks noChangeAspect="1"/>
+          </p:cNvPicPr>
+          <p:nvPr/>
+        </p:nvPicPr>
+        <p:blipFill>
+          <a:blip r:embed="rId3">
+            <a:extLst>
+              <a:ext uri="{96DAC541-7B7A-43D3-8B79-37D633B846F1}">
+                <asvg:svgBlip xmlns:asvg="http://schemas.microsoft.com/office/drawing/2016/SVG/main" r:embed="rId4"/>
+              </a:ext>
+            </a:extLst>
+          </a:blip>
+          <a:stretch>
+            <a:fillRect/>
+          </a:stretch>
+        </p:blipFill>
+        <p:spPr>
+          <a:xfrm>
+            <a:off x="663758" y="4463109"/>
+            <a:ext cx="174433" cy="174433"/>
+          </a:xfrm>
+          <a:prstGeom prst="rect">
+            <a:avLst/>
+          </a:prstGeom>
+        </p:spPr>
+      </p:pic>
+      <p:pic>
+        <p:nvPicPr>
+          <p:cNvPr id="23" name="Graphic 22" descr="Checkmark">
+            <a:extLst>
+              <a:ext uri="{FF2B5EF4-FFF2-40B4-BE49-F238E27FC236}">
+                <a16:creationId xmlns:a16="http://schemas.microsoft.com/office/drawing/2014/main" id="{914F5CA6-0646-9C40-A2C7-0C29718E837D}"/>
+              </a:ext>
+            </a:extLst>
+          </p:cNvPr>
+          <p:cNvPicPr>
+            <a:picLocks noChangeAspect="1"/>
+          </p:cNvPicPr>
+          <p:nvPr/>
+        </p:nvPicPr>
+        <p:blipFill>
+          <a:blip r:embed="rId3">
+            <a:extLst>
+              <a:ext uri="{96DAC541-7B7A-43D3-8B79-37D633B846F1}">
+                <asvg:svgBlip xmlns:asvg="http://schemas.microsoft.com/office/drawing/2016/SVG/main" r:embed="rId4"/>
+              </a:ext>
+            </a:extLst>
+          </a:blip>
+          <a:stretch>
+            <a:fillRect/>
+          </a:stretch>
+        </p:blipFill>
+        <p:spPr>
+          <a:xfrm>
+            <a:off x="663758" y="4718942"/>
+            <a:ext cx="174433" cy="174433"/>
+          </a:xfrm>
+          <a:prstGeom prst="rect">
+            <a:avLst/>
+          </a:prstGeom>
+        </p:spPr>
+      </p:pic>
+      <p:pic>
+        <p:nvPicPr>
+          <p:cNvPr id="24" name="Graphic 23" descr="Checkmark">
+            <a:extLst>
+              <a:ext uri="{FF2B5EF4-FFF2-40B4-BE49-F238E27FC236}">
+                <a16:creationId xmlns:a16="http://schemas.microsoft.com/office/drawing/2014/main" id="{63E5E062-A939-554A-AC12-5BD9D2A1ED0E}"/>
+              </a:ext>
+            </a:extLst>
+          </p:cNvPr>
+          <p:cNvPicPr>
+            <a:picLocks noChangeAspect="1"/>
+          </p:cNvPicPr>
+          <p:nvPr/>
+        </p:nvPicPr>
+        <p:blipFill>
+          <a:blip r:embed="rId3">
+            <a:extLst>
+              <a:ext uri="{96DAC541-7B7A-43D3-8B79-37D633B846F1}">
+                <asvg:svgBlip xmlns:asvg="http://schemas.microsoft.com/office/drawing/2016/SVG/main" r:embed="rId4"/>
+              </a:ext>
+            </a:extLst>
+          </a:blip>
+          <a:stretch>
+            <a:fillRect/>
+          </a:stretch>
+        </p:blipFill>
+        <p:spPr>
+          <a:xfrm>
+            <a:off x="663757" y="4962349"/>
+            <a:ext cx="174433" cy="174433"/>
+          </a:xfrm>
+          <a:prstGeom prst="rect">
+            <a:avLst/>
+          </a:prstGeom>
+        </p:spPr>
+      </p:pic>
+      <p:pic>
+        <p:nvPicPr>
+          <p:cNvPr id="25" name="Graphic 24" descr="Close">
+            <a:extLst>
+              <a:ext uri="{FF2B5EF4-FFF2-40B4-BE49-F238E27FC236}">
+                <a16:creationId xmlns:a16="http://schemas.microsoft.com/office/drawing/2014/main" id="{C6EF654E-274F-5146-ADD3-06684E26CEF4}"/>
               </a:ext>
             </a:extLst>
           </p:cNvPr>
@@ -6857,20 +7042,56 @@
         </p:blipFill>
         <p:spPr>
           <a:xfrm>
-            <a:off x="664352" y="3220754"/>
-            <a:ext cx="174433" cy="174433"/>
-          </a:xfrm>
-          <a:prstGeom prst="rect">
-            <a:avLst/>
-          </a:prstGeom>
-        </p:spPr>
-      </p:pic>
-      <p:pic>
-        <p:nvPicPr>
-          <p:cNvPr id="18" name="Graphic 17" descr="Checkmark">
-            <a:extLst>
-              <a:ext uri="{FF2B5EF4-FFF2-40B4-BE49-F238E27FC236}">
-                <a16:creationId xmlns:a16="http://schemas.microsoft.com/office/drawing/2014/main" id="{E550C4EC-CD3B-324D-9CC2-862A65B8A434}"/>
+            <a:off x="5623909" y="2746456"/>
+            <a:ext cx="174433" cy="174433"/>
+          </a:xfrm>
+          <a:prstGeom prst="rect">
+            <a:avLst/>
+          </a:prstGeom>
+        </p:spPr>
+      </p:pic>
+      <p:pic>
+        <p:nvPicPr>
+          <p:cNvPr id="26" name="Graphic 25" descr="Close">
+            <a:extLst>
+              <a:ext uri="{FF2B5EF4-FFF2-40B4-BE49-F238E27FC236}">
+                <a16:creationId xmlns:a16="http://schemas.microsoft.com/office/drawing/2014/main" id="{83E5B95B-4390-FC4E-94A2-D1EE29BD0111}"/>
+              </a:ext>
+            </a:extLst>
+          </p:cNvPr>
+          <p:cNvPicPr>
+            <a:picLocks noChangeAspect="1"/>
+          </p:cNvPicPr>
+          <p:nvPr/>
+        </p:nvPicPr>
+        <p:blipFill>
+          <a:blip r:embed="rId5">
+            <a:extLst>
+              <a:ext uri="{96DAC541-7B7A-43D3-8B79-37D633B846F1}">
+                <asvg:svgBlip xmlns:asvg="http://schemas.microsoft.com/office/drawing/2016/SVG/main" r:embed="rId6"/>
+              </a:ext>
+            </a:extLst>
+          </a:blip>
+          <a:stretch>
+            <a:fillRect/>
+          </a:stretch>
+        </p:blipFill>
+        <p:spPr>
+          <a:xfrm>
+            <a:off x="5623910" y="2250403"/>
+            <a:ext cx="174433" cy="174433"/>
+          </a:xfrm>
+          <a:prstGeom prst="rect">
+            <a:avLst/>
+          </a:prstGeom>
+        </p:spPr>
+      </p:pic>
+      <p:pic>
+        <p:nvPicPr>
+          <p:cNvPr id="27" name="Graphic 26" descr="Checkmark">
+            <a:extLst>
+              <a:ext uri="{FF2B5EF4-FFF2-40B4-BE49-F238E27FC236}">
+                <a16:creationId xmlns:a16="http://schemas.microsoft.com/office/drawing/2014/main" id="{B447E4D7-F128-894C-943D-D24B31C75749}"/>
               </a:ext>
             </a:extLst>
           </p:cNvPr>
@@ -6893,20 +7114,20 @@
         </p:blipFill>
         <p:spPr>
           <a:xfrm>
-            <a:off x="663759" y="3462799"/>
-            <a:ext cx="174433" cy="174433"/>
-          </a:xfrm>
-          <a:prstGeom prst="rect">
-            <a:avLst/>
-          </a:prstGeom>
-        </p:spPr>
-      </p:pic>
-      <p:pic>
-        <p:nvPicPr>
-          <p:cNvPr id="21" name="Graphic 20" descr="Checkmark">
-            <a:extLst>
-              <a:ext uri="{FF2B5EF4-FFF2-40B4-BE49-F238E27FC236}">
-                <a16:creationId xmlns:a16="http://schemas.microsoft.com/office/drawing/2014/main" id="{D51D8159-520E-7E4D-ADC7-31943F87A4DD}"/>
+            <a:off x="665154" y="5458958"/>
+            <a:ext cx="174433" cy="174433"/>
+          </a:xfrm>
+          <a:prstGeom prst="rect">
+            <a:avLst/>
+          </a:prstGeom>
+        </p:spPr>
+      </p:pic>
+      <p:pic>
+        <p:nvPicPr>
+          <p:cNvPr id="28" name="Graphic 27" descr="Checkmark">
+            <a:extLst>
+              <a:ext uri="{FF2B5EF4-FFF2-40B4-BE49-F238E27FC236}">
+                <a16:creationId xmlns:a16="http://schemas.microsoft.com/office/drawing/2014/main" id="{E7F7FA20-7AAC-D744-A376-284B0D3C2A00}"/>
               </a:ext>
             </a:extLst>
           </p:cNvPr>
@@ -6929,20 +7150,20 @@
         </p:blipFill>
         <p:spPr>
           <a:xfrm>
-            <a:off x="663758" y="4215241"/>
-            <a:ext cx="174433" cy="174433"/>
-          </a:xfrm>
-          <a:prstGeom prst="rect">
-            <a:avLst/>
-          </a:prstGeom>
-        </p:spPr>
-      </p:pic>
-      <p:pic>
-        <p:nvPicPr>
-          <p:cNvPr id="22" name="Graphic 21" descr="Checkmark">
-            <a:extLst>
-              <a:ext uri="{FF2B5EF4-FFF2-40B4-BE49-F238E27FC236}">
-                <a16:creationId xmlns:a16="http://schemas.microsoft.com/office/drawing/2014/main" id="{08AF0FD4-4145-A74B-A86E-BC9C4AE3F827}"/>
+            <a:off x="667980" y="5677395"/>
+            <a:ext cx="174433" cy="174433"/>
+          </a:xfrm>
+          <a:prstGeom prst="rect">
+            <a:avLst/>
+          </a:prstGeom>
+        </p:spPr>
+      </p:pic>
+      <p:pic>
+        <p:nvPicPr>
+          <p:cNvPr id="29" name="Graphic 28" descr="Checkmark">
+            <a:extLst>
+              <a:ext uri="{FF2B5EF4-FFF2-40B4-BE49-F238E27FC236}">
+                <a16:creationId xmlns:a16="http://schemas.microsoft.com/office/drawing/2014/main" id="{B127B14B-2863-C74A-9FD8-E2C76B436BE5}"/>
               </a:ext>
             </a:extLst>
           </p:cNvPr>
@@ -6965,20 +7186,20 @@
         </p:blipFill>
         <p:spPr>
           <a:xfrm>
-            <a:off x="663758" y="4463109"/>
-            <a:ext cx="174433" cy="174433"/>
-          </a:xfrm>
-          <a:prstGeom prst="rect">
-            <a:avLst/>
-          </a:prstGeom>
-        </p:spPr>
-      </p:pic>
-      <p:pic>
-        <p:nvPicPr>
-          <p:cNvPr id="23" name="Graphic 22" descr="Checkmark">
-            <a:extLst>
-              <a:ext uri="{FF2B5EF4-FFF2-40B4-BE49-F238E27FC236}">
-                <a16:creationId xmlns:a16="http://schemas.microsoft.com/office/drawing/2014/main" id="{914F5CA6-0646-9C40-A2C7-0C29718E837D}"/>
+            <a:off x="658836" y="5925263"/>
+            <a:ext cx="174433" cy="174433"/>
+          </a:xfrm>
+          <a:prstGeom prst="rect">
+            <a:avLst/>
+          </a:prstGeom>
+        </p:spPr>
+      </p:pic>
+      <p:pic>
+        <p:nvPicPr>
+          <p:cNvPr id="30" name="Graphic 29" descr="Checkmark">
+            <a:extLst>
+              <a:ext uri="{FF2B5EF4-FFF2-40B4-BE49-F238E27FC236}">
+                <a16:creationId xmlns:a16="http://schemas.microsoft.com/office/drawing/2014/main" id="{A6F1EF41-4973-8944-8A94-3BD92992CF6B}"/>
               </a:ext>
             </a:extLst>
           </p:cNvPr>
@@ -7001,20 +7222,20 @@
         </p:blipFill>
         <p:spPr>
           <a:xfrm>
-            <a:off x="663758" y="4718942"/>
-            <a:ext cx="174433" cy="174433"/>
-          </a:xfrm>
-          <a:prstGeom prst="rect">
-            <a:avLst/>
-          </a:prstGeom>
-        </p:spPr>
-      </p:pic>
-      <p:pic>
-        <p:nvPicPr>
-          <p:cNvPr id="24" name="Graphic 23" descr="Checkmark">
-            <a:extLst>
-              <a:ext uri="{FF2B5EF4-FFF2-40B4-BE49-F238E27FC236}">
-                <a16:creationId xmlns:a16="http://schemas.microsoft.com/office/drawing/2014/main" id="{63E5E062-A939-554A-AC12-5BD9D2A1ED0E}"/>
+            <a:off x="667980" y="6173131"/>
+            <a:ext cx="174433" cy="174433"/>
+          </a:xfrm>
+          <a:prstGeom prst="rect">
+            <a:avLst/>
+          </a:prstGeom>
+        </p:spPr>
+      </p:pic>
+      <p:pic>
+        <p:nvPicPr>
+          <p:cNvPr id="31" name="Graphic 30" descr="Checkmark">
+            <a:extLst>
+              <a:ext uri="{FF2B5EF4-FFF2-40B4-BE49-F238E27FC236}">
+                <a16:creationId xmlns:a16="http://schemas.microsoft.com/office/drawing/2014/main" id="{B3E8B9B2-499F-524B-B8AA-D57CFCEB2FA0}"/>
               </a:ext>
             </a:extLst>
           </p:cNvPr>
@@ -7037,20 +7258,524 @@
         </p:blipFill>
         <p:spPr>
           <a:xfrm>
-            <a:off x="663757" y="4962349"/>
-            <a:ext cx="174433" cy="174433"/>
-          </a:xfrm>
-          <a:prstGeom prst="rect">
-            <a:avLst/>
-          </a:prstGeom>
-        </p:spPr>
-      </p:pic>
-      <p:pic>
-        <p:nvPicPr>
-          <p:cNvPr id="25" name="Graphic 24" descr="Close">
-            <a:extLst>
-              <a:ext uri="{FF2B5EF4-FFF2-40B4-BE49-F238E27FC236}">
-                <a16:creationId xmlns:a16="http://schemas.microsoft.com/office/drawing/2014/main" id="{C6EF654E-274F-5146-ADD3-06684E26CEF4}"/>
+            <a:off x="5624260" y="1773522"/>
+            <a:ext cx="174433" cy="174433"/>
+          </a:xfrm>
+          <a:prstGeom prst="rect">
+            <a:avLst/>
+          </a:prstGeom>
+        </p:spPr>
+      </p:pic>
+      <p:pic>
+        <p:nvPicPr>
+          <p:cNvPr id="32" name="Graphic 31" descr="Checkmark">
+            <a:extLst>
+              <a:ext uri="{FF2B5EF4-FFF2-40B4-BE49-F238E27FC236}">
+                <a16:creationId xmlns:a16="http://schemas.microsoft.com/office/drawing/2014/main" id="{C88D5AEE-3669-8B49-B0F8-CC80B52BAAA2}"/>
+              </a:ext>
+            </a:extLst>
+          </p:cNvPr>
+          <p:cNvPicPr>
+            <a:picLocks noChangeAspect="1"/>
+          </p:cNvPicPr>
+          <p:nvPr/>
+        </p:nvPicPr>
+        <p:blipFill>
+          <a:blip r:embed="rId3">
+            <a:extLst>
+              <a:ext uri="{96DAC541-7B7A-43D3-8B79-37D633B846F1}">
+                <asvg:svgBlip xmlns:asvg="http://schemas.microsoft.com/office/drawing/2016/SVG/main" r:embed="rId4"/>
+              </a:ext>
+            </a:extLst>
+          </a:blip>
+          <a:stretch>
+            <a:fillRect/>
+          </a:stretch>
+        </p:blipFill>
+        <p:spPr>
+          <a:xfrm>
+            <a:off x="5624260" y="2030788"/>
+            <a:ext cx="174433" cy="174433"/>
+          </a:xfrm>
+          <a:prstGeom prst="rect">
+            <a:avLst/>
+          </a:prstGeom>
+        </p:spPr>
+      </p:pic>
+      <p:pic>
+        <p:nvPicPr>
+          <p:cNvPr id="33" name="Graphic 32" descr="Checkmark">
+            <a:extLst>
+              <a:ext uri="{FF2B5EF4-FFF2-40B4-BE49-F238E27FC236}">
+                <a16:creationId xmlns:a16="http://schemas.microsoft.com/office/drawing/2014/main" id="{7D5FE5DA-19EE-FA43-AB97-231CEC955CE3}"/>
+              </a:ext>
+            </a:extLst>
+          </p:cNvPr>
+          <p:cNvPicPr>
+            <a:picLocks noChangeAspect="1"/>
+          </p:cNvPicPr>
+          <p:nvPr/>
+        </p:nvPicPr>
+        <p:blipFill>
+          <a:blip r:embed="rId3">
+            <a:extLst>
+              <a:ext uri="{96DAC541-7B7A-43D3-8B79-37D633B846F1}">
+                <asvg:svgBlip xmlns:asvg="http://schemas.microsoft.com/office/drawing/2016/SVG/main" r:embed="rId4"/>
+              </a:ext>
+            </a:extLst>
+          </a:blip>
+          <a:stretch>
+            <a:fillRect/>
+          </a:stretch>
+        </p:blipFill>
+        <p:spPr>
+          <a:xfrm>
+            <a:off x="5623909" y="2507669"/>
+            <a:ext cx="174433" cy="174433"/>
+          </a:xfrm>
+          <a:prstGeom prst="rect">
+            <a:avLst/>
+          </a:prstGeom>
+        </p:spPr>
+      </p:pic>
+      <p:pic>
+        <p:nvPicPr>
+          <p:cNvPr id="34" name="Graphic 33" descr="Checkmark">
+            <a:extLst>
+              <a:ext uri="{FF2B5EF4-FFF2-40B4-BE49-F238E27FC236}">
+                <a16:creationId xmlns:a16="http://schemas.microsoft.com/office/drawing/2014/main" id="{C077F771-C623-1D40-A748-019A7F78F96F}"/>
+              </a:ext>
+            </a:extLst>
+          </p:cNvPr>
+          <p:cNvPicPr>
+            <a:picLocks noChangeAspect="1"/>
+          </p:cNvPicPr>
+          <p:nvPr/>
+        </p:nvPicPr>
+        <p:blipFill>
+          <a:blip r:embed="rId3">
+            <a:extLst>
+              <a:ext uri="{96DAC541-7B7A-43D3-8B79-37D633B846F1}">
+                <asvg:svgBlip xmlns:asvg="http://schemas.microsoft.com/office/drawing/2016/SVG/main" r:embed="rId4"/>
+              </a:ext>
+            </a:extLst>
+          </a:blip>
+          <a:stretch>
+            <a:fillRect/>
+          </a:stretch>
+        </p:blipFill>
+        <p:spPr>
+          <a:xfrm>
+            <a:off x="5623908" y="2989682"/>
+            <a:ext cx="174433" cy="174433"/>
+          </a:xfrm>
+          <a:prstGeom prst="rect">
+            <a:avLst/>
+          </a:prstGeom>
+        </p:spPr>
+      </p:pic>
+      <p:pic>
+        <p:nvPicPr>
+          <p:cNvPr id="35" name="Graphic 34" descr="Checkmark">
+            <a:extLst>
+              <a:ext uri="{FF2B5EF4-FFF2-40B4-BE49-F238E27FC236}">
+                <a16:creationId xmlns:a16="http://schemas.microsoft.com/office/drawing/2014/main" id="{F60A61C5-401F-B440-BBA0-43DBB25904E7}"/>
+              </a:ext>
+            </a:extLst>
+          </p:cNvPr>
+          <p:cNvPicPr>
+            <a:picLocks noChangeAspect="1"/>
+          </p:cNvPicPr>
+          <p:nvPr/>
+        </p:nvPicPr>
+        <p:blipFill>
+          <a:blip r:embed="rId3">
+            <a:extLst>
+              <a:ext uri="{96DAC541-7B7A-43D3-8B79-37D633B846F1}">
+                <asvg:svgBlip xmlns:asvg="http://schemas.microsoft.com/office/drawing/2016/SVG/main" r:embed="rId4"/>
+              </a:ext>
+            </a:extLst>
+          </a:blip>
+          <a:stretch>
+            <a:fillRect/>
+          </a:stretch>
+        </p:blipFill>
+        <p:spPr>
+          <a:xfrm>
+            <a:off x="5636230" y="3241944"/>
+            <a:ext cx="174433" cy="174433"/>
+          </a:xfrm>
+          <a:prstGeom prst="rect">
+            <a:avLst/>
+          </a:prstGeom>
+        </p:spPr>
+      </p:pic>
+      <p:pic>
+        <p:nvPicPr>
+          <p:cNvPr id="36" name="Graphic 35" descr="Checkmark">
+            <a:extLst>
+              <a:ext uri="{FF2B5EF4-FFF2-40B4-BE49-F238E27FC236}">
+                <a16:creationId xmlns:a16="http://schemas.microsoft.com/office/drawing/2014/main" id="{C51CA552-B401-1849-A32B-24550D648C8C}"/>
+              </a:ext>
+            </a:extLst>
+          </p:cNvPr>
+          <p:cNvPicPr>
+            <a:picLocks noChangeAspect="1"/>
+          </p:cNvPicPr>
+          <p:nvPr/>
+        </p:nvPicPr>
+        <p:blipFill>
+          <a:blip r:embed="rId3">
+            <a:extLst>
+              <a:ext uri="{96DAC541-7B7A-43D3-8B79-37D633B846F1}">
+                <asvg:svgBlip xmlns:asvg="http://schemas.microsoft.com/office/drawing/2016/SVG/main" r:embed="rId4"/>
+              </a:ext>
+            </a:extLst>
+          </a:blip>
+          <a:stretch>
+            <a:fillRect/>
+          </a:stretch>
+        </p:blipFill>
+        <p:spPr>
+          <a:xfrm>
+            <a:off x="5636230" y="3501890"/>
+            <a:ext cx="174433" cy="174433"/>
+          </a:xfrm>
+          <a:prstGeom prst="rect">
+            <a:avLst/>
+          </a:prstGeom>
+        </p:spPr>
+      </p:pic>
+      <p:pic>
+        <p:nvPicPr>
+          <p:cNvPr id="37" name="Graphic 36" descr="Checkmark">
+            <a:extLst>
+              <a:ext uri="{FF2B5EF4-FFF2-40B4-BE49-F238E27FC236}">
+                <a16:creationId xmlns:a16="http://schemas.microsoft.com/office/drawing/2014/main" id="{2553AAF1-C293-FA40-AAE2-9925B7F7FAEC}"/>
+              </a:ext>
+            </a:extLst>
+          </p:cNvPr>
+          <p:cNvPicPr>
+            <a:picLocks noChangeAspect="1"/>
+          </p:cNvPicPr>
+          <p:nvPr/>
+        </p:nvPicPr>
+        <p:blipFill>
+          <a:blip r:embed="rId3">
+            <a:extLst>
+              <a:ext uri="{96DAC541-7B7A-43D3-8B79-37D633B846F1}">
+                <asvg:svgBlip xmlns:asvg="http://schemas.microsoft.com/office/drawing/2016/SVG/main" r:embed="rId4"/>
+              </a:ext>
+            </a:extLst>
+          </a:blip>
+          <a:stretch>
+            <a:fillRect/>
+          </a:stretch>
+        </p:blipFill>
+        <p:spPr>
+          <a:xfrm>
+            <a:off x="5636229" y="3739683"/>
+            <a:ext cx="174433" cy="174433"/>
+          </a:xfrm>
+          <a:prstGeom prst="rect">
+            <a:avLst/>
+          </a:prstGeom>
+        </p:spPr>
+      </p:pic>
+      <p:pic>
+        <p:nvPicPr>
+          <p:cNvPr id="38" name="Graphic 37" descr="Checkmark">
+            <a:extLst>
+              <a:ext uri="{FF2B5EF4-FFF2-40B4-BE49-F238E27FC236}">
+                <a16:creationId xmlns:a16="http://schemas.microsoft.com/office/drawing/2014/main" id="{DD9F0E75-D40A-9B4D-B4A1-3008361F86D6}"/>
+              </a:ext>
+            </a:extLst>
+          </p:cNvPr>
+          <p:cNvPicPr>
+            <a:picLocks noChangeAspect="1"/>
+          </p:cNvPicPr>
+          <p:nvPr/>
+        </p:nvPicPr>
+        <p:blipFill>
+          <a:blip r:embed="rId3">
+            <a:extLst>
+              <a:ext uri="{96DAC541-7B7A-43D3-8B79-37D633B846F1}">
+                <asvg:svgBlip xmlns:asvg="http://schemas.microsoft.com/office/drawing/2016/SVG/main" r:embed="rId4"/>
+              </a:ext>
+            </a:extLst>
+          </a:blip>
+          <a:stretch>
+            <a:fillRect/>
+          </a:stretch>
+        </p:blipFill>
+        <p:spPr>
+          <a:xfrm>
+            <a:off x="5623907" y="3987807"/>
+            <a:ext cx="174433" cy="174433"/>
+          </a:xfrm>
+          <a:prstGeom prst="rect">
+            <a:avLst/>
+          </a:prstGeom>
+        </p:spPr>
+      </p:pic>
+      <p:pic>
+        <p:nvPicPr>
+          <p:cNvPr id="39" name="Graphic 38" descr="Checkmark">
+            <a:extLst>
+              <a:ext uri="{FF2B5EF4-FFF2-40B4-BE49-F238E27FC236}">
+                <a16:creationId xmlns:a16="http://schemas.microsoft.com/office/drawing/2014/main" id="{394D0787-E6A3-EC4F-A215-F35CEC6B6AF9}"/>
+              </a:ext>
+            </a:extLst>
+          </p:cNvPr>
+          <p:cNvPicPr>
+            <a:picLocks noChangeAspect="1"/>
+          </p:cNvPicPr>
+          <p:nvPr/>
+        </p:nvPicPr>
+        <p:blipFill>
+          <a:blip r:embed="rId3">
+            <a:extLst>
+              <a:ext uri="{96DAC541-7B7A-43D3-8B79-37D633B846F1}">
+                <asvg:svgBlip xmlns:asvg="http://schemas.microsoft.com/office/drawing/2016/SVG/main" r:embed="rId4"/>
+              </a:ext>
+            </a:extLst>
+          </a:blip>
+          <a:stretch>
+            <a:fillRect/>
+          </a:stretch>
+        </p:blipFill>
+        <p:spPr>
+          <a:xfrm>
+            <a:off x="5636229" y="4233358"/>
+            <a:ext cx="174433" cy="174433"/>
+          </a:xfrm>
+          <a:prstGeom prst="rect">
+            <a:avLst/>
+          </a:prstGeom>
+        </p:spPr>
+      </p:pic>
+      <p:pic>
+        <p:nvPicPr>
+          <p:cNvPr id="40" name="Graphic 39" descr="Checkmark">
+            <a:extLst>
+              <a:ext uri="{FF2B5EF4-FFF2-40B4-BE49-F238E27FC236}">
+                <a16:creationId xmlns:a16="http://schemas.microsoft.com/office/drawing/2014/main" id="{C2A5A715-3E1F-1841-B4E7-4A4DB1203D7C}"/>
+              </a:ext>
+            </a:extLst>
+          </p:cNvPr>
+          <p:cNvPicPr>
+            <a:picLocks noChangeAspect="1"/>
+          </p:cNvPicPr>
+          <p:nvPr/>
+        </p:nvPicPr>
+        <p:blipFill>
+          <a:blip r:embed="rId3">
+            <a:extLst>
+              <a:ext uri="{96DAC541-7B7A-43D3-8B79-37D633B846F1}">
+                <asvg:svgBlip xmlns:asvg="http://schemas.microsoft.com/office/drawing/2016/SVG/main" r:embed="rId4"/>
+              </a:ext>
+            </a:extLst>
+          </a:blip>
+          <a:stretch>
+            <a:fillRect/>
+          </a:stretch>
+        </p:blipFill>
+        <p:spPr>
+          <a:xfrm>
+            <a:off x="5636228" y="4453100"/>
+            <a:ext cx="174433" cy="174433"/>
+          </a:xfrm>
+          <a:prstGeom prst="rect">
+            <a:avLst/>
+          </a:prstGeom>
+        </p:spPr>
+      </p:pic>
+      <p:pic>
+        <p:nvPicPr>
+          <p:cNvPr id="41" name="Graphic 40" descr="Checkmark">
+            <a:extLst>
+              <a:ext uri="{FF2B5EF4-FFF2-40B4-BE49-F238E27FC236}">
+                <a16:creationId xmlns:a16="http://schemas.microsoft.com/office/drawing/2014/main" id="{0282D90A-763F-784A-BB32-CEB0E58DA5C1}"/>
+              </a:ext>
+            </a:extLst>
+          </p:cNvPr>
+          <p:cNvPicPr>
+            <a:picLocks noChangeAspect="1"/>
+          </p:cNvPicPr>
+          <p:nvPr/>
+        </p:nvPicPr>
+        <p:blipFill>
+          <a:blip r:embed="rId3">
+            <a:extLst>
+              <a:ext uri="{96DAC541-7B7A-43D3-8B79-37D633B846F1}">
+                <asvg:svgBlip xmlns:asvg="http://schemas.microsoft.com/office/drawing/2016/SVG/main" r:embed="rId4"/>
+              </a:ext>
+            </a:extLst>
+          </a:blip>
+          <a:stretch>
+            <a:fillRect/>
+          </a:stretch>
+        </p:blipFill>
+        <p:spPr>
+          <a:xfrm>
+            <a:off x="5636228" y="4709489"/>
+            <a:ext cx="174433" cy="174433"/>
+          </a:xfrm>
+          <a:prstGeom prst="rect">
+            <a:avLst/>
+          </a:prstGeom>
+        </p:spPr>
+      </p:pic>
+      <p:pic>
+        <p:nvPicPr>
+          <p:cNvPr id="43" name="Graphic 42" descr="Pause">
+            <a:extLst>
+              <a:ext uri="{FF2B5EF4-FFF2-40B4-BE49-F238E27FC236}">
+                <a16:creationId xmlns:a16="http://schemas.microsoft.com/office/drawing/2014/main" id="{D6976150-A576-C24D-9C11-5D7E4EE3E2F1}"/>
+              </a:ext>
+            </a:extLst>
+          </p:cNvPr>
+          <p:cNvPicPr>
+            <a:picLocks noChangeAspect="1"/>
+          </p:cNvPicPr>
+          <p:nvPr/>
+        </p:nvPicPr>
+        <p:blipFill>
+          <a:blip r:embed="rId7">
+            <a:extLst>
+              <a:ext uri="{96DAC541-7B7A-43D3-8B79-37D633B846F1}">
+                <asvg:svgBlip xmlns:asvg="http://schemas.microsoft.com/office/drawing/2016/SVG/main" r:embed="rId8"/>
+              </a:ext>
+            </a:extLst>
+          </a:blip>
+          <a:stretch>
+            <a:fillRect/>
+          </a:stretch>
+        </p:blipFill>
+        <p:spPr>
+          <a:xfrm>
+            <a:off x="5636230" y="5166443"/>
+            <a:ext cx="174433" cy="174433"/>
+          </a:xfrm>
+          <a:prstGeom prst="rect">
+            <a:avLst/>
+          </a:prstGeom>
+        </p:spPr>
+      </p:pic>
+      <p:pic>
+        <p:nvPicPr>
+          <p:cNvPr id="44" name="Graphic 43" descr="Checkmark">
+            <a:extLst>
+              <a:ext uri="{FF2B5EF4-FFF2-40B4-BE49-F238E27FC236}">
+                <a16:creationId xmlns:a16="http://schemas.microsoft.com/office/drawing/2014/main" id="{BE3A192D-7F66-A843-9CFE-7DD6BF0BEB76}"/>
+              </a:ext>
+            </a:extLst>
+          </p:cNvPr>
+          <p:cNvPicPr>
+            <a:picLocks noChangeAspect="1"/>
+          </p:cNvPicPr>
+          <p:nvPr/>
+        </p:nvPicPr>
+        <p:blipFill>
+          <a:blip r:embed="rId3">
+            <a:extLst>
+              <a:ext uri="{96DAC541-7B7A-43D3-8B79-37D633B846F1}">
+                <asvg:svgBlip xmlns:asvg="http://schemas.microsoft.com/office/drawing/2016/SVG/main" r:embed="rId4"/>
+              </a:ext>
+            </a:extLst>
+          </a:blip>
+          <a:stretch>
+            <a:fillRect/>
+          </a:stretch>
+        </p:blipFill>
+        <p:spPr>
+          <a:xfrm>
+            <a:off x="5636227" y="5653752"/>
+            <a:ext cx="174433" cy="174433"/>
+          </a:xfrm>
+          <a:prstGeom prst="rect">
+            <a:avLst/>
+          </a:prstGeom>
+        </p:spPr>
+      </p:pic>
+      <p:pic>
+        <p:nvPicPr>
+          <p:cNvPr id="45" name="Graphic 44" descr="Checkmark">
+            <a:extLst>
+              <a:ext uri="{FF2B5EF4-FFF2-40B4-BE49-F238E27FC236}">
+                <a16:creationId xmlns:a16="http://schemas.microsoft.com/office/drawing/2014/main" id="{804FE3D2-E1EB-A24E-8E3A-58750228CEC9}"/>
+              </a:ext>
+            </a:extLst>
+          </p:cNvPr>
+          <p:cNvPicPr>
+            <a:picLocks noChangeAspect="1"/>
+          </p:cNvPicPr>
+          <p:nvPr/>
+        </p:nvPicPr>
+        <p:blipFill>
+          <a:blip r:embed="rId3">
+            <a:extLst>
+              <a:ext uri="{96DAC541-7B7A-43D3-8B79-37D633B846F1}">
+                <asvg:svgBlip xmlns:asvg="http://schemas.microsoft.com/office/drawing/2016/SVG/main" r:embed="rId4"/>
+              </a:ext>
+            </a:extLst>
+          </a:blip>
+          <a:stretch>
+            <a:fillRect/>
+          </a:stretch>
+        </p:blipFill>
+        <p:spPr>
+          <a:xfrm>
+            <a:off x="5636226" y="5925262"/>
+            <a:ext cx="174433" cy="174433"/>
+          </a:xfrm>
+          <a:prstGeom prst="rect">
+            <a:avLst/>
+          </a:prstGeom>
+        </p:spPr>
+      </p:pic>
+      <p:pic>
+        <p:nvPicPr>
+          <p:cNvPr id="46" name="Graphic 45" descr="Checkmark">
+            <a:extLst>
+              <a:ext uri="{FF2B5EF4-FFF2-40B4-BE49-F238E27FC236}">
+                <a16:creationId xmlns:a16="http://schemas.microsoft.com/office/drawing/2014/main" id="{6A6EFD3B-5DCA-154C-95A9-429E32CDEA2E}"/>
+              </a:ext>
+            </a:extLst>
+          </p:cNvPr>
+          <p:cNvPicPr>
+            <a:picLocks noChangeAspect="1"/>
+          </p:cNvPicPr>
+          <p:nvPr/>
+        </p:nvPicPr>
+        <p:blipFill>
+          <a:blip r:embed="rId3">
+            <a:extLst>
+              <a:ext uri="{96DAC541-7B7A-43D3-8B79-37D633B846F1}">
+                <asvg:svgBlip xmlns:asvg="http://schemas.microsoft.com/office/drawing/2016/SVG/main" r:embed="rId4"/>
+              </a:ext>
+            </a:extLst>
+          </a:blip>
+          <a:stretch>
+            <a:fillRect/>
+          </a:stretch>
+        </p:blipFill>
+        <p:spPr>
+          <a:xfrm>
+            <a:off x="692353" y="2511679"/>
+            <a:ext cx="174433" cy="174433"/>
+          </a:xfrm>
+          <a:prstGeom prst="rect">
+            <a:avLst/>
+          </a:prstGeom>
+        </p:spPr>
+      </p:pic>
+      <p:pic>
+        <p:nvPicPr>
+          <p:cNvPr id="47" name="Graphic 46" descr="Close">
+            <a:extLst>
+              <a:ext uri="{FF2B5EF4-FFF2-40B4-BE49-F238E27FC236}">
+                <a16:creationId xmlns:a16="http://schemas.microsoft.com/office/drawing/2014/main" id="{8EDD14CD-936A-1344-9E6B-231E108412C2}"/>
               </a:ext>
             </a:extLst>
           </p:cNvPr>
@@ -7073,20 +7798,20 @@
         </p:blipFill>
         <p:spPr>
           <a:xfrm>
-            <a:off x="5623909" y="2746456"/>
-            <a:ext cx="174433" cy="174433"/>
-          </a:xfrm>
-          <a:prstGeom prst="rect">
-            <a:avLst/>
-          </a:prstGeom>
-        </p:spPr>
-      </p:pic>
-      <p:pic>
-        <p:nvPicPr>
-          <p:cNvPr id="26" name="Graphic 25" descr="Close">
-            <a:extLst>
-              <a:ext uri="{FF2B5EF4-FFF2-40B4-BE49-F238E27FC236}">
-                <a16:creationId xmlns:a16="http://schemas.microsoft.com/office/drawing/2014/main" id="{83E5B95B-4390-FC4E-94A2-D1EE29BD0111}"/>
+            <a:off x="648734" y="3718632"/>
+            <a:ext cx="174433" cy="174433"/>
+          </a:xfrm>
+          <a:prstGeom prst="rect">
+            <a:avLst/>
+          </a:prstGeom>
+        </p:spPr>
+      </p:pic>
+      <p:pic>
+        <p:nvPicPr>
+          <p:cNvPr id="48" name="Graphic 47" descr="Close">
+            <a:extLst>
+              <a:ext uri="{FF2B5EF4-FFF2-40B4-BE49-F238E27FC236}">
+                <a16:creationId xmlns:a16="http://schemas.microsoft.com/office/drawing/2014/main" id="{A1CDFDF7-7812-4F44-84BB-293661EAE6ED}"/>
               </a:ext>
             </a:extLst>
           </p:cNvPr>
@@ -7109,704 +7834,20 @@
         </p:blipFill>
         <p:spPr>
           <a:xfrm>
-            <a:off x="5623910" y="2250403"/>
-            <a:ext cx="174433" cy="174433"/>
-          </a:xfrm>
-          <a:prstGeom prst="rect">
-            <a:avLst/>
-          </a:prstGeom>
-        </p:spPr>
-      </p:pic>
-      <p:pic>
-        <p:nvPicPr>
-          <p:cNvPr id="27" name="Graphic 26" descr="Checkmark">
-            <a:extLst>
-              <a:ext uri="{FF2B5EF4-FFF2-40B4-BE49-F238E27FC236}">
-                <a16:creationId xmlns:a16="http://schemas.microsoft.com/office/drawing/2014/main" id="{B447E4D7-F128-894C-943D-D24B31C75749}"/>
-              </a:ext>
-            </a:extLst>
-          </p:cNvPr>
-          <p:cNvPicPr>
-            <a:picLocks noChangeAspect="1"/>
-          </p:cNvPicPr>
-          <p:nvPr/>
-        </p:nvPicPr>
-        <p:blipFill>
-          <a:blip r:embed="rId3">
-            <a:extLst>
-              <a:ext uri="{96DAC541-7B7A-43D3-8B79-37D633B846F1}">
-                <asvg:svgBlip xmlns:asvg="http://schemas.microsoft.com/office/drawing/2016/SVG/main" r:embed="rId4"/>
-              </a:ext>
-            </a:extLst>
-          </a:blip>
-          <a:stretch>
-            <a:fillRect/>
-          </a:stretch>
-        </p:blipFill>
-        <p:spPr>
-          <a:xfrm>
-            <a:off x="665154" y="5458958"/>
-            <a:ext cx="174433" cy="174433"/>
-          </a:xfrm>
-          <a:prstGeom prst="rect">
-            <a:avLst/>
-          </a:prstGeom>
-        </p:spPr>
-      </p:pic>
-      <p:pic>
-        <p:nvPicPr>
-          <p:cNvPr id="28" name="Graphic 27" descr="Checkmark">
-            <a:extLst>
-              <a:ext uri="{FF2B5EF4-FFF2-40B4-BE49-F238E27FC236}">
-                <a16:creationId xmlns:a16="http://schemas.microsoft.com/office/drawing/2014/main" id="{E7F7FA20-7AAC-D744-A376-284B0D3C2A00}"/>
-              </a:ext>
-            </a:extLst>
-          </p:cNvPr>
-          <p:cNvPicPr>
-            <a:picLocks noChangeAspect="1"/>
-          </p:cNvPicPr>
-          <p:nvPr/>
-        </p:nvPicPr>
-        <p:blipFill>
-          <a:blip r:embed="rId3">
-            <a:extLst>
-              <a:ext uri="{96DAC541-7B7A-43D3-8B79-37D633B846F1}">
-                <asvg:svgBlip xmlns:asvg="http://schemas.microsoft.com/office/drawing/2016/SVG/main" r:embed="rId4"/>
-              </a:ext>
-            </a:extLst>
-          </a:blip>
-          <a:stretch>
-            <a:fillRect/>
-          </a:stretch>
-        </p:blipFill>
-        <p:spPr>
-          <a:xfrm>
-            <a:off x="667980" y="5677395"/>
-            <a:ext cx="174433" cy="174433"/>
-          </a:xfrm>
-          <a:prstGeom prst="rect">
-            <a:avLst/>
-          </a:prstGeom>
-        </p:spPr>
-      </p:pic>
-      <p:pic>
-        <p:nvPicPr>
-          <p:cNvPr id="29" name="Graphic 28" descr="Checkmark">
-            <a:extLst>
-              <a:ext uri="{FF2B5EF4-FFF2-40B4-BE49-F238E27FC236}">
-                <a16:creationId xmlns:a16="http://schemas.microsoft.com/office/drawing/2014/main" id="{B127B14B-2863-C74A-9FD8-E2C76B436BE5}"/>
-              </a:ext>
-            </a:extLst>
-          </p:cNvPr>
-          <p:cNvPicPr>
-            <a:picLocks noChangeAspect="1"/>
-          </p:cNvPicPr>
-          <p:nvPr/>
-        </p:nvPicPr>
-        <p:blipFill>
-          <a:blip r:embed="rId3">
-            <a:extLst>
-              <a:ext uri="{96DAC541-7B7A-43D3-8B79-37D633B846F1}">
-                <asvg:svgBlip xmlns:asvg="http://schemas.microsoft.com/office/drawing/2016/SVG/main" r:embed="rId4"/>
-              </a:ext>
-            </a:extLst>
-          </a:blip>
-          <a:stretch>
-            <a:fillRect/>
-          </a:stretch>
-        </p:blipFill>
-        <p:spPr>
-          <a:xfrm>
-            <a:off x="658836" y="5925263"/>
-            <a:ext cx="174433" cy="174433"/>
-          </a:xfrm>
-          <a:prstGeom prst="rect">
-            <a:avLst/>
-          </a:prstGeom>
-        </p:spPr>
-      </p:pic>
-      <p:pic>
-        <p:nvPicPr>
-          <p:cNvPr id="30" name="Graphic 29" descr="Checkmark">
-            <a:extLst>
-              <a:ext uri="{FF2B5EF4-FFF2-40B4-BE49-F238E27FC236}">
-                <a16:creationId xmlns:a16="http://schemas.microsoft.com/office/drawing/2014/main" id="{A6F1EF41-4973-8944-8A94-3BD92992CF6B}"/>
-              </a:ext>
-            </a:extLst>
-          </p:cNvPr>
-          <p:cNvPicPr>
-            <a:picLocks noChangeAspect="1"/>
-          </p:cNvPicPr>
-          <p:nvPr/>
-        </p:nvPicPr>
-        <p:blipFill>
-          <a:blip r:embed="rId3">
-            <a:extLst>
-              <a:ext uri="{96DAC541-7B7A-43D3-8B79-37D633B846F1}">
-                <asvg:svgBlip xmlns:asvg="http://schemas.microsoft.com/office/drawing/2016/SVG/main" r:embed="rId4"/>
-              </a:ext>
-            </a:extLst>
-          </a:blip>
-          <a:stretch>
-            <a:fillRect/>
-          </a:stretch>
-        </p:blipFill>
-        <p:spPr>
-          <a:xfrm>
-            <a:off x="667980" y="6173131"/>
-            <a:ext cx="174433" cy="174433"/>
-          </a:xfrm>
-          <a:prstGeom prst="rect">
-            <a:avLst/>
-          </a:prstGeom>
-        </p:spPr>
-      </p:pic>
-      <p:pic>
-        <p:nvPicPr>
-          <p:cNvPr id="31" name="Graphic 30" descr="Checkmark">
-            <a:extLst>
-              <a:ext uri="{FF2B5EF4-FFF2-40B4-BE49-F238E27FC236}">
-                <a16:creationId xmlns:a16="http://schemas.microsoft.com/office/drawing/2014/main" id="{B3E8B9B2-499F-524B-B8AA-D57CFCEB2FA0}"/>
-              </a:ext>
-            </a:extLst>
-          </p:cNvPr>
-          <p:cNvPicPr>
-            <a:picLocks noChangeAspect="1"/>
-          </p:cNvPicPr>
-          <p:nvPr/>
-        </p:nvPicPr>
-        <p:blipFill>
-          <a:blip r:embed="rId3">
-            <a:extLst>
-              <a:ext uri="{96DAC541-7B7A-43D3-8B79-37D633B846F1}">
-                <asvg:svgBlip xmlns:asvg="http://schemas.microsoft.com/office/drawing/2016/SVG/main" r:embed="rId4"/>
-              </a:ext>
-            </a:extLst>
-          </a:blip>
-          <a:stretch>
-            <a:fillRect/>
-          </a:stretch>
-        </p:blipFill>
-        <p:spPr>
-          <a:xfrm>
-            <a:off x="5624260" y="1773522"/>
-            <a:ext cx="174433" cy="174433"/>
-          </a:xfrm>
-          <a:prstGeom prst="rect">
-            <a:avLst/>
-          </a:prstGeom>
-        </p:spPr>
-      </p:pic>
-      <p:pic>
-        <p:nvPicPr>
-          <p:cNvPr id="32" name="Graphic 31" descr="Checkmark">
-            <a:extLst>
-              <a:ext uri="{FF2B5EF4-FFF2-40B4-BE49-F238E27FC236}">
-                <a16:creationId xmlns:a16="http://schemas.microsoft.com/office/drawing/2014/main" id="{C88D5AEE-3669-8B49-B0F8-CC80B52BAAA2}"/>
-              </a:ext>
-            </a:extLst>
-          </p:cNvPr>
-          <p:cNvPicPr>
-            <a:picLocks noChangeAspect="1"/>
-          </p:cNvPicPr>
-          <p:nvPr/>
-        </p:nvPicPr>
-        <p:blipFill>
-          <a:blip r:embed="rId3">
-            <a:extLst>
-              <a:ext uri="{96DAC541-7B7A-43D3-8B79-37D633B846F1}">
-                <asvg:svgBlip xmlns:asvg="http://schemas.microsoft.com/office/drawing/2016/SVG/main" r:embed="rId4"/>
-              </a:ext>
-            </a:extLst>
-          </a:blip>
-          <a:stretch>
-            <a:fillRect/>
-          </a:stretch>
-        </p:blipFill>
-        <p:spPr>
-          <a:xfrm>
-            <a:off x="5624260" y="2030788"/>
-            <a:ext cx="174433" cy="174433"/>
-          </a:xfrm>
-          <a:prstGeom prst="rect">
-            <a:avLst/>
-          </a:prstGeom>
-        </p:spPr>
-      </p:pic>
-      <p:pic>
-        <p:nvPicPr>
-          <p:cNvPr id="33" name="Graphic 32" descr="Checkmark">
-            <a:extLst>
-              <a:ext uri="{FF2B5EF4-FFF2-40B4-BE49-F238E27FC236}">
-                <a16:creationId xmlns:a16="http://schemas.microsoft.com/office/drawing/2014/main" id="{7D5FE5DA-19EE-FA43-AB97-231CEC955CE3}"/>
-              </a:ext>
-            </a:extLst>
-          </p:cNvPr>
-          <p:cNvPicPr>
-            <a:picLocks noChangeAspect="1"/>
-          </p:cNvPicPr>
-          <p:nvPr/>
-        </p:nvPicPr>
-        <p:blipFill>
-          <a:blip r:embed="rId3">
-            <a:extLst>
-              <a:ext uri="{96DAC541-7B7A-43D3-8B79-37D633B846F1}">
-                <asvg:svgBlip xmlns:asvg="http://schemas.microsoft.com/office/drawing/2016/SVG/main" r:embed="rId4"/>
-              </a:ext>
-            </a:extLst>
-          </a:blip>
-          <a:stretch>
-            <a:fillRect/>
-          </a:stretch>
-        </p:blipFill>
-        <p:spPr>
-          <a:xfrm>
-            <a:off x="5623909" y="2507669"/>
-            <a:ext cx="174433" cy="174433"/>
-          </a:xfrm>
-          <a:prstGeom prst="rect">
-            <a:avLst/>
-          </a:prstGeom>
-        </p:spPr>
-      </p:pic>
-      <p:pic>
-        <p:nvPicPr>
-          <p:cNvPr id="34" name="Graphic 33" descr="Checkmark">
-            <a:extLst>
-              <a:ext uri="{FF2B5EF4-FFF2-40B4-BE49-F238E27FC236}">
-                <a16:creationId xmlns:a16="http://schemas.microsoft.com/office/drawing/2014/main" id="{C077F771-C623-1D40-A748-019A7F78F96F}"/>
-              </a:ext>
-            </a:extLst>
-          </p:cNvPr>
-          <p:cNvPicPr>
-            <a:picLocks noChangeAspect="1"/>
-          </p:cNvPicPr>
-          <p:nvPr/>
-        </p:nvPicPr>
-        <p:blipFill>
-          <a:blip r:embed="rId3">
-            <a:extLst>
-              <a:ext uri="{96DAC541-7B7A-43D3-8B79-37D633B846F1}">
-                <asvg:svgBlip xmlns:asvg="http://schemas.microsoft.com/office/drawing/2016/SVG/main" r:embed="rId4"/>
-              </a:ext>
-            </a:extLst>
-          </a:blip>
-          <a:stretch>
-            <a:fillRect/>
-          </a:stretch>
-        </p:blipFill>
-        <p:spPr>
-          <a:xfrm>
-            <a:off x="5623908" y="2989682"/>
-            <a:ext cx="174433" cy="174433"/>
-          </a:xfrm>
-          <a:prstGeom prst="rect">
-            <a:avLst/>
-          </a:prstGeom>
-        </p:spPr>
-      </p:pic>
-      <p:pic>
-        <p:nvPicPr>
-          <p:cNvPr id="35" name="Graphic 34" descr="Checkmark">
-            <a:extLst>
-              <a:ext uri="{FF2B5EF4-FFF2-40B4-BE49-F238E27FC236}">
-                <a16:creationId xmlns:a16="http://schemas.microsoft.com/office/drawing/2014/main" id="{F60A61C5-401F-B440-BBA0-43DBB25904E7}"/>
-              </a:ext>
-            </a:extLst>
-          </p:cNvPr>
-          <p:cNvPicPr>
-            <a:picLocks noChangeAspect="1"/>
-          </p:cNvPicPr>
-          <p:nvPr/>
-        </p:nvPicPr>
-        <p:blipFill>
-          <a:blip r:embed="rId3">
-            <a:extLst>
-              <a:ext uri="{96DAC541-7B7A-43D3-8B79-37D633B846F1}">
-                <asvg:svgBlip xmlns:asvg="http://schemas.microsoft.com/office/drawing/2016/SVG/main" r:embed="rId4"/>
-              </a:ext>
-            </a:extLst>
-          </a:blip>
-          <a:stretch>
-            <a:fillRect/>
-          </a:stretch>
-        </p:blipFill>
-        <p:spPr>
-          <a:xfrm>
-            <a:off x="5636230" y="3241944"/>
-            <a:ext cx="174433" cy="174433"/>
-          </a:xfrm>
-          <a:prstGeom prst="rect">
-            <a:avLst/>
-          </a:prstGeom>
-        </p:spPr>
-      </p:pic>
-      <p:pic>
-        <p:nvPicPr>
-          <p:cNvPr id="36" name="Graphic 35" descr="Checkmark">
-            <a:extLst>
-              <a:ext uri="{FF2B5EF4-FFF2-40B4-BE49-F238E27FC236}">
-                <a16:creationId xmlns:a16="http://schemas.microsoft.com/office/drawing/2014/main" id="{C51CA552-B401-1849-A32B-24550D648C8C}"/>
-              </a:ext>
-            </a:extLst>
-          </p:cNvPr>
-          <p:cNvPicPr>
-            <a:picLocks noChangeAspect="1"/>
-          </p:cNvPicPr>
-          <p:nvPr/>
-        </p:nvPicPr>
-        <p:blipFill>
-          <a:blip r:embed="rId3">
-            <a:extLst>
-              <a:ext uri="{96DAC541-7B7A-43D3-8B79-37D633B846F1}">
-                <asvg:svgBlip xmlns:asvg="http://schemas.microsoft.com/office/drawing/2016/SVG/main" r:embed="rId4"/>
-              </a:ext>
-            </a:extLst>
-          </a:blip>
-          <a:stretch>
-            <a:fillRect/>
-          </a:stretch>
-        </p:blipFill>
-        <p:spPr>
-          <a:xfrm>
-            <a:off x="5636230" y="3501890"/>
-            <a:ext cx="174433" cy="174433"/>
-          </a:xfrm>
-          <a:prstGeom prst="rect">
-            <a:avLst/>
-          </a:prstGeom>
-        </p:spPr>
-      </p:pic>
-      <p:pic>
-        <p:nvPicPr>
-          <p:cNvPr id="37" name="Graphic 36" descr="Checkmark">
-            <a:extLst>
-              <a:ext uri="{FF2B5EF4-FFF2-40B4-BE49-F238E27FC236}">
-                <a16:creationId xmlns:a16="http://schemas.microsoft.com/office/drawing/2014/main" id="{2553AAF1-C293-FA40-AAE2-9925B7F7FAEC}"/>
-              </a:ext>
-            </a:extLst>
-          </p:cNvPr>
-          <p:cNvPicPr>
-            <a:picLocks noChangeAspect="1"/>
-          </p:cNvPicPr>
-          <p:nvPr/>
-        </p:nvPicPr>
-        <p:blipFill>
-          <a:blip r:embed="rId3">
-            <a:extLst>
-              <a:ext uri="{96DAC541-7B7A-43D3-8B79-37D633B846F1}">
-                <asvg:svgBlip xmlns:asvg="http://schemas.microsoft.com/office/drawing/2016/SVG/main" r:embed="rId4"/>
-              </a:ext>
-            </a:extLst>
-          </a:blip>
-          <a:stretch>
-            <a:fillRect/>
-          </a:stretch>
-        </p:blipFill>
-        <p:spPr>
-          <a:xfrm>
-            <a:off x="5636229" y="3739683"/>
-            <a:ext cx="174433" cy="174433"/>
-          </a:xfrm>
-          <a:prstGeom prst="rect">
-            <a:avLst/>
-          </a:prstGeom>
-        </p:spPr>
-      </p:pic>
-      <p:pic>
-        <p:nvPicPr>
-          <p:cNvPr id="38" name="Graphic 37" descr="Checkmark">
-            <a:extLst>
-              <a:ext uri="{FF2B5EF4-FFF2-40B4-BE49-F238E27FC236}">
-                <a16:creationId xmlns:a16="http://schemas.microsoft.com/office/drawing/2014/main" id="{DD9F0E75-D40A-9B4D-B4A1-3008361F86D6}"/>
-              </a:ext>
-            </a:extLst>
-          </p:cNvPr>
-          <p:cNvPicPr>
-            <a:picLocks noChangeAspect="1"/>
-          </p:cNvPicPr>
-          <p:nvPr/>
-        </p:nvPicPr>
-        <p:blipFill>
-          <a:blip r:embed="rId3">
-            <a:extLst>
-              <a:ext uri="{96DAC541-7B7A-43D3-8B79-37D633B846F1}">
-                <asvg:svgBlip xmlns:asvg="http://schemas.microsoft.com/office/drawing/2016/SVG/main" r:embed="rId4"/>
-              </a:ext>
-            </a:extLst>
-          </a:blip>
-          <a:stretch>
-            <a:fillRect/>
-          </a:stretch>
-        </p:blipFill>
-        <p:spPr>
-          <a:xfrm>
-            <a:off x="5623907" y="3987807"/>
-            <a:ext cx="174433" cy="174433"/>
-          </a:xfrm>
-          <a:prstGeom prst="rect">
-            <a:avLst/>
-          </a:prstGeom>
-        </p:spPr>
-      </p:pic>
-      <p:pic>
-        <p:nvPicPr>
-          <p:cNvPr id="39" name="Graphic 38" descr="Checkmark">
-            <a:extLst>
-              <a:ext uri="{FF2B5EF4-FFF2-40B4-BE49-F238E27FC236}">
-                <a16:creationId xmlns:a16="http://schemas.microsoft.com/office/drawing/2014/main" id="{394D0787-E6A3-EC4F-A215-F35CEC6B6AF9}"/>
-              </a:ext>
-            </a:extLst>
-          </p:cNvPr>
-          <p:cNvPicPr>
-            <a:picLocks noChangeAspect="1"/>
-          </p:cNvPicPr>
-          <p:nvPr/>
-        </p:nvPicPr>
-        <p:blipFill>
-          <a:blip r:embed="rId3">
-            <a:extLst>
-              <a:ext uri="{96DAC541-7B7A-43D3-8B79-37D633B846F1}">
-                <asvg:svgBlip xmlns:asvg="http://schemas.microsoft.com/office/drawing/2016/SVG/main" r:embed="rId4"/>
-              </a:ext>
-            </a:extLst>
-          </a:blip>
-          <a:stretch>
-            <a:fillRect/>
-          </a:stretch>
-        </p:blipFill>
-        <p:spPr>
-          <a:xfrm>
-            <a:off x="5636229" y="4233358"/>
-            <a:ext cx="174433" cy="174433"/>
-          </a:xfrm>
-          <a:prstGeom prst="rect">
-            <a:avLst/>
-          </a:prstGeom>
-        </p:spPr>
-      </p:pic>
-      <p:pic>
-        <p:nvPicPr>
-          <p:cNvPr id="40" name="Graphic 39" descr="Checkmark">
-            <a:extLst>
-              <a:ext uri="{FF2B5EF4-FFF2-40B4-BE49-F238E27FC236}">
-                <a16:creationId xmlns:a16="http://schemas.microsoft.com/office/drawing/2014/main" id="{C2A5A715-3E1F-1841-B4E7-4A4DB1203D7C}"/>
-              </a:ext>
-            </a:extLst>
-          </p:cNvPr>
-          <p:cNvPicPr>
-            <a:picLocks noChangeAspect="1"/>
-          </p:cNvPicPr>
-          <p:nvPr/>
-        </p:nvPicPr>
-        <p:blipFill>
-          <a:blip r:embed="rId3">
-            <a:extLst>
-              <a:ext uri="{96DAC541-7B7A-43D3-8B79-37D633B846F1}">
-                <asvg:svgBlip xmlns:asvg="http://schemas.microsoft.com/office/drawing/2016/SVG/main" r:embed="rId4"/>
-              </a:ext>
-            </a:extLst>
-          </a:blip>
-          <a:stretch>
-            <a:fillRect/>
-          </a:stretch>
-        </p:blipFill>
-        <p:spPr>
-          <a:xfrm>
-            <a:off x="5636228" y="4453100"/>
-            <a:ext cx="174433" cy="174433"/>
-          </a:xfrm>
-          <a:prstGeom prst="rect">
-            <a:avLst/>
-          </a:prstGeom>
-        </p:spPr>
-      </p:pic>
-      <p:pic>
-        <p:nvPicPr>
-          <p:cNvPr id="41" name="Graphic 40" descr="Checkmark">
-            <a:extLst>
-              <a:ext uri="{FF2B5EF4-FFF2-40B4-BE49-F238E27FC236}">
-                <a16:creationId xmlns:a16="http://schemas.microsoft.com/office/drawing/2014/main" id="{0282D90A-763F-784A-BB32-CEB0E58DA5C1}"/>
-              </a:ext>
-            </a:extLst>
-          </p:cNvPr>
-          <p:cNvPicPr>
-            <a:picLocks noChangeAspect="1"/>
-          </p:cNvPicPr>
-          <p:nvPr/>
-        </p:nvPicPr>
-        <p:blipFill>
-          <a:blip r:embed="rId3">
-            <a:extLst>
-              <a:ext uri="{96DAC541-7B7A-43D3-8B79-37D633B846F1}">
-                <asvg:svgBlip xmlns:asvg="http://schemas.microsoft.com/office/drawing/2016/SVG/main" r:embed="rId4"/>
-              </a:ext>
-            </a:extLst>
-          </a:blip>
-          <a:stretch>
-            <a:fillRect/>
-          </a:stretch>
-        </p:blipFill>
-        <p:spPr>
-          <a:xfrm>
-            <a:off x="5636228" y="4709489"/>
-            <a:ext cx="174433" cy="174433"/>
-          </a:xfrm>
-          <a:prstGeom prst="rect">
-            <a:avLst/>
-          </a:prstGeom>
-        </p:spPr>
-      </p:pic>
-      <p:pic>
-        <p:nvPicPr>
-          <p:cNvPr id="43" name="Graphic 42" descr="Pause">
-            <a:extLst>
-              <a:ext uri="{FF2B5EF4-FFF2-40B4-BE49-F238E27FC236}">
-                <a16:creationId xmlns:a16="http://schemas.microsoft.com/office/drawing/2014/main" id="{D6976150-A576-C24D-9C11-5D7E4EE3E2F1}"/>
-              </a:ext>
-            </a:extLst>
-          </p:cNvPr>
-          <p:cNvPicPr>
-            <a:picLocks noChangeAspect="1"/>
-          </p:cNvPicPr>
-          <p:nvPr/>
-        </p:nvPicPr>
-        <p:blipFill>
-          <a:blip r:embed="rId7">
-            <a:extLst>
-              <a:ext uri="{96DAC541-7B7A-43D3-8B79-37D633B846F1}">
-                <asvg:svgBlip xmlns:asvg="http://schemas.microsoft.com/office/drawing/2016/SVG/main" r:embed="rId8"/>
-              </a:ext>
-            </a:extLst>
-          </a:blip>
-          <a:stretch>
-            <a:fillRect/>
-          </a:stretch>
-        </p:blipFill>
-        <p:spPr>
-          <a:xfrm>
-            <a:off x="5636227" y="5166443"/>
-            <a:ext cx="174433" cy="174433"/>
-          </a:xfrm>
-          <a:prstGeom prst="rect">
-            <a:avLst/>
-          </a:prstGeom>
-        </p:spPr>
-      </p:pic>
-      <p:pic>
-        <p:nvPicPr>
-          <p:cNvPr id="44" name="Graphic 43" descr="Checkmark">
-            <a:extLst>
-              <a:ext uri="{FF2B5EF4-FFF2-40B4-BE49-F238E27FC236}">
-                <a16:creationId xmlns:a16="http://schemas.microsoft.com/office/drawing/2014/main" id="{BE3A192D-7F66-A843-9CFE-7DD6BF0BEB76}"/>
-              </a:ext>
-            </a:extLst>
-          </p:cNvPr>
-          <p:cNvPicPr>
-            <a:picLocks noChangeAspect="1"/>
-          </p:cNvPicPr>
-          <p:nvPr/>
-        </p:nvPicPr>
-        <p:blipFill>
-          <a:blip r:embed="rId3">
-            <a:extLst>
-              <a:ext uri="{96DAC541-7B7A-43D3-8B79-37D633B846F1}">
-                <asvg:svgBlip xmlns:asvg="http://schemas.microsoft.com/office/drawing/2016/SVG/main" r:embed="rId4"/>
-              </a:ext>
-            </a:extLst>
-          </a:blip>
-          <a:stretch>
-            <a:fillRect/>
-          </a:stretch>
-        </p:blipFill>
-        <p:spPr>
-          <a:xfrm>
-            <a:off x="5636227" y="5653752"/>
-            <a:ext cx="174433" cy="174433"/>
-          </a:xfrm>
-          <a:prstGeom prst="rect">
-            <a:avLst/>
-          </a:prstGeom>
-        </p:spPr>
-      </p:pic>
-      <p:pic>
-        <p:nvPicPr>
-          <p:cNvPr id="45" name="Graphic 44" descr="Checkmark">
-            <a:extLst>
-              <a:ext uri="{FF2B5EF4-FFF2-40B4-BE49-F238E27FC236}">
-                <a16:creationId xmlns:a16="http://schemas.microsoft.com/office/drawing/2014/main" id="{804FE3D2-E1EB-A24E-8E3A-58750228CEC9}"/>
-              </a:ext>
-            </a:extLst>
-          </p:cNvPr>
-          <p:cNvPicPr>
-            <a:picLocks noChangeAspect="1"/>
-          </p:cNvPicPr>
-          <p:nvPr/>
-        </p:nvPicPr>
-        <p:blipFill>
-          <a:blip r:embed="rId3">
-            <a:extLst>
-              <a:ext uri="{96DAC541-7B7A-43D3-8B79-37D633B846F1}">
-                <asvg:svgBlip xmlns:asvg="http://schemas.microsoft.com/office/drawing/2016/SVG/main" r:embed="rId4"/>
-              </a:ext>
-            </a:extLst>
-          </a:blip>
-          <a:stretch>
-            <a:fillRect/>
-          </a:stretch>
-        </p:blipFill>
-        <p:spPr>
-          <a:xfrm>
-            <a:off x="5636226" y="5925262"/>
-            <a:ext cx="174433" cy="174433"/>
-          </a:xfrm>
-          <a:prstGeom prst="rect">
-            <a:avLst/>
-          </a:prstGeom>
-        </p:spPr>
-      </p:pic>
-      <p:pic>
-        <p:nvPicPr>
-          <p:cNvPr id="46" name="Graphic 45" descr="Checkmark">
-            <a:extLst>
-              <a:ext uri="{FF2B5EF4-FFF2-40B4-BE49-F238E27FC236}">
-                <a16:creationId xmlns:a16="http://schemas.microsoft.com/office/drawing/2014/main" id="{6A6EFD3B-5DCA-154C-95A9-429E32CDEA2E}"/>
-              </a:ext>
-            </a:extLst>
-          </p:cNvPr>
-          <p:cNvPicPr>
-            <a:picLocks noChangeAspect="1"/>
-          </p:cNvPicPr>
-          <p:nvPr/>
-        </p:nvPicPr>
-        <p:blipFill>
-          <a:blip r:embed="rId3">
-            <a:extLst>
-              <a:ext uri="{96DAC541-7B7A-43D3-8B79-37D633B846F1}">
-                <asvg:svgBlip xmlns:asvg="http://schemas.microsoft.com/office/drawing/2016/SVG/main" r:embed="rId4"/>
-              </a:ext>
-            </a:extLst>
-          </a:blip>
-          <a:stretch>
-            <a:fillRect/>
-          </a:stretch>
-        </p:blipFill>
-        <p:spPr>
-          <a:xfrm>
-            <a:off x="692353" y="2511679"/>
-            <a:ext cx="174433" cy="174433"/>
-          </a:xfrm>
-          <a:prstGeom prst="rect">
-            <a:avLst/>
-          </a:prstGeom>
-        </p:spPr>
-      </p:pic>
-      <p:pic>
-        <p:nvPicPr>
-          <p:cNvPr id="47" name="Graphic 46" descr="Close">
-            <a:extLst>
-              <a:ext uri="{FF2B5EF4-FFF2-40B4-BE49-F238E27FC236}">
-                <a16:creationId xmlns:a16="http://schemas.microsoft.com/office/drawing/2014/main" id="{8EDD14CD-936A-1344-9E6B-231E108412C2}"/>
+            <a:off x="648733" y="3980153"/>
+            <a:ext cx="174433" cy="174433"/>
+          </a:xfrm>
+          <a:prstGeom prst="rect">
+            <a:avLst/>
+          </a:prstGeom>
+        </p:spPr>
+      </p:pic>
+      <p:pic>
+        <p:nvPicPr>
+          <p:cNvPr id="49" name="Graphic 48" descr="Close">
+            <a:extLst>
+              <a:ext uri="{FF2B5EF4-FFF2-40B4-BE49-F238E27FC236}">
+                <a16:creationId xmlns:a16="http://schemas.microsoft.com/office/drawing/2014/main" id="{C1410722-43DA-6644-B74C-1EBC3CD364A8}"/>
               </a:ext>
             </a:extLst>
           </p:cNvPr>
@@ -7829,20 +7870,20 @@
         </p:blipFill>
         <p:spPr>
           <a:xfrm>
-            <a:off x="648734" y="3718632"/>
-            <a:ext cx="174433" cy="174433"/>
-          </a:xfrm>
-          <a:prstGeom prst="rect">
-            <a:avLst/>
-          </a:prstGeom>
-        </p:spPr>
-      </p:pic>
-      <p:pic>
-        <p:nvPicPr>
-          <p:cNvPr id="48" name="Graphic 47" descr="Close">
-            <a:extLst>
-              <a:ext uri="{FF2B5EF4-FFF2-40B4-BE49-F238E27FC236}">
-                <a16:creationId xmlns:a16="http://schemas.microsoft.com/office/drawing/2014/main" id="{A1CDFDF7-7812-4F44-84BB-293661EAE6ED}"/>
+            <a:off x="5636226" y="4955920"/>
+            <a:ext cx="174433" cy="174433"/>
+          </a:xfrm>
+          <a:prstGeom prst="rect">
+            <a:avLst/>
+          </a:prstGeom>
+        </p:spPr>
+      </p:pic>
+      <p:pic>
+        <p:nvPicPr>
+          <p:cNvPr id="42" name="Graphic 16" descr="Close">
+            <a:extLst>
+              <a:ext uri="{FF2B5EF4-FFF2-40B4-BE49-F238E27FC236}">
+                <a16:creationId xmlns:a16="http://schemas.microsoft.com/office/drawing/2014/main" id="{E889A588-070E-409B-AAD4-2C9B981681E3}"/>
               </a:ext>
             </a:extLst>
           </p:cNvPr>
@@ -7865,43 +7906,7 @@
         </p:blipFill>
         <p:spPr>
           <a:xfrm>
-            <a:off x="648733" y="3980153"/>
-            <a:ext cx="174433" cy="174433"/>
-          </a:xfrm>
-          <a:prstGeom prst="rect">
-            <a:avLst/>
-          </a:prstGeom>
-        </p:spPr>
-      </p:pic>
-      <p:pic>
-        <p:nvPicPr>
-          <p:cNvPr id="49" name="Graphic 48" descr="Close">
-            <a:extLst>
-              <a:ext uri="{FF2B5EF4-FFF2-40B4-BE49-F238E27FC236}">
-                <a16:creationId xmlns:a16="http://schemas.microsoft.com/office/drawing/2014/main" id="{C1410722-43DA-6644-B74C-1EBC3CD364A8}"/>
-              </a:ext>
-            </a:extLst>
-          </p:cNvPr>
-          <p:cNvPicPr>
-            <a:picLocks noChangeAspect="1"/>
-          </p:cNvPicPr>
-          <p:nvPr/>
-        </p:nvPicPr>
-        <p:blipFill>
-          <a:blip r:embed="rId5">
-            <a:extLst>
-              <a:ext uri="{96DAC541-7B7A-43D3-8B79-37D633B846F1}">
-                <asvg:svgBlip xmlns:asvg="http://schemas.microsoft.com/office/drawing/2016/SVG/main" r:embed="rId6"/>
-              </a:ext>
-            </a:extLst>
-          </a:blip>
-          <a:stretch>
-            <a:fillRect/>
-          </a:stretch>
-        </p:blipFill>
-        <p:spPr>
-          <a:xfrm>
-            <a:off x="5636226" y="4955920"/>
+            <a:off x="667980" y="3008288"/>
             <a:ext cx="174433" cy="174433"/>
           </a:xfrm>
           <a:prstGeom prst="rect">
@@ -8446,6 +8451,1266 @@
           </a:xfrm>
         </p:spPr>
       </p:pic>
+      <p:pic>
+        <p:nvPicPr>
+          <p:cNvPr id="7" name="Graphic 10" descr="Checkmark">
+            <a:extLst>
+              <a:ext uri="{FF2B5EF4-FFF2-40B4-BE49-F238E27FC236}">
+                <a16:creationId xmlns:a16="http://schemas.microsoft.com/office/drawing/2014/main" id="{3B2BEE50-085C-4E81-A78B-BF7FD02BE52E}"/>
+              </a:ext>
+            </a:extLst>
+          </p:cNvPr>
+          <p:cNvPicPr>
+            <a:picLocks noChangeAspect="1"/>
+          </p:cNvPicPr>
+          <p:nvPr/>
+        </p:nvPicPr>
+        <p:blipFill>
+          <a:blip r:embed="rId3">
+            <a:extLst>
+              <a:ext uri="{96DAC541-7B7A-43D3-8B79-37D633B846F1}">
+                <asvg:svgBlip xmlns:asvg="http://schemas.microsoft.com/office/drawing/2016/SVG/main" r:embed="rId4"/>
+              </a:ext>
+            </a:extLst>
+          </a:blip>
+          <a:stretch>
+            <a:fillRect/>
+          </a:stretch>
+        </p:blipFill>
+        <p:spPr>
+          <a:xfrm>
+            <a:off x="663767" y="1773522"/>
+            <a:ext cx="174433" cy="174433"/>
+          </a:xfrm>
+          <a:prstGeom prst="rect">
+            <a:avLst/>
+          </a:prstGeom>
+        </p:spPr>
+      </p:pic>
+      <p:pic>
+        <p:nvPicPr>
+          <p:cNvPr id="11" name="Graphic 10" descr="Checkmark">
+            <a:extLst>
+              <a:ext uri="{FF2B5EF4-FFF2-40B4-BE49-F238E27FC236}">
+                <a16:creationId xmlns:a16="http://schemas.microsoft.com/office/drawing/2014/main" id="{D0E55437-ABD1-4AB7-BD3E-EECA81E91E95}"/>
+              </a:ext>
+            </a:extLst>
+          </p:cNvPr>
+          <p:cNvPicPr>
+            <a:picLocks noChangeAspect="1"/>
+          </p:cNvPicPr>
+          <p:nvPr/>
+        </p:nvPicPr>
+        <p:blipFill>
+          <a:blip r:embed="rId3">
+            <a:extLst>
+              <a:ext uri="{96DAC541-7B7A-43D3-8B79-37D633B846F1}">
+                <asvg:svgBlip xmlns:asvg="http://schemas.microsoft.com/office/drawing/2016/SVG/main" r:embed="rId4"/>
+              </a:ext>
+            </a:extLst>
+          </a:blip>
+          <a:stretch>
+            <a:fillRect/>
+          </a:stretch>
+        </p:blipFill>
+        <p:spPr>
+          <a:xfrm>
+            <a:off x="663766" y="2013138"/>
+            <a:ext cx="174433" cy="174433"/>
+          </a:xfrm>
+          <a:prstGeom prst="rect">
+            <a:avLst/>
+          </a:prstGeom>
+        </p:spPr>
+      </p:pic>
+      <p:pic>
+        <p:nvPicPr>
+          <p:cNvPr id="12" name="Graphic 10" descr="Checkmark">
+            <a:extLst>
+              <a:ext uri="{FF2B5EF4-FFF2-40B4-BE49-F238E27FC236}">
+                <a16:creationId xmlns:a16="http://schemas.microsoft.com/office/drawing/2014/main" id="{5246A457-A610-479A-8D6B-D63C37B89DB7}"/>
+              </a:ext>
+            </a:extLst>
+          </p:cNvPr>
+          <p:cNvPicPr>
+            <a:picLocks noChangeAspect="1"/>
+          </p:cNvPicPr>
+          <p:nvPr/>
+        </p:nvPicPr>
+        <p:blipFill>
+          <a:blip r:embed="rId3">
+            <a:extLst>
+              <a:ext uri="{96DAC541-7B7A-43D3-8B79-37D633B846F1}">
+                <asvg:svgBlip xmlns:asvg="http://schemas.microsoft.com/office/drawing/2016/SVG/main" r:embed="rId4"/>
+              </a:ext>
+            </a:extLst>
+          </a:blip>
+          <a:stretch>
+            <a:fillRect/>
+          </a:stretch>
+        </p:blipFill>
+        <p:spPr>
+          <a:xfrm>
+            <a:off x="663767" y="2508438"/>
+            <a:ext cx="174433" cy="174433"/>
+          </a:xfrm>
+          <a:prstGeom prst="rect">
+            <a:avLst/>
+          </a:prstGeom>
+        </p:spPr>
+      </p:pic>
+      <p:pic>
+        <p:nvPicPr>
+          <p:cNvPr id="13" name="Graphic 10" descr="Checkmark">
+            <a:extLst>
+              <a:ext uri="{FF2B5EF4-FFF2-40B4-BE49-F238E27FC236}">
+                <a16:creationId xmlns:a16="http://schemas.microsoft.com/office/drawing/2014/main" id="{47DEDB4C-E95E-4473-8C4F-F18A06CFE6B7}"/>
+              </a:ext>
+            </a:extLst>
+          </p:cNvPr>
+          <p:cNvPicPr>
+            <a:picLocks noChangeAspect="1"/>
+          </p:cNvPicPr>
+          <p:nvPr/>
+        </p:nvPicPr>
+        <p:blipFill>
+          <a:blip r:embed="rId3">
+            <a:extLst>
+              <a:ext uri="{96DAC541-7B7A-43D3-8B79-37D633B846F1}">
+                <asvg:svgBlip xmlns:asvg="http://schemas.microsoft.com/office/drawing/2016/SVG/main" r:embed="rId4"/>
+              </a:ext>
+            </a:extLst>
+          </a:blip>
+          <a:stretch>
+            <a:fillRect/>
+          </a:stretch>
+        </p:blipFill>
+        <p:spPr>
+          <a:xfrm>
+            <a:off x="663767" y="2268822"/>
+            <a:ext cx="174433" cy="174433"/>
+          </a:xfrm>
+          <a:prstGeom prst="rect">
+            <a:avLst/>
+          </a:prstGeom>
+        </p:spPr>
+      </p:pic>
+      <p:pic>
+        <p:nvPicPr>
+          <p:cNvPr id="14" name="Graphic 10" descr="Checkmark">
+            <a:extLst>
+              <a:ext uri="{FF2B5EF4-FFF2-40B4-BE49-F238E27FC236}">
+                <a16:creationId xmlns:a16="http://schemas.microsoft.com/office/drawing/2014/main" id="{0F2EE58F-66B6-45BD-9A0B-C6FCE3B33885}"/>
+              </a:ext>
+            </a:extLst>
+          </p:cNvPr>
+          <p:cNvPicPr>
+            <a:picLocks noChangeAspect="1"/>
+          </p:cNvPicPr>
+          <p:nvPr/>
+        </p:nvPicPr>
+        <p:blipFill>
+          <a:blip r:embed="rId3">
+            <a:extLst>
+              <a:ext uri="{96DAC541-7B7A-43D3-8B79-37D633B846F1}">
+                <asvg:svgBlip xmlns:asvg="http://schemas.microsoft.com/office/drawing/2016/SVG/main" r:embed="rId4"/>
+              </a:ext>
+            </a:extLst>
+          </a:blip>
+          <a:stretch>
+            <a:fillRect/>
+          </a:stretch>
+        </p:blipFill>
+        <p:spPr>
+          <a:xfrm>
+            <a:off x="663767" y="2748054"/>
+            <a:ext cx="174433" cy="174433"/>
+          </a:xfrm>
+          <a:prstGeom prst="rect">
+            <a:avLst/>
+          </a:prstGeom>
+        </p:spPr>
+      </p:pic>
+      <p:pic>
+        <p:nvPicPr>
+          <p:cNvPr id="15" name="Graphic 16" descr="Close">
+            <a:extLst>
+              <a:ext uri="{FF2B5EF4-FFF2-40B4-BE49-F238E27FC236}">
+                <a16:creationId xmlns:a16="http://schemas.microsoft.com/office/drawing/2014/main" id="{C3858199-0E32-4AF2-88F9-B3F702EF34B7}"/>
+              </a:ext>
+            </a:extLst>
+          </p:cNvPr>
+          <p:cNvPicPr>
+            <a:picLocks noChangeAspect="1"/>
+          </p:cNvPicPr>
+          <p:nvPr/>
+        </p:nvPicPr>
+        <p:blipFill>
+          <a:blip r:embed="rId5">
+            <a:extLst>
+              <a:ext uri="{96DAC541-7B7A-43D3-8B79-37D633B846F1}">
+                <asvg:svgBlip xmlns:asvg="http://schemas.microsoft.com/office/drawing/2016/SVG/main" r:embed="rId6"/>
+              </a:ext>
+            </a:extLst>
+          </a:blip>
+          <a:stretch>
+            <a:fillRect/>
+          </a:stretch>
+        </p:blipFill>
+        <p:spPr>
+          <a:xfrm>
+            <a:off x="664352" y="2987670"/>
+            <a:ext cx="174433" cy="174433"/>
+          </a:xfrm>
+          <a:prstGeom prst="rect">
+            <a:avLst/>
+          </a:prstGeom>
+        </p:spPr>
+      </p:pic>
+      <p:pic>
+        <p:nvPicPr>
+          <p:cNvPr id="16" name="Graphic 16" descr="Close">
+            <a:extLst>
+              <a:ext uri="{FF2B5EF4-FFF2-40B4-BE49-F238E27FC236}">
+                <a16:creationId xmlns:a16="http://schemas.microsoft.com/office/drawing/2014/main" id="{11202DFC-396B-4B77-9BD7-3721A670F848}"/>
+              </a:ext>
+            </a:extLst>
+          </p:cNvPr>
+          <p:cNvPicPr>
+            <a:picLocks noChangeAspect="1"/>
+          </p:cNvPicPr>
+          <p:nvPr/>
+        </p:nvPicPr>
+        <p:blipFill>
+          <a:blip r:embed="rId5">
+            <a:extLst>
+              <a:ext uri="{96DAC541-7B7A-43D3-8B79-37D633B846F1}">
+                <asvg:svgBlip xmlns:asvg="http://schemas.microsoft.com/office/drawing/2016/SVG/main" r:embed="rId6"/>
+              </a:ext>
+            </a:extLst>
+          </a:blip>
+          <a:stretch>
+            <a:fillRect/>
+          </a:stretch>
+        </p:blipFill>
+        <p:spPr>
+          <a:xfrm>
+            <a:off x="664352" y="3227286"/>
+            <a:ext cx="174433" cy="174433"/>
+          </a:xfrm>
+          <a:prstGeom prst="rect">
+            <a:avLst/>
+          </a:prstGeom>
+        </p:spPr>
+      </p:pic>
+      <p:pic>
+        <p:nvPicPr>
+          <p:cNvPr id="17" name="Graphic 10" descr="Checkmark">
+            <a:extLst>
+              <a:ext uri="{FF2B5EF4-FFF2-40B4-BE49-F238E27FC236}">
+                <a16:creationId xmlns:a16="http://schemas.microsoft.com/office/drawing/2014/main" id="{5BBBFBEC-60D9-42F5-A5A3-A364E633D464}"/>
+              </a:ext>
+            </a:extLst>
+          </p:cNvPr>
+          <p:cNvPicPr>
+            <a:picLocks noChangeAspect="1"/>
+          </p:cNvPicPr>
+          <p:nvPr/>
+        </p:nvPicPr>
+        <p:blipFill>
+          <a:blip r:embed="rId3">
+            <a:extLst>
+              <a:ext uri="{96DAC541-7B7A-43D3-8B79-37D633B846F1}">
+                <asvg:svgBlip xmlns:asvg="http://schemas.microsoft.com/office/drawing/2016/SVG/main" r:embed="rId4"/>
+              </a:ext>
+            </a:extLst>
+          </a:blip>
+          <a:stretch>
+            <a:fillRect/>
+          </a:stretch>
+        </p:blipFill>
+        <p:spPr>
+          <a:xfrm>
+            <a:off x="663767" y="3473247"/>
+            <a:ext cx="174433" cy="174433"/>
+          </a:xfrm>
+          <a:prstGeom prst="rect">
+            <a:avLst/>
+          </a:prstGeom>
+        </p:spPr>
+      </p:pic>
+      <p:pic>
+        <p:nvPicPr>
+          <p:cNvPr id="18" name="Graphic 16" descr="Close">
+            <a:extLst>
+              <a:ext uri="{FF2B5EF4-FFF2-40B4-BE49-F238E27FC236}">
+                <a16:creationId xmlns:a16="http://schemas.microsoft.com/office/drawing/2014/main" id="{239E629E-424C-4F18-9701-B30AD2797AE4}"/>
+              </a:ext>
+            </a:extLst>
+          </p:cNvPr>
+          <p:cNvPicPr>
+            <a:picLocks noChangeAspect="1"/>
+          </p:cNvPicPr>
+          <p:nvPr/>
+        </p:nvPicPr>
+        <p:blipFill>
+          <a:blip r:embed="rId5">
+            <a:extLst>
+              <a:ext uri="{96DAC541-7B7A-43D3-8B79-37D633B846F1}">
+                <asvg:svgBlip xmlns:asvg="http://schemas.microsoft.com/office/drawing/2016/SVG/main" r:embed="rId6"/>
+              </a:ext>
+            </a:extLst>
+          </a:blip>
+          <a:stretch>
+            <a:fillRect/>
+          </a:stretch>
+        </p:blipFill>
+        <p:spPr>
+          <a:xfrm>
+            <a:off x="664352" y="3719208"/>
+            <a:ext cx="174433" cy="174433"/>
+          </a:xfrm>
+          <a:prstGeom prst="rect">
+            <a:avLst/>
+          </a:prstGeom>
+        </p:spPr>
+      </p:pic>
+      <p:pic>
+        <p:nvPicPr>
+          <p:cNvPr id="19" name="Graphic 10" descr="Checkmark">
+            <a:extLst>
+              <a:ext uri="{FF2B5EF4-FFF2-40B4-BE49-F238E27FC236}">
+                <a16:creationId xmlns:a16="http://schemas.microsoft.com/office/drawing/2014/main" id="{27273629-54C2-4AD1-86B8-FA7C525A5F0F}"/>
+              </a:ext>
+            </a:extLst>
+          </p:cNvPr>
+          <p:cNvPicPr>
+            <a:picLocks noChangeAspect="1"/>
+          </p:cNvPicPr>
+          <p:nvPr/>
+        </p:nvPicPr>
+        <p:blipFill>
+          <a:blip r:embed="rId3">
+            <a:extLst>
+              <a:ext uri="{96DAC541-7B7A-43D3-8B79-37D633B846F1}">
+                <asvg:svgBlip xmlns:asvg="http://schemas.microsoft.com/office/drawing/2016/SVG/main" r:embed="rId4"/>
+              </a:ext>
+            </a:extLst>
+          </a:blip>
+          <a:stretch>
+            <a:fillRect/>
+          </a:stretch>
+        </p:blipFill>
+        <p:spPr>
+          <a:xfrm>
+            <a:off x="664352" y="3962202"/>
+            <a:ext cx="174433" cy="174433"/>
+          </a:xfrm>
+          <a:prstGeom prst="rect">
+            <a:avLst/>
+          </a:prstGeom>
+        </p:spPr>
+      </p:pic>
+      <p:pic>
+        <p:nvPicPr>
+          <p:cNvPr id="20" name="Graphic 10" descr="Checkmark">
+            <a:extLst>
+              <a:ext uri="{FF2B5EF4-FFF2-40B4-BE49-F238E27FC236}">
+                <a16:creationId xmlns:a16="http://schemas.microsoft.com/office/drawing/2014/main" id="{92E4F5F9-DEE7-4140-9A47-952F33464E52}"/>
+              </a:ext>
+            </a:extLst>
+          </p:cNvPr>
+          <p:cNvPicPr>
+            <a:picLocks noChangeAspect="1"/>
+          </p:cNvPicPr>
+          <p:nvPr/>
+        </p:nvPicPr>
+        <p:blipFill>
+          <a:blip r:embed="rId3">
+            <a:extLst>
+              <a:ext uri="{96DAC541-7B7A-43D3-8B79-37D633B846F1}">
+                <asvg:svgBlip xmlns:asvg="http://schemas.microsoft.com/office/drawing/2016/SVG/main" r:embed="rId4"/>
+              </a:ext>
+            </a:extLst>
+          </a:blip>
+          <a:stretch>
+            <a:fillRect/>
+          </a:stretch>
+        </p:blipFill>
+        <p:spPr>
+          <a:xfrm>
+            <a:off x="663765" y="4198851"/>
+            <a:ext cx="174433" cy="174433"/>
+          </a:xfrm>
+          <a:prstGeom prst="rect">
+            <a:avLst/>
+          </a:prstGeom>
+        </p:spPr>
+      </p:pic>
+      <p:pic>
+        <p:nvPicPr>
+          <p:cNvPr id="21" name="Graphic 10" descr="Checkmark">
+            <a:extLst>
+              <a:ext uri="{FF2B5EF4-FFF2-40B4-BE49-F238E27FC236}">
+                <a16:creationId xmlns:a16="http://schemas.microsoft.com/office/drawing/2014/main" id="{9B4B2305-5148-46A1-AA77-58A6980CEF98}"/>
+              </a:ext>
+            </a:extLst>
+          </p:cNvPr>
+          <p:cNvPicPr>
+            <a:picLocks noChangeAspect="1"/>
+          </p:cNvPicPr>
+          <p:nvPr/>
+        </p:nvPicPr>
+        <p:blipFill>
+          <a:blip r:embed="rId3">
+            <a:extLst>
+              <a:ext uri="{96DAC541-7B7A-43D3-8B79-37D633B846F1}">
+                <asvg:svgBlip xmlns:asvg="http://schemas.microsoft.com/office/drawing/2016/SVG/main" r:embed="rId4"/>
+              </a:ext>
+            </a:extLst>
+          </a:blip>
+          <a:stretch>
+            <a:fillRect/>
+          </a:stretch>
+        </p:blipFill>
+        <p:spPr>
+          <a:xfrm>
+            <a:off x="663764" y="4446424"/>
+            <a:ext cx="174433" cy="174433"/>
+          </a:xfrm>
+          <a:prstGeom prst="rect">
+            <a:avLst/>
+          </a:prstGeom>
+        </p:spPr>
+      </p:pic>
+      <p:pic>
+        <p:nvPicPr>
+          <p:cNvPr id="22" name="Graphic 10" descr="Checkmark">
+            <a:extLst>
+              <a:ext uri="{FF2B5EF4-FFF2-40B4-BE49-F238E27FC236}">
+                <a16:creationId xmlns:a16="http://schemas.microsoft.com/office/drawing/2014/main" id="{C75EF85F-9F71-4810-834A-003176C25356}"/>
+              </a:ext>
+            </a:extLst>
+          </p:cNvPr>
+          <p:cNvPicPr>
+            <a:picLocks noChangeAspect="1"/>
+          </p:cNvPicPr>
+          <p:nvPr/>
+        </p:nvPicPr>
+        <p:blipFill>
+          <a:blip r:embed="rId3">
+            <a:extLst>
+              <a:ext uri="{96DAC541-7B7A-43D3-8B79-37D633B846F1}">
+                <asvg:svgBlip xmlns:asvg="http://schemas.microsoft.com/office/drawing/2016/SVG/main" r:embed="rId4"/>
+              </a:ext>
+            </a:extLst>
+          </a:blip>
+          <a:stretch>
+            <a:fillRect/>
+          </a:stretch>
+        </p:blipFill>
+        <p:spPr>
+          <a:xfrm>
+            <a:off x="664352" y="4681263"/>
+            <a:ext cx="174433" cy="174433"/>
+          </a:xfrm>
+          <a:prstGeom prst="rect">
+            <a:avLst/>
+          </a:prstGeom>
+        </p:spPr>
+      </p:pic>
+      <p:pic>
+        <p:nvPicPr>
+          <p:cNvPr id="23" name="Graphic 16" descr="Close">
+            <a:extLst>
+              <a:ext uri="{FF2B5EF4-FFF2-40B4-BE49-F238E27FC236}">
+                <a16:creationId xmlns:a16="http://schemas.microsoft.com/office/drawing/2014/main" id="{90BA7015-990F-4CBC-A01E-A4932079BB4A}"/>
+              </a:ext>
+            </a:extLst>
+          </p:cNvPr>
+          <p:cNvPicPr>
+            <a:picLocks noChangeAspect="1"/>
+          </p:cNvPicPr>
+          <p:nvPr/>
+        </p:nvPicPr>
+        <p:blipFill>
+          <a:blip r:embed="rId5">
+            <a:extLst>
+              <a:ext uri="{96DAC541-7B7A-43D3-8B79-37D633B846F1}">
+                <asvg:svgBlip xmlns:asvg="http://schemas.microsoft.com/office/drawing/2016/SVG/main" r:embed="rId6"/>
+              </a:ext>
+            </a:extLst>
+          </a:blip>
+          <a:stretch>
+            <a:fillRect/>
+          </a:stretch>
+        </p:blipFill>
+        <p:spPr>
+          <a:xfrm>
+            <a:off x="664352" y="4924455"/>
+            <a:ext cx="174433" cy="174433"/>
+          </a:xfrm>
+          <a:prstGeom prst="rect">
+            <a:avLst/>
+          </a:prstGeom>
+        </p:spPr>
+      </p:pic>
+      <p:pic>
+        <p:nvPicPr>
+          <p:cNvPr id="24" name="Graphic 10" descr="Checkmark">
+            <a:extLst>
+              <a:ext uri="{FF2B5EF4-FFF2-40B4-BE49-F238E27FC236}">
+                <a16:creationId xmlns:a16="http://schemas.microsoft.com/office/drawing/2014/main" id="{BEC93959-D7EA-4AF3-A223-C6B569A76B77}"/>
+              </a:ext>
+            </a:extLst>
+          </p:cNvPr>
+          <p:cNvPicPr>
+            <a:picLocks noChangeAspect="1"/>
+          </p:cNvPicPr>
+          <p:nvPr/>
+        </p:nvPicPr>
+        <p:blipFill>
+          <a:blip r:embed="rId3">
+            <a:extLst>
+              <a:ext uri="{96DAC541-7B7A-43D3-8B79-37D633B846F1}">
+                <asvg:svgBlip xmlns:asvg="http://schemas.microsoft.com/office/drawing/2016/SVG/main" r:embed="rId4"/>
+              </a:ext>
+            </a:extLst>
+          </a:blip>
+          <a:stretch>
+            <a:fillRect/>
+          </a:stretch>
+        </p:blipFill>
+        <p:spPr>
+          <a:xfrm>
+            <a:off x="664352" y="5412845"/>
+            <a:ext cx="174433" cy="174433"/>
+          </a:xfrm>
+          <a:prstGeom prst="rect">
+            <a:avLst/>
+          </a:prstGeom>
+        </p:spPr>
+      </p:pic>
+      <p:pic>
+        <p:nvPicPr>
+          <p:cNvPr id="25" name="Graphic 10" descr="Checkmark">
+            <a:extLst>
+              <a:ext uri="{FF2B5EF4-FFF2-40B4-BE49-F238E27FC236}">
+                <a16:creationId xmlns:a16="http://schemas.microsoft.com/office/drawing/2014/main" id="{7A04F83A-F884-47D0-A795-F2DF58A10721}"/>
+              </a:ext>
+            </a:extLst>
+          </p:cNvPr>
+          <p:cNvPicPr>
+            <a:picLocks noChangeAspect="1"/>
+          </p:cNvPicPr>
+          <p:nvPr/>
+        </p:nvPicPr>
+        <p:blipFill>
+          <a:blip r:embed="rId3">
+            <a:extLst>
+              <a:ext uri="{96DAC541-7B7A-43D3-8B79-37D633B846F1}">
+                <asvg:svgBlip xmlns:asvg="http://schemas.microsoft.com/office/drawing/2016/SVG/main" r:embed="rId4"/>
+              </a:ext>
+            </a:extLst>
+          </a:blip>
+          <a:stretch>
+            <a:fillRect/>
+          </a:stretch>
+        </p:blipFill>
+        <p:spPr>
+          <a:xfrm>
+            <a:off x="664352" y="5657194"/>
+            <a:ext cx="174433" cy="174433"/>
+          </a:xfrm>
+          <a:prstGeom prst="rect">
+            <a:avLst/>
+          </a:prstGeom>
+        </p:spPr>
+      </p:pic>
+      <p:pic>
+        <p:nvPicPr>
+          <p:cNvPr id="26" name="Graphic 10" descr="Checkmark">
+            <a:extLst>
+              <a:ext uri="{FF2B5EF4-FFF2-40B4-BE49-F238E27FC236}">
+                <a16:creationId xmlns:a16="http://schemas.microsoft.com/office/drawing/2014/main" id="{FE3A6B05-A7B1-4ADF-A246-FAB2D6C57869}"/>
+              </a:ext>
+            </a:extLst>
+          </p:cNvPr>
+          <p:cNvPicPr>
+            <a:picLocks noChangeAspect="1"/>
+          </p:cNvPicPr>
+          <p:nvPr/>
+        </p:nvPicPr>
+        <p:blipFill>
+          <a:blip r:embed="rId3">
+            <a:extLst>
+              <a:ext uri="{96DAC541-7B7A-43D3-8B79-37D633B846F1}">
+                <asvg:svgBlip xmlns:asvg="http://schemas.microsoft.com/office/drawing/2016/SVG/main" r:embed="rId4"/>
+              </a:ext>
+            </a:extLst>
+          </a:blip>
+          <a:stretch>
+            <a:fillRect/>
+          </a:stretch>
+        </p:blipFill>
+        <p:spPr>
+          <a:xfrm>
+            <a:off x="664352" y="5904921"/>
+            <a:ext cx="174433" cy="174433"/>
+          </a:xfrm>
+          <a:prstGeom prst="rect">
+            <a:avLst/>
+          </a:prstGeom>
+        </p:spPr>
+      </p:pic>
+      <p:pic>
+        <p:nvPicPr>
+          <p:cNvPr id="27" name="Graphic 10" descr="Checkmark">
+            <a:extLst>
+              <a:ext uri="{FF2B5EF4-FFF2-40B4-BE49-F238E27FC236}">
+                <a16:creationId xmlns:a16="http://schemas.microsoft.com/office/drawing/2014/main" id="{654FB5C5-165A-44F2-B29A-1F99B4FD1052}"/>
+              </a:ext>
+            </a:extLst>
+          </p:cNvPr>
+          <p:cNvPicPr>
+            <a:picLocks noChangeAspect="1"/>
+          </p:cNvPicPr>
+          <p:nvPr/>
+        </p:nvPicPr>
+        <p:blipFill>
+          <a:blip r:embed="rId3">
+            <a:extLst>
+              <a:ext uri="{96DAC541-7B7A-43D3-8B79-37D633B846F1}">
+                <asvg:svgBlip xmlns:asvg="http://schemas.microsoft.com/office/drawing/2016/SVG/main" r:embed="rId4"/>
+              </a:ext>
+            </a:extLst>
+          </a:blip>
+          <a:stretch>
+            <a:fillRect/>
+          </a:stretch>
+        </p:blipFill>
+        <p:spPr>
+          <a:xfrm>
+            <a:off x="663763" y="6155429"/>
+            <a:ext cx="174433" cy="174433"/>
+          </a:xfrm>
+          <a:prstGeom prst="rect">
+            <a:avLst/>
+          </a:prstGeom>
+        </p:spPr>
+      </p:pic>
+      <p:pic>
+        <p:nvPicPr>
+          <p:cNvPr id="28" name="Graphic 10" descr="Checkmark">
+            <a:extLst>
+              <a:ext uri="{FF2B5EF4-FFF2-40B4-BE49-F238E27FC236}">
+                <a16:creationId xmlns:a16="http://schemas.microsoft.com/office/drawing/2014/main" id="{CD7E4122-F233-4607-935C-A61D286BFCF1}"/>
+              </a:ext>
+            </a:extLst>
+          </p:cNvPr>
+          <p:cNvPicPr>
+            <a:picLocks noChangeAspect="1"/>
+          </p:cNvPicPr>
+          <p:nvPr/>
+        </p:nvPicPr>
+        <p:blipFill>
+          <a:blip r:embed="rId3">
+            <a:extLst>
+              <a:ext uri="{96DAC541-7B7A-43D3-8B79-37D633B846F1}">
+                <asvg:svgBlip xmlns:asvg="http://schemas.microsoft.com/office/drawing/2016/SVG/main" r:embed="rId4"/>
+              </a:ext>
+            </a:extLst>
+          </a:blip>
+          <a:stretch>
+            <a:fillRect/>
+          </a:stretch>
+        </p:blipFill>
+        <p:spPr>
+          <a:xfrm>
+            <a:off x="5624260" y="1773521"/>
+            <a:ext cx="174433" cy="174433"/>
+          </a:xfrm>
+          <a:prstGeom prst="rect">
+            <a:avLst/>
+          </a:prstGeom>
+        </p:spPr>
+      </p:pic>
+      <p:pic>
+        <p:nvPicPr>
+          <p:cNvPr id="29" name="Graphic 10" descr="Checkmark">
+            <a:extLst>
+              <a:ext uri="{FF2B5EF4-FFF2-40B4-BE49-F238E27FC236}">
+                <a16:creationId xmlns:a16="http://schemas.microsoft.com/office/drawing/2014/main" id="{CE7B1BFB-887C-431E-8B0D-C4F48C7FF6E6}"/>
+              </a:ext>
+            </a:extLst>
+          </p:cNvPr>
+          <p:cNvPicPr>
+            <a:picLocks noChangeAspect="1"/>
+          </p:cNvPicPr>
+          <p:nvPr/>
+        </p:nvPicPr>
+        <p:blipFill>
+          <a:blip r:embed="rId3">
+            <a:extLst>
+              <a:ext uri="{96DAC541-7B7A-43D3-8B79-37D633B846F1}">
+                <asvg:svgBlip xmlns:asvg="http://schemas.microsoft.com/office/drawing/2016/SVG/main" r:embed="rId4"/>
+              </a:ext>
+            </a:extLst>
+          </a:blip>
+          <a:stretch>
+            <a:fillRect/>
+          </a:stretch>
+        </p:blipFill>
+        <p:spPr>
+          <a:xfrm>
+            <a:off x="5624260" y="2012346"/>
+            <a:ext cx="174433" cy="174433"/>
+          </a:xfrm>
+          <a:prstGeom prst="rect">
+            <a:avLst/>
+          </a:prstGeom>
+        </p:spPr>
+      </p:pic>
+      <p:pic>
+        <p:nvPicPr>
+          <p:cNvPr id="30" name="Graphic 10" descr="Checkmark">
+            <a:extLst>
+              <a:ext uri="{FF2B5EF4-FFF2-40B4-BE49-F238E27FC236}">
+                <a16:creationId xmlns:a16="http://schemas.microsoft.com/office/drawing/2014/main" id="{BA137357-EFFD-4BDB-844A-44F8E16E06E5}"/>
+              </a:ext>
+            </a:extLst>
+          </p:cNvPr>
+          <p:cNvPicPr>
+            <a:picLocks noChangeAspect="1"/>
+          </p:cNvPicPr>
+          <p:nvPr/>
+        </p:nvPicPr>
+        <p:blipFill>
+          <a:blip r:embed="rId3">
+            <a:extLst>
+              <a:ext uri="{96DAC541-7B7A-43D3-8B79-37D633B846F1}">
+                <asvg:svgBlip xmlns:asvg="http://schemas.microsoft.com/office/drawing/2016/SVG/main" r:embed="rId4"/>
+              </a:ext>
+            </a:extLst>
+          </a:blip>
+          <a:stretch>
+            <a:fillRect/>
+          </a:stretch>
+        </p:blipFill>
+        <p:spPr>
+          <a:xfrm>
+            <a:off x="5624260" y="2268729"/>
+            <a:ext cx="174433" cy="174433"/>
+          </a:xfrm>
+          <a:prstGeom prst="rect">
+            <a:avLst/>
+          </a:prstGeom>
+        </p:spPr>
+      </p:pic>
+      <p:pic>
+        <p:nvPicPr>
+          <p:cNvPr id="31" name="Graphic 10" descr="Checkmark">
+            <a:extLst>
+              <a:ext uri="{FF2B5EF4-FFF2-40B4-BE49-F238E27FC236}">
+                <a16:creationId xmlns:a16="http://schemas.microsoft.com/office/drawing/2014/main" id="{EFA53681-D8A2-4D44-B08E-28EDC253CECF}"/>
+              </a:ext>
+            </a:extLst>
+          </p:cNvPr>
+          <p:cNvPicPr>
+            <a:picLocks noChangeAspect="1"/>
+          </p:cNvPicPr>
+          <p:nvPr/>
+        </p:nvPicPr>
+        <p:blipFill>
+          <a:blip r:embed="rId3">
+            <a:extLst>
+              <a:ext uri="{96DAC541-7B7A-43D3-8B79-37D633B846F1}">
+                <asvg:svgBlip xmlns:asvg="http://schemas.microsoft.com/office/drawing/2016/SVG/main" r:embed="rId4"/>
+              </a:ext>
+            </a:extLst>
+          </a:blip>
+          <a:stretch>
+            <a:fillRect/>
+          </a:stretch>
+        </p:blipFill>
+        <p:spPr>
+          <a:xfrm>
+            <a:off x="5624259" y="2525112"/>
+            <a:ext cx="174433" cy="174433"/>
+          </a:xfrm>
+          <a:prstGeom prst="rect">
+            <a:avLst/>
+          </a:prstGeom>
+        </p:spPr>
+      </p:pic>
+      <p:pic>
+        <p:nvPicPr>
+          <p:cNvPr id="32" name="Graphic 10" descr="Checkmark">
+            <a:extLst>
+              <a:ext uri="{FF2B5EF4-FFF2-40B4-BE49-F238E27FC236}">
+                <a16:creationId xmlns:a16="http://schemas.microsoft.com/office/drawing/2014/main" id="{7157FAE1-2876-46C4-99FA-225AC1D260F7}"/>
+              </a:ext>
+            </a:extLst>
+          </p:cNvPr>
+          <p:cNvPicPr>
+            <a:picLocks noChangeAspect="1"/>
+          </p:cNvPicPr>
+          <p:nvPr/>
+        </p:nvPicPr>
+        <p:blipFill>
+          <a:blip r:embed="rId3">
+            <a:extLst>
+              <a:ext uri="{96DAC541-7B7A-43D3-8B79-37D633B846F1}">
+                <asvg:svgBlip xmlns:asvg="http://schemas.microsoft.com/office/drawing/2016/SVG/main" r:embed="rId4"/>
+              </a:ext>
+            </a:extLst>
+          </a:blip>
+          <a:stretch>
+            <a:fillRect/>
+          </a:stretch>
+        </p:blipFill>
+        <p:spPr>
+          <a:xfrm>
+            <a:off x="5624258" y="2786452"/>
+            <a:ext cx="174433" cy="174433"/>
+          </a:xfrm>
+          <a:prstGeom prst="rect">
+            <a:avLst/>
+          </a:prstGeom>
+        </p:spPr>
+      </p:pic>
+      <p:pic>
+        <p:nvPicPr>
+          <p:cNvPr id="33" name="Graphic 10" descr="Checkmark">
+            <a:extLst>
+              <a:ext uri="{FF2B5EF4-FFF2-40B4-BE49-F238E27FC236}">
+                <a16:creationId xmlns:a16="http://schemas.microsoft.com/office/drawing/2014/main" id="{A9D13521-BE1C-4135-B02D-591E44220A49}"/>
+              </a:ext>
+            </a:extLst>
+          </p:cNvPr>
+          <p:cNvPicPr>
+            <a:picLocks noChangeAspect="1"/>
+          </p:cNvPicPr>
+          <p:nvPr/>
+        </p:nvPicPr>
+        <p:blipFill>
+          <a:blip r:embed="rId3">
+            <a:extLst>
+              <a:ext uri="{96DAC541-7B7A-43D3-8B79-37D633B846F1}">
+                <asvg:svgBlip xmlns:asvg="http://schemas.microsoft.com/office/drawing/2016/SVG/main" r:embed="rId4"/>
+              </a:ext>
+            </a:extLst>
+          </a:blip>
+          <a:stretch>
+            <a:fillRect/>
+          </a:stretch>
+        </p:blipFill>
+        <p:spPr>
+          <a:xfrm>
+            <a:off x="5624260" y="3037878"/>
+            <a:ext cx="174433" cy="174433"/>
+          </a:xfrm>
+          <a:prstGeom prst="rect">
+            <a:avLst/>
+          </a:prstGeom>
+        </p:spPr>
+      </p:pic>
+      <p:pic>
+        <p:nvPicPr>
+          <p:cNvPr id="34" name="Graphic 10" descr="Checkmark">
+            <a:extLst>
+              <a:ext uri="{FF2B5EF4-FFF2-40B4-BE49-F238E27FC236}">
+                <a16:creationId xmlns:a16="http://schemas.microsoft.com/office/drawing/2014/main" id="{00E32F9C-056F-4A7E-A54F-D2F899958B40}"/>
+              </a:ext>
+            </a:extLst>
+          </p:cNvPr>
+          <p:cNvPicPr>
+            <a:picLocks noChangeAspect="1"/>
+          </p:cNvPicPr>
+          <p:nvPr/>
+        </p:nvPicPr>
+        <p:blipFill>
+          <a:blip r:embed="rId3">
+            <a:extLst>
+              <a:ext uri="{96DAC541-7B7A-43D3-8B79-37D633B846F1}">
+                <asvg:svgBlip xmlns:asvg="http://schemas.microsoft.com/office/drawing/2016/SVG/main" r:embed="rId4"/>
+              </a:ext>
+            </a:extLst>
+          </a:blip>
+          <a:stretch>
+            <a:fillRect/>
+          </a:stretch>
+        </p:blipFill>
+        <p:spPr>
+          <a:xfrm>
+            <a:off x="5624260" y="3254567"/>
+            <a:ext cx="174433" cy="174433"/>
+          </a:xfrm>
+          <a:prstGeom prst="rect">
+            <a:avLst/>
+          </a:prstGeom>
+        </p:spPr>
+      </p:pic>
+      <p:pic>
+        <p:nvPicPr>
+          <p:cNvPr id="35" name="Graphic 10" descr="Checkmark">
+            <a:extLst>
+              <a:ext uri="{FF2B5EF4-FFF2-40B4-BE49-F238E27FC236}">
+                <a16:creationId xmlns:a16="http://schemas.microsoft.com/office/drawing/2014/main" id="{FB847DB3-7742-41FC-B814-AAAC77F4B2AD}"/>
+              </a:ext>
+            </a:extLst>
+          </p:cNvPr>
+          <p:cNvPicPr>
+            <a:picLocks noChangeAspect="1"/>
+          </p:cNvPicPr>
+          <p:nvPr/>
+        </p:nvPicPr>
+        <p:blipFill>
+          <a:blip r:embed="rId3">
+            <a:extLst>
+              <a:ext uri="{96DAC541-7B7A-43D3-8B79-37D633B846F1}">
+                <asvg:svgBlip xmlns:asvg="http://schemas.microsoft.com/office/drawing/2016/SVG/main" r:embed="rId4"/>
+              </a:ext>
+            </a:extLst>
+          </a:blip>
+          <a:stretch>
+            <a:fillRect/>
+          </a:stretch>
+        </p:blipFill>
+        <p:spPr>
+          <a:xfrm>
+            <a:off x="5624260" y="3499507"/>
+            <a:ext cx="174433" cy="174433"/>
+          </a:xfrm>
+          <a:prstGeom prst="rect">
+            <a:avLst/>
+          </a:prstGeom>
+        </p:spPr>
+      </p:pic>
+      <p:pic>
+        <p:nvPicPr>
+          <p:cNvPr id="36" name="Graphic 10" descr="Checkmark">
+            <a:extLst>
+              <a:ext uri="{FF2B5EF4-FFF2-40B4-BE49-F238E27FC236}">
+                <a16:creationId xmlns:a16="http://schemas.microsoft.com/office/drawing/2014/main" id="{01E2C389-C69D-4718-B79E-C9261A4077BD}"/>
+              </a:ext>
+            </a:extLst>
+          </p:cNvPr>
+          <p:cNvPicPr>
+            <a:picLocks noChangeAspect="1"/>
+          </p:cNvPicPr>
+          <p:nvPr/>
+        </p:nvPicPr>
+        <p:blipFill>
+          <a:blip r:embed="rId3">
+            <a:extLst>
+              <a:ext uri="{96DAC541-7B7A-43D3-8B79-37D633B846F1}">
+                <asvg:svgBlip xmlns:asvg="http://schemas.microsoft.com/office/drawing/2016/SVG/main" r:embed="rId4"/>
+              </a:ext>
+            </a:extLst>
+          </a:blip>
+          <a:stretch>
+            <a:fillRect/>
+          </a:stretch>
+        </p:blipFill>
+        <p:spPr>
+          <a:xfrm>
+            <a:off x="5624260" y="3739123"/>
+            <a:ext cx="174433" cy="174433"/>
+          </a:xfrm>
+          <a:prstGeom prst="rect">
+            <a:avLst/>
+          </a:prstGeom>
+        </p:spPr>
+      </p:pic>
+      <p:pic>
+        <p:nvPicPr>
+          <p:cNvPr id="37" name="Graphic 10" descr="Checkmark">
+            <a:extLst>
+              <a:ext uri="{FF2B5EF4-FFF2-40B4-BE49-F238E27FC236}">
+                <a16:creationId xmlns:a16="http://schemas.microsoft.com/office/drawing/2014/main" id="{718889C9-7C5F-4858-BDC5-32AEC9BD2496}"/>
+              </a:ext>
+            </a:extLst>
+          </p:cNvPr>
+          <p:cNvPicPr>
+            <a:picLocks noChangeAspect="1"/>
+          </p:cNvPicPr>
+          <p:nvPr/>
+        </p:nvPicPr>
+        <p:blipFill>
+          <a:blip r:embed="rId3">
+            <a:extLst>
+              <a:ext uri="{96DAC541-7B7A-43D3-8B79-37D633B846F1}">
+                <asvg:svgBlip xmlns:asvg="http://schemas.microsoft.com/office/drawing/2016/SVG/main" r:embed="rId4"/>
+              </a:ext>
+            </a:extLst>
+          </a:blip>
+          <a:stretch>
+            <a:fillRect/>
+          </a:stretch>
+        </p:blipFill>
+        <p:spPr>
+          <a:xfrm>
+            <a:off x="5624260" y="3962202"/>
+            <a:ext cx="174433" cy="174433"/>
+          </a:xfrm>
+          <a:prstGeom prst="rect">
+            <a:avLst/>
+          </a:prstGeom>
+        </p:spPr>
+      </p:pic>
+      <p:pic>
+        <p:nvPicPr>
+          <p:cNvPr id="38" name="Graphic 10" descr="Checkmark">
+            <a:extLst>
+              <a:ext uri="{FF2B5EF4-FFF2-40B4-BE49-F238E27FC236}">
+                <a16:creationId xmlns:a16="http://schemas.microsoft.com/office/drawing/2014/main" id="{F0CE3312-229C-4738-AD5D-136C2C4017E7}"/>
+              </a:ext>
+            </a:extLst>
+          </p:cNvPr>
+          <p:cNvPicPr>
+            <a:picLocks noChangeAspect="1"/>
+          </p:cNvPicPr>
+          <p:nvPr/>
+        </p:nvPicPr>
+        <p:blipFill>
+          <a:blip r:embed="rId3">
+            <a:extLst>
+              <a:ext uri="{96DAC541-7B7A-43D3-8B79-37D633B846F1}">
+                <asvg:svgBlip xmlns:asvg="http://schemas.microsoft.com/office/drawing/2016/SVG/main" r:embed="rId4"/>
+              </a:ext>
+            </a:extLst>
+          </a:blip>
+          <a:stretch>
+            <a:fillRect/>
+          </a:stretch>
+        </p:blipFill>
+        <p:spPr>
+          <a:xfrm>
+            <a:off x="5624260" y="4206534"/>
+            <a:ext cx="174433" cy="174433"/>
+          </a:xfrm>
+          <a:prstGeom prst="rect">
+            <a:avLst/>
+          </a:prstGeom>
+        </p:spPr>
+      </p:pic>
+      <p:pic>
+        <p:nvPicPr>
+          <p:cNvPr id="39" name="Graphic 10" descr="Checkmark">
+            <a:extLst>
+              <a:ext uri="{FF2B5EF4-FFF2-40B4-BE49-F238E27FC236}">
+                <a16:creationId xmlns:a16="http://schemas.microsoft.com/office/drawing/2014/main" id="{D1BC2837-23B5-4C85-8EC3-86D7621E3F32}"/>
+              </a:ext>
+            </a:extLst>
+          </p:cNvPr>
+          <p:cNvPicPr>
+            <a:picLocks noChangeAspect="1"/>
+          </p:cNvPicPr>
+          <p:nvPr/>
+        </p:nvPicPr>
+        <p:blipFill>
+          <a:blip r:embed="rId3">
+            <a:extLst>
+              <a:ext uri="{96DAC541-7B7A-43D3-8B79-37D633B846F1}">
+                <asvg:svgBlip xmlns:asvg="http://schemas.microsoft.com/office/drawing/2016/SVG/main" r:embed="rId4"/>
+              </a:ext>
+            </a:extLst>
+          </a:blip>
+          <a:stretch>
+            <a:fillRect/>
+          </a:stretch>
+        </p:blipFill>
+        <p:spPr>
+          <a:xfrm>
+            <a:off x="5624260" y="4449435"/>
+            <a:ext cx="174433" cy="174433"/>
+          </a:xfrm>
+          <a:prstGeom prst="rect">
+            <a:avLst/>
+          </a:prstGeom>
+        </p:spPr>
+      </p:pic>
+      <p:pic>
+        <p:nvPicPr>
+          <p:cNvPr id="40" name="Graphic 10" descr="Checkmark">
+            <a:extLst>
+              <a:ext uri="{FF2B5EF4-FFF2-40B4-BE49-F238E27FC236}">
+                <a16:creationId xmlns:a16="http://schemas.microsoft.com/office/drawing/2014/main" id="{4AEC8C41-30AB-4198-942B-877F4D6B0AE5}"/>
+              </a:ext>
+            </a:extLst>
+          </p:cNvPr>
+          <p:cNvPicPr>
+            <a:picLocks noChangeAspect="1"/>
+          </p:cNvPicPr>
+          <p:nvPr/>
+        </p:nvPicPr>
+        <p:blipFill>
+          <a:blip r:embed="rId3">
+            <a:extLst>
+              <a:ext uri="{96DAC541-7B7A-43D3-8B79-37D633B846F1}">
+                <asvg:svgBlip xmlns:asvg="http://schemas.microsoft.com/office/drawing/2016/SVG/main" r:embed="rId4"/>
+              </a:ext>
+            </a:extLst>
+          </a:blip>
+          <a:stretch>
+            <a:fillRect/>
+          </a:stretch>
+        </p:blipFill>
+        <p:spPr>
+          <a:xfrm>
+            <a:off x="5624260" y="4701070"/>
+            <a:ext cx="174433" cy="174433"/>
+          </a:xfrm>
+          <a:prstGeom prst="rect">
+            <a:avLst/>
+          </a:prstGeom>
+        </p:spPr>
+      </p:pic>
+      <p:pic>
+        <p:nvPicPr>
+          <p:cNvPr id="41" name="Graphic 16" descr="Close">
+            <a:extLst>
+              <a:ext uri="{FF2B5EF4-FFF2-40B4-BE49-F238E27FC236}">
+                <a16:creationId xmlns:a16="http://schemas.microsoft.com/office/drawing/2014/main" id="{E1C95BBD-8C02-4478-89F7-D9F70C4D0EF3}"/>
+              </a:ext>
+            </a:extLst>
+          </p:cNvPr>
+          <p:cNvPicPr>
+            <a:picLocks noChangeAspect="1"/>
+          </p:cNvPicPr>
+          <p:nvPr/>
+        </p:nvPicPr>
+        <p:blipFill>
+          <a:blip r:embed="rId5">
+            <a:extLst>
+              <a:ext uri="{96DAC541-7B7A-43D3-8B79-37D633B846F1}">
+                <asvg:svgBlip xmlns:asvg="http://schemas.microsoft.com/office/drawing/2016/SVG/main" r:embed="rId6"/>
+              </a:ext>
+            </a:extLst>
+          </a:blip>
+          <a:stretch>
+            <a:fillRect/>
+          </a:stretch>
+        </p:blipFill>
+        <p:spPr>
+          <a:xfrm>
+            <a:off x="5624257" y="4924455"/>
+            <a:ext cx="174433" cy="174433"/>
+          </a:xfrm>
+          <a:prstGeom prst="rect">
+            <a:avLst/>
+          </a:prstGeom>
+        </p:spPr>
+      </p:pic>
+      <p:pic>
+        <p:nvPicPr>
+          <p:cNvPr id="42" name="Graphic 42" descr="Pause">
+            <a:extLst>
+              <a:ext uri="{FF2B5EF4-FFF2-40B4-BE49-F238E27FC236}">
+                <a16:creationId xmlns:a16="http://schemas.microsoft.com/office/drawing/2014/main" id="{6A48F04E-0DF1-467F-AF47-E663425996B6}"/>
+              </a:ext>
+            </a:extLst>
+          </p:cNvPr>
+          <p:cNvPicPr>
+            <a:picLocks noChangeAspect="1"/>
+          </p:cNvPicPr>
+          <p:nvPr/>
+        </p:nvPicPr>
+        <p:blipFill>
+          <a:blip r:embed="rId7">
+            <a:extLst>
+              <a:ext uri="{96DAC541-7B7A-43D3-8B79-37D633B846F1}">
+                <asvg:svgBlip xmlns:asvg="http://schemas.microsoft.com/office/drawing/2016/SVG/main" r:embed="rId8"/>
+              </a:ext>
+            </a:extLst>
+          </a:blip>
+          <a:stretch>
+            <a:fillRect/>
+          </a:stretch>
+        </p:blipFill>
+        <p:spPr>
+          <a:xfrm>
+            <a:off x="5624256" y="5185795"/>
+            <a:ext cx="174433" cy="174433"/>
+          </a:xfrm>
+          <a:prstGeom prst="rect">
+            <a:avLst/>
+          </a:prstGeom>
+        </p:spPr>
+      </p:pic>
+      <p:pic>
+        <p:nvPicPr>
+          <p:cNvPr id="43" name="Graphic 10" descr="Checkmark">
+            <a:extLst>
+              <a:ext uri="{FF2B5EF4-FFF2-40B4-BE49-F238E27FC236}">
+                <a16:creationId xmlns:a16="http://schemas.microsoft.com/office/drawing/2014/main" id="{D04E0F6D-B2FA-482C-AD37-BA7A6A231C71}"/>
+              </a:ext>
+            </a:extLst>
+          </p:cNvPr>
+          <p:cNvPicPr>
+            <a:picLocks noChangeAspect="1"/>
+          </p:cNvPicPr>
+          <p:nvPr/>
+        </p:nvPicPr>
+        <p:blipFill>
+          <a:blip r:embed="rId3">
+            <a:extLst>
+              <a:ext uri="{96DAC541-7B7A-43D3-8B79-37D633B846F1}">
+                <asvg:svgBlip xmlns:asvg="http://schemas.microsoft.com/office/drawing/2016/SVG/main" r:embed="rId4"/>
+              </a:ext>
+            </a:extLst>
+          </a:blip>
+          <a:stretch>
+            <a:fillRect/>
+          </a:stretch>
+        </p:blipFill>
+        <p:spPr>
+          <a:xfrm>
+            <a:off x="5624255" y="5661661"/>
+            <a:ext cx="174433" cy="174433"/>
+          </a:xfrm>
+          <a:prstGeom prst="rect">
+            <a:avLst/>
+          </a:prstGeom>
+        </p:spPr>
+      </p:pic>
+      <p:pic>
+        <p:nvPicPr>
+          <p:cNvPr id="44" name="Graphic 10" descr="Checkmark">
+            <a:extLst>
+              <a:ext uri="{FF2B5EF4-FFF2-40B4-BE49-F238E27FC236}">
+                <a16:creationId xmlns:a16="http://schemas.microsoft.com/office/drawing/2014/main" id="{B04ECE60-36E1-4446-824B-844DAA0AF66A}"/>
+              </a:ext>
+            </a:extLst>
+          </p:cNvPr>
+          <p:cNvPicPr>
+            <a:picLocks noChangeAspect="1"/>
+          </p:cNvPicPr>
+          <p:nvPr/>
+        </p:nvPicPr>
+        <p:blipFill>
+          <a:blip r:embed="rId3">
+            <a:extLst>
+              <a:ext uri="{96DAC541-7B7A-43D3-8B79-37D633B846F1}">
+                <asvg:svgBlip xmlns:asvg="http://schemas.microsoft.com/office/drawing/2016/SVG/main" r:embed="rId4"/>
+              </a:ext>
+            </a:extLst>
+          </a:blip>
+          <a:stretch>
+            <a:fillRect/>
+          </a:stretch>
+        </p:blipFill>
+        <p:spPr>
+          <a:xfrm>
+            <a:off x="5624260" y="5922677"/>
+            <a:ext cx="174433" cy="174433"/>
+          </a:xfrm>
+          <a:prstGeom prst="rect">
+            <a:avLst/>
+          </a:prstGeom>
+        </p:spPr>
+      </p:pic>
     </p:spTree>
     <p:extLst>
       <p:ext uri="{BB962C8B-B14F-4D97-AF65-F5344CB8AC3E}">
@@ -8981,6 +10246,1266 @@
             <a:off x="6096000" y="365125"/>
             <a:ext cx="4594352" cy="1130409"/>
           </a:xfrm>
+        </p:spPr>
+      </p:pic>
+      <p:pic>
+        <p:nvPicPr>
+          <p:cNvPr id="7" name="Graphic 10" descr="Checkmark">
+            <a:extLst>
+              <a:ext uri="{FF2B5EF4-FFF2-40B4-BE49-F238E27FC236}">
+                <a16:creationId xmlns:a16="http://schemas.microsoft.com/office/drawing/2014/main" id="{33D9C5E1-FC9E-42A4-B16B-774C6B2AF803}"/>
+              </a:ext>
+            </a:extLst>
+          </p:cNvPr>
+          <p:cNvPicPr>
+            <a:picLocks noChangeAspect="1"/>
+          </p:cNvPicPr>
+          <p:nvPr/>
+        </p:nvPicPr>
+        <p:blipFill>
+          <a:blip r:embed="rId3">
+            <a:extLst>
+              <a:ext uri="{96DAC541-7B7A-43D3-8B79-37D633B846F1}">
+                <asvg:svgBlip xmlns:asvg="http://schemas.microsoft.com/office/drawing/2016/SVG/main" r:embed="rId4"/>
+              </a:ext>
+            </a:extLst>
+          </a:blip>
+          <a:stretch>
+            <a:fillRect/>
+          </a:stretch>
+        </p:blipFill>
+        <p:spPr>
+          <a:xfrm>
+            <a:off x="663767" y="1773522"/>
+            <a:ext cx="174433" cy="174433"/>
+          </a:xfrm>
+          <a:prstGeom prst="rect">
+            <a:avLst/>
+          </a:prstGeom>
+        </p:spPr>
+      </p:pic>
+      <p:pic>
+        <p:nvPicPr>
+          <p:cNvPr id="10" name="Graphic 10" descr="Checkmark">
+            <a:extLst>
+              <a:ext uri="{FF2B5EF4-FFF2-40B4-BE49-F238E27FC236}">
+                <a16:creationId xmlns:a16="http://schemas.microsoft.com/office/drawing/2014/main" id="{C0D0696A-D14E-49A8-9EB5-6052C1897750}"/>
+              </a:ext>
+            </a:extLst>
+          </p:cNvPr>
+          <p:cNvPicPr>
+            <a:picLocks noChangeAspect="1"/>
+          </p:cNvPicPr>
+          <p:nvPr/>
+        </p:nvPicPr>
+        <p:blipFill>
+          <a:blip r:embed="rId3">
+            <a:extLst>
+              <a:ext uri="{96DAC541-7B7A-43D3-8B79-37D633B846F1}">
+                <asvg:svgBlip xmlns:asvg="http://schemas.microsoft.com/office/drawing/2016/SVG/main" r:embed="rId4"/>
+              </a:ext>
+            </a:extLst>
+          </a:blip>
+          <a:stretch>
+            <a:fillRect/>
+          </a:stretch>
+        </p:blipFill>
+        <p:spPr>
+          <a:xfrm>
+            <a:off x="663766" y="2013138"/>
+            <a:ext cx="174433" cy="174433"/>
+          </a:xfrm>
+          <a:prstGeom prst="rect">
+            <a:avLst/>
+          </a:prstGeom>
+        </p:spPr>
+      </p:pic>
+      <p:pic>
+        <p:nvPicPr>
+          <p:cNvPr id="11" name="Graphic 10" descr="Checkmark">
+            <a:extLst>
+              <a:ext uri="{FF2B5EF4-FFF2-40B4-BE49-F238E27FC236}">
+                <a16:creationId xmlns:a16="http://schemas.microsoft.com/office/drawing/2014/main" id="{327A30CB-4E2D-481C-BEDA-7AAFB092FCD2}"/>
+              </a:ext>
+            </a:extLst>
+          </p:cNvPr>
+          <p:cNvPicPr>
+            <a:picLocks noChangeAspect="1"/>
+          </p:cNvPicPr>
+          <p:nvPr/>
+        </p:nvPicPr>
+        <p:blipFill>
+          <a:blip r:embed="rId3">
+            <a:extLst>
+              <a:ext uri="{96DAC541-7B7A-43D3-8B79-37D633B846F1}">
+                <asvg:svgBlip xmlns:asvg="http://schemas.microsoft.com/office/drawing/2016/SVG/main" r:embed="rId4"/>
+              </a:ext>
+            </a:extLst>
+          </a:blip>
+          <a:stretch>
+            <a:fillRect/>
+          </a:stretch>
+        </p:blipFill>
+        <p:spPr>
+          <a:xfrm>
+            <a:off x="663767" y="2268822"/>
+            <a:ext cx="174433" cy="174433"/>
+          </a:xfrm>
+          <a:prstGeom prst="rect">
+            <a:avLst/>
+          </a:prstGeom>
+        </p:spPr>
+      </p:pic>
+      <p:pic>
+        <p:nvPicPr>
+          <p:cNvPr id="12" name="Graphic 10" descr="Checkmark">
+            <a:extLst>
+              <a:ext uri="{FF2B5EF4-FFF2-40B4-BE49-F238E27FC236}">
+                <a16:creationId xmlns:a16="http://schemas.microsoft.com/office/drawing/2014/main" id="{F9F8272F-71BD-4A76-BF55-B702564ABDEA}"/>
+              </a:ext>
+            </a:extLst>
+          </p:cNvPr>
+          <p:cNvPicPr>
+            <a:picLocks noChangeAspect="1"/>
+          </p:cNvPicPr>
+          <p:nvPr/>
+        </p:nvPicPr>
+        <p:blipFill>
+          <a:blip r:embed="rId3">
+            <a:extLst>
+              <a:ext uri="{96DAC541-7B7A-43D3-8B79-37D633B846F1}">
+                <asvg:svgBlip xmlns:asvg="http://schemas.microsoft.com/office/drawing/2016/SVG/main" r:embed="rId4"/>
+              </a:ext>
+            </a:extLst>
+          </a:blip>
+          <a:stretch>
+            <a:fillRect/>
+          </a:stretch>
+        </p:blipFill>
+        <p:spPr>
+          <a:xfrm>
+            <a:off x="663767" y="2508438"/>
+            <a:ext cx="174433" cy="174433"/>
+          </a:xfrm>
+          <a:prstGeom prst="rect">
+            <a:avLst/>
+          </a:prstGeom>
+        </p:spPr>
+      </p:pic>
+      <p:pic>
+        <p:nvPicPr>
+          <p:cNvPr id="13" name="Graphic 10" descr="Checkmark">
+            <a:extLst>
+              <a:ext uri="{FF2B5EF4-FFF2-40B4-BE49-F238E27FC236}">
+                <a16:creationId xmlns:a16="http://schemas.microsoft.com/office/drawing/2014/main" id="{3CE102F7-CBEE-45F6-A4E6-4E34D5E58299}"/>
+              </a:ext>
+            </a:extLst>
+          </p:cNvPr>
+          <p:cNvPicPr>
+            <a:picLocks noChangeAspect="1"/>
+          </p:cNvPicPr>
+          <p:nvPr/>
+        </p:nvPicPr>
+        <p:blipFill>
+          <a:blip r:embed="rId3">
+            <a:extLst>
+              <a:ext uri="{96DAC541-7B7A-43D3-8B79-37D633B846F1}">
+                <asvg:svgBlip xmlns:asvg="http://schemas.microsoft.com/office/drawing/2016/SVG/main" r:embed="rId4"/>
+              </a:ext>
+            </a:extLst>
+          </a:blip>
+          <a:stretch>
+            <a:fillRect/>
+          </a:stretch>
+        </p:blipFill>
+        <p:spPr>
+          <a:xfrm>
+            <a:off x="663767" y="2748054"/>
+            <a:ext cx="174433" cy="174433"/>
+          </a:xfrm>
+          <a:prstGeom prst="rect">
+            <a:avLst/>
+          </a:prstGeom>
+        </p:spPr>
+      </p:pic>
+      <p:pic>
+        <p:nvPicPr>
+          <p:cNvPr id="14" name="Graphic 16" descr="Close">
+            <a:extLst>
+              <a:ext uri="{FF2B5EF4-FFF2-40B4-BE49-F238E27FC236}">
+                <a16:creationId xmlns:a16="http://schemas.microsoft.com/office/drawing/2014/main" id="{4E7E007A-4FAE-4788-A96A-D5E3BDAEC600}"/>
+              </a:ext>
+            </a:extLst>
+          </p:cNvPr>
+          <p:cNvPicPr>
+            <a:picLocks noChangeAspect="1"/>
+          </p:cNvPicPr>
+          <p:nvPr/>
+        </p:nvPicPr>
+        <p:blipFill>
+          <a:blip r:embed="rId5">
+            <a:extLst>
+              <a:ext uri="{96DAC541-7B7A-43D3-8B79-37D633B846F1}">
+                <asvg:svgBlip xmlns:asvg="http://schemas.microsoft.com/office/drawing/2016/SVG/main" r:embed="rId6"/>
+              </a:ext>
+            </a:extLst>
+          </a:blip>
+          <a:stretch>
+            <a:fillRect/>
+          </a:stretch>
+        </p:blipFill>
+        <p:spPr>
+          <a:xfrm>
+            <a:off x="664352" y="2987670"/>
+            <a:ext cx="174433" cy="174433"/>
+          </a:xfrm>
+          <a:prstGeom prst="rect">
+            <a:avLst/>
+          </a:prstGeom>
+        </p:spPr>
+      </p:pic>
+      <p:pic>
+        <p:nvPicPr>
+          <p:cNvPr id="15" name="Graphic 16" descr="Close">
+            <a:extLst>
+              <a:ext uri="{FF2B5EF4-FFF2-40B4-BE49-F238E27FC236}">
+                <a16:creationId xmlns:a16="http://schemas.microsoft.com/office/drawing/2014/main" id="{3A13A057-CBD6-45FC-9A26-924C26086668}"/>
+              </a:ext>
+            </a:extLst>
+          </p:cNvPr>
+          <p:cNvPicPr>
+            <a:picLocks noChangeAspect="1"/>
+          </p:cNvPicPr>
+          <p:nvPr/>
+        </p:nvPicPr>
+        <p:blipFill>
+          <a:blip r:embed="rId5">
+            <a:extLst>
+              <a:ext uri="{96DAC541-7B7A-43D3-8B79-37D633B846F1}">
+                <asvg:svgBlip xmlns:asvg="http://schemas.microsoft.com/office/drawing/2016/SVG/main" r:embed="rId6"/>
+              </a:ext>
+            </a:extLst>
+          </a:blip>
+          <a:stretch>
+            <a:fillRect/>
+          </a:stretch>
+        </p:blipFill>
+        <p:spPr>
+          <a:xfrm>
+            <a:off x="664352" y="3227286"/>
+            <a:ext cx="174433" cy="174433"/>
+          </a:xfrm>
+          <a:prstGeom prst="rect">
+            <a:avLst/>
+          </a:prstGeom>
+        </p:spPr>
+      </p:pic>
+      <p:pic>
+        <p:nvPicPr>
+          <p:cNvPr id="16" name="Graphic 10" descr="Checkmark">
+            <a:extLst>
+              <a:ext uri="{FF2B5EF4-FFF2-40B4-BE49-F238E27FC236}">
+                <a16:creationId xmlns:a16="http://schemas.microsoft.com/office/drawing/2014/main" id="{9CFBA8F7-87B7-4AFF-B8C0-03921C26B05D}"/>
+              </a:ext>
+            </a:extLst>
+          </p:cNvPr>
+          <p:cNvPicPr>
+            <a:picLocks noChangeAspect="1"/>
+          </p:cNvPicPr>
+          <p:nvPr/>
+        </p:nvPicPr>
+        <p:blipFill>
+          <a:blip r:embed="rId3">
+            <a:extLst>
+              <a:ext uri="{96DAC541-7B7A-43D3-8B79-37D633B846F1}">
+                <asvg:svgBlip xmlns:asvg="http://schemas.microsoft.com/office/drawing/2016/SVG/main" r:embed="rId4"/>
+              </a:ext>
+            </a:extLst>
+          </a:blip>
+          <a:stretch>
+            <a:fillRect/>
+          </a:stretch>
+        </p:blipFill>
+        <p:spPr>
+          <a:xfrm>
+            <a:off x="663767" y="3473247"/>
+            <a:ext cx="174433" cy="174433"/>
+          </a:xfrm>
+          <a:prstGeom prst="rect">
+            <a:avLst/>
+          </a:prstGeom>
+        </p:spPr>
+      </p:pic>
+      <p:pic>
+        <p:nvPicPr>
+          <p:cNvPr id="18" name="Graphic 10" descr="Checkmark">
+            <a:extLst>
+              <a:ext uri="{FF2B5EF4-FFF2-40B4-BE49-F238E27FC236}">
+                <a16:creationId xmlns:a16="http://schemas.microsoft.com/office/drawing/2014/main" id="{BC6E1D2C-336F-4708-BB71-BAB5F0860F24}"/>
+              </a:ext>
+            </a:extLst>
+          </p:cNvPr>
+          <p:cNvPicPr>
+            <a:picLocks noChangeAspect="1"/>
+          </p:cNvPicPr>
+          <p:nvPr/>
+        </p:nvPicPr>
+        <p:blipFill>
+          <a:blip r:embed="rId3">
+            <a:extLst>
+              <a:ext uri="{96DAC541-7B7A-43D3-8B79-37D633B846F1}">
+                <asvg:svgBlip xmlns:asvg="http://schemas.microsoft.com/office/drawing/2016/SVG/main" r:embed="rId4"/>
+              </a:ext>
+            </a:extLst>
+          </a:blip>
+          <a:stretch>
+            <a:fillRect/>
+          </a:stretch>
+        </p:blipFill>
+        <p:spPr>
+          <a:xfrm>
+            <a:off x="664352" y="3962202"/>
+            <a:ext cx="174433" cy="174433"/>
+          </a:xfrm>
+          <a:prstGeom prst="rect">
+            <a:avLst/>
+          </a:prstGeom>
+        </p:spPr>
+      </p:pic>
+      <p:pic>
+        <p:nvPicPr>
+          <p:cNvPr id="19" name="Graphic 10" descr="Checkmark">
+            <a:extLst>
+              <a:ext uri="{FF2B5EF4-FFF2-40B4-BE49-F238E27FC236}">
+                <a16:creationId xmlns:a16="http://schemas.microsoft.com/office/drawing/2014/main" id="{79034766-4D92-4C9A-855E-35757CE647C7}"/>
+              </a:ext>
+            </a:extLst>
+          </p:cNvPr>
+          <p:cNvPicPr>
+            <a:picLocks noChangeAspect="1"/>
+          </p:cNvPicPr>
+          <p:nvPr/>
+        </p:nvPicPr>
+        <p:blipFill>
+          <a:blip r:embed="rId3">
+            <a:extLst>
+              <a:ext uri="{96DAC541-7B7A-43D3-8B79-37D633B846F1}">
+                <asvg:svgBlip xmlns:asvg="http://schemas.microsoft.com/office/drawing/2016/SVG/main" r:embed="rId4"/>
+              </a:ext>
+            </a:extLst>
+          </a:blip>
+          <a:stretch>
+            <a:fillRect/>
+          </a:stretch>
+        </p:blipFill>
+        <p:spPr>
+          <a:xfrm>
+            <a:off x="664352" y="3716241"/>
+            <a:ext cx="174433" cy="174433"/>
+          </a:xfrm>
+          <a:prstGeom prst="rect">
+            <a:avLst/>
+          </a:prstGeom>
+        </p:spPr>
+      </p:pic>
+      <p:pic>
+        <p:nvPicPr>
+          <p:cNvPr id="20" name="Graphic 10" descr="Checkmark">
+            <a:extLst>
+              <a:ext uri="{FF2B5EF4-FFF2-40B4-BE49-F238E27FC236}">
+                <a16:creationId xmlns:a16="http://schemas.microsoft.com/office/drawing/2014/main" id="{9C6530F9-934D-4547-99EB-BF4E4310F101}"/>
+              </a:ext>
+            </a:extLst>
+          </p:cNvPr>
+          <p:cNvPicPr>
+            <a:picLocks noChangeAspect="1"/>
+          </p:cNvPicPr>
+          <p:nvPr/>
+        </p:nvPicPr>
+        <p:blipFill>
+          <a:blip r:embed="rId3">
+            <a:extLst>
+              <a:ext uri="{96DAC541-7B7A-43D3-8B79-37D633B846F1}">
+                <asvg:svgBlip xmlns:asvg="http://schemas.microsoft.com/office/drawing/2016/SVG/main" r:embed="rId4"/>
+              </a:ext>
+            </a:extLst>
+          </a:blip>
+          <a:stretch>
+            <a:fillRect/>
+          </a:stretch>
+        </p:blipFill>
+        <p:spPr>
+          <a:xfrm>
+            <a:off x="663765" y="4198851"/>
+            <a:ext cx="174433" cy="174433"/>
+          </a:xfrm>
+          <a:prstGeom prst="rect">
+            <a:avLst/>
+          </a:prstGeom>
+        </p:spPr>
+      </p:pic>
+      <p:pic>
+        <p:nvPicPr>
+          <p:cNvPr id="21" name="Graphic 10" descr="Checkmark">
+            <a:extLst>
+              <a:ext uri="{FF2B5EF4-FFF2-40B4-BE49-F238E27FC236}">
+                <a16:creationId xmlns:a16="http://schemas.microsoft.com/office/drawing/2014/main" id="{71AF31BE-59F9-4C92-B917-B3F5C51FE848}"/>
+              </a:ext>
+            </a:extLst>
+          </p:cNvPr>
+          <p:cNvPicPr>
+            <a:picLocks noChangeAspect="1"/>
+          </p:cNvPicPr>
+          <p:nvPr/>
+        </p:nvPicPr>
+        <p:blipFill>
+          <a:blip r:embed="rId3">
+            <a:extLst>
+              <a:ext uri="{96DAC541-7B7A-43D3-8B79-37D633B846F1}">
+                <asvg:svgBlip xmlns:asvg="http://schemas.microsoft.com/office/drawing/2016/SVG/main" r:embed="rId4"/>
+              </a:ext>
+            </a:extLst>
+          </a:blip>
+          <a:stretch>
+            <a:fillRect/>
+          </a:stretch>
+        </p:blipFill>
+        <p:spPr>
+          <a:xfrm>
+            <a:off x="663764" y="4446424"/>
+            <a:ext cx="174433" cy="174433"/>
+          </a:xfrm>
+          <a:prstGeom prst="rect">
+            <a:avLst/>
+          </a:prstGeom>
+        </p:spPr>
+      </p:pic>
+      <p:pic>
+        <p:nvPicPr>
+          <p:cNvPr id="22" name="Graphic 10" descr="Checkmark">
+            <a:extLst>
+              <a:ext uri="{FF2B5EF4-FFF2-40B4-BE49-F238E27FC236}">
+                <a16:creationId xmlns:a16="http://schemas.microsoft.com/office/drawing/2014/main" id="{DAECBFAB-1840-4784-A856-A808E6FE0243}"/>
+              </a:ext>
+            </a:extLst>
+          </p:cNvPr>
+          <p:cNvPicPr>
+            <a:picLocks noChangeAspect="1"/>
+          </p:cNvPicPr>
+          <p:nvPr/>
+        </p:nvPicPr>
+        <p:blipFill>
+          <a:blip r:embed="rId3">
+            <a:extLst>
+              <a:ext uri="{96DAC541-7B7A-43D3-8B79-37D633B846F1}">
+                <asvg:svgBlip xmlns:asvg="http://schemas.microsoft.com/office/drawing/2016/SVG/main" r:embed="rId4"/>
+              </a:ext>
+            </a:extLst>
+          </a:blip>
+          <a:stretch>
+            <a:fillRect/>
+          </a:stretch>
+        </p:blipFill>
+        <p:spPr>
+          <a:xfrm>
+            <a:off x="664352" y="4681263"/>
+            <a:ext cx="174433" cy="174433"/>
+          </a:xfrm>
+          <a:prstGeom prst="rect">
+            <a:avLst/>
+          </a:prstGeom>
+        </p:spPr>
+      </p:pic>
+      <p:pic>
+        <p:nvPicPr>
+          <p:cNvPr id="24" name="Graphic 10" descr="Checkmark">
+            <a:extLst>
+              <a:ext uri="{FF2B5EF4-FFF2-40B4-BE49-F238E27FC236}">
+                <a16:creationId xmlns:a16="http://schemas.microsoft.com/office/drawing/2014/main" id="{FD10B988-9A0D-49E9-A4EB-24529683440C}"/>
+              </a:ext>
+            </a:extLst>
+          </p:cNvPr>
+          <p:cNvPicPr>
+            <a:picLocks noChangeAspect="1"/>
+          </p:cNvPicPr>
+          <p:nvPr/>
+        </p:nvPicPr>
+        <p:blipFill>
+          <a:blip r:embed="rId3">
+            <a:extLst>
+              <a:ext uri="{96DAC541-7B7A-43D3-8B79-37D633B846F1}">
+                <asvg:svgBlip xmlns:asvg="http://schemas.microsoft.com/office/drawing/2016/SVG/main" r:embed="rId4"/>
+              </a:ext>
+            </a:extLst>
+          </a:blip>
+          <a:stretch>
+            <a:fillRect/>
+          </a:stretch>
+        </p:blipFill>
+        <p:spPr>
+          <a:xfrm>
+            <a:off x="664352" y="4932001"/>
+            <a:ext cx="174433" cy="174433"/>
+          </a:xfrm>
+          <a:prstGeom prst="rect">
+            <a:avLst/>
+          </a:prstGeom>
+        </p:spPr>
+      </p:pic>
+      <p:pic>
+        <p:nvPicPr>
+          <p:cNvPr id="25" name="Graphic 42" descr="Pause">
+            <a:extLst>
+              <a:ext uri="{FF2B5EF4-FFF2-40B4-BE49-F238E27FC236}">
+                <a16:creationId xmlns:a16="http://schemas.microsoft.com/office/drawing/2014/main" id="{D58441B1-7FE9-4514-9662-DD85876EEEEC}"/>
+              </a:ext>
+            </a:extLst>
+          </p:cNvPr>
+          <p:cNvPicPr>
+            <a:picLocks noChangeAspect="1"/>
+          </p:cNvPicPr>
+          <p:nvPr/>
+        </p:nvPicPr>
+        <p:blipFill>
+          <a:blip r:embed="rId7">
+            <a:extLst>
+              <a:ext uri="{96DAC541-7B7A-43D3-8B79-37D633B846F1}">
+                <asvg:svgBlip xmlns:asvg="http://schemas.microsoft.com/office/drawing/2016/SVG/main" r:embed="rId8"/>
+              </a:ext>
+            </a:extLst>
+          </a:blip>
+          <a:stretch>
+            <a:fillRect/>
+          </a:stretch>
+        </p:blipFill>
+        <p:spPr>
+          <a:xfrm>
+            <a:off x="5624256" y="5185795"/>
+            <a:ext cx="174433" cy="174433"/>
+          </a:xfrm>
+          <a:prstGeom prst="rect">
+            <a:avLst/>
+          </a:prstGeom>
+        </p:spPr>
+      </p:pic>
+      <p:pic>
+        <p:nvPicPr>
+          <p:cNvPr id="26" name="Graphic 42" descr="Pause">
+            <a:extLst>
+              <a:ext uri="{FF2B5EF4-FFF2-40B4-BE49-F238E27FC236}">
+                <a16:creationId xmlns:a16="http://schemas.microsoft.com/office/drawing/2014/main" id="{2AD3B02A-C835-4B0B-ABE2-C6703E06C1D0}"/>
+              </a:ext>
+            </a:extLst>
+          </p:cNvPr>
+          <p:cNvPicPr>
+            <a:picLocks noChangeAspect="1"/>
+          </p:cNvPicPr>
+          <p:nvPr/>
+        </p:nvPicPr>
+        <p:blipFill>
+          <a:blip r:embed="rId7">
+            <a:extLst>
+              <a:ext uri="{96DAC541-7B7A-43D3-8B79-37D633B846F1}">
+                <asvg:svgBlip xmlns:asvg="http://schemas.microsoft.com/office/drawing/2016/SVG/main" r:embed="rId8"/>
+              </a:ext>
+            </a:extLst>
+          </a:blip>
+          <a:stretch>
+            <a:fillRect/>
+          </a:stretch>
+        </p:blipFill>
+        <p:spPr>
+          <a:xfrm>
+            <a:off x="664352" y="5417989"/>
+            <a:ext cx="174433" cy="174433"/>
+          </a:xfrm>
+          <a:prstGeom prst="rect">
+            <a:avLst/>
+          </a:prstGeom>
+        </p:spPr>
+      </p:pic>
+      <p:pic>
+        <p:nvPicPr>
+          <p:cNvPr id="28" name="Graphic 16" descr="Close">
+            <a:extLst>
+              <a:ext uri="{FF2B5EF4-FFF2-40B4-BE49-F238E27FC236}">
+                <a16:creationId xmlns:a16="http://schemas.microsoft.com/office/drawing/2014/main" id="{B847C015-30AC-4B9C-85C7-77725F334D5A}"/>
+              </a:ext>
+            </a:extLst>
+          </p:cNvPr>
+          <p:cNvPicPr>
+            <a:picLocks noChangeAspect="1"/>
+          </p:cNvPicPr>
+          <p:nvPr/>
+        </p:nvPicPr>
+        <p:blipFill>
+          <a:blip r:embed="rId5">
+            <a:extLst>
+              <a:ext uri="{96DAC541-7B7A-43D3-8B79-37D633B846F1}">
+                <asvg:svgBlip xmlns:asvg="http://schemas.microsoft.com/office/drawing/2016/SVG/main" r:embed="rId6"/>
+              </a:ext>
+            </a:extLst>
+          </a:blip>
+          <a:stretch>
+            <a:fillRect/>
+          </a:stretch>
+        </p:blipFill>
+        <p:spPr>
+          <a:xfrm>
+            <a:off x="664352" y="5661094"/>
+            <a:ext cx="174433" cy="174433"/>
+          </a:xfrm>
+          <a:prstGeom prst="rect">
+            <a:avLst/>
+          </a:prstGeom>
+        </p:spPr>
+      </p:pic>
+      <p:pic>
+        <p:nvPicPr>
+          <p:cNvPr id="29" name="Graphic 16" descr="Close">
+            <a:extLst>
+              <a:ext uri="{FF2B5EF4-FFF2-40B4-BE49-F238E27FC236}">
+                <a16:creationId xmlns:a16="http://schemas.microsoft.com/office/drawing/2014/main" id="{BB91E6DA-F957-4FCC-A08F-9FF613D1AEEC}"/>
+              </a:ext>
+            </a:extLst>
+          </p:cNvPr>
+          <p:cNvPicPr>
+            <a:picLocks noChangeAspect="1"/>
+          </p:cNvPicPr>
+          <p:nvPr/>
+        </p:nvPicPr>
+        <p:blipFill>
+          <a:blip r:embed="rId5">
+            <a:extLst>
+              <a:ext uri="{96DAC541-7B7A-43D3-8B79-37D633B846F1}">
+                <asvg:svgBlip xmlns:asvg="http://schemas.microsoft.com/office/drawing/2016/SVG/main" r:embed="rId6"/>
+              </a:ext>
+            </a:extLst>
+          </a:blip>
+          <a:stretch>
+            <a:fillRect/>
+          </a:stretch>
+        </p:blipFill>
+        <p:spPr>
+          <a:xfrm>
+            <a:off x="664352" y="5903977"/>
+            <a:ext cx="174433" cy="174433"/>
+          </a:xfrm>
+          <a:prstGeom prst="rect">
+            <a:avLst/>
+          </a:prstGeom>
+        </p:spPr>
+      </p:pic>
+      <p:pic>
+        <p:nvPicPr>
+          <p:cNvPr id="30" name="Graphic 10" descr="Checkmark">
+            <a:extLst>
+              <a:ext uri="{FF2B5EF4-FFF2-40B4-BE49-F238E27FC236}">
+                <a16:creationId xmlns:a16="http://schemas.microsoft.com/office/drawing/2014/main" id="{C11F2EE2-12B2-41ED-842B-FF67F5CFBE7F}"/>
+              </a:ext>
+            </a:extLst>
+          </p:cNvPr>
+          <p:cNvPicPr>
+            <a:picLocks noChangeAspect="1"/>
+          </p:cNvPicPr>
+          <p:nvPr/>
+        </p:nvPicPr>
+        <p:blipFill>
+          <a:blip r:embed="rId3">
+            <a:extLst>
+              <a:ext uri="{96DAC541-7B7A-43D3-8B79-37D633B846F1}">
+                <asvg:svgBlip xmlns:asvg="http://schemas.microsoft.com/office/drawing/2016/SVG/main" r:embed="rId4"/>
+              </a:ext>
+            </a:extLst>
+          </a:blip>
+          <a:stretch>
+            <a:fillRect/>
+          </a:stretch>
+        </p:blipFill>
+        <p:spPr>
+          <a:xfrm>
+            <a:off x="663763" y="6155429"/>
+            <a:ext cx="174433" cy="174433"/>
+          </a:xfrm>
+          <a:prstGeom prst="rect">
+            <a:avLst/>
+          </a:prstGeom>
+        </p:spPr>
+      </p:pic>
+      <p:pic>
+        <p:nvPicPr>
+          <p:cNvPr id="31" name="Graphic 10" descr="Checkmark">
+            <a:extLst>
+              <a:ext uri="{FF2B5EF4-FFF2-40B4-BE49-F238E27FC236}">
+                <a16:creationId xmlns:a16="http://schemas.microsoft.com/office/drawing/2014/main" id="{D1352E51-A65C-4F13-AACA-0E05759E05CE}"/>
+              </a:ext>
+            </a:extLst>
+          </p:cNvPr>
+          <p:cNvPicPr>
+            <a:picLocks noChangeAspect="1"/>
+          </p:cNvPicPr>
+          <p:nvPr/>
+        </p:nvPicPr>
+        <p:blipFill>
+          <a:blip r:embed="rId3">
+            <a:extLst>
+              <a:ext uri="{96DAC541-7B7A-43D3-8B79-37D633B846F1}">
+                <asvg:svgBlip xmlns:asvg="http://schemas.microsoft.com/office/drawing/2016/SVG/main" r:embed="rId4"/>
+              </a:ext>
+            </a:extLst>
+          </a:blip>
+          <a:stretch>
+            <a:fillRect/>
+          </a:stretch>
+        </p:blipFill>
+        <p:spPr>
+          <a:xfrm>
+            <a:off x="5624260" y="1773521"/>
+            <a:ext cx="174433" cy="174433"/>
+          </a:xfrm>
+          <a:prstGeom prst="rect">
+            <a:avLst/>
+          </a:prstGeom>
+        </p:spPr>
+      </p:pic>
+      <p:pic>
+        <p:nvPicPr>
+          <p:cNvPr id="32" name="Graphic 10" descr="Checkmark">
+            <a:extLst>
+              <a:ext uri="{FF2B5EF4-FFF2-40B4-BE49-F238E27FC236}">
+                <a16:creationId xmlns:a16="http://schemas.microsoft.com/office/drawing/2014/main" id="{07D38A7B-99B4-4DA7-88DB-BE8CAB23C37B}"/>
+              </a:ext>
+            </a:extLst>
+          </p:cNvPr>
+          <p:cNvPicPr>
+            <a:picLocks noChangeAspect="1"/>
+          </p:cNvPicPr>
+          <p:nvPr/>
+        </p:nvPicPr>
+        <p:blipFill>
+          <a:blip r:embed="rId3">
+            <a:extLst>
+              <a:ext uri="{96DAC541-7B7A-43D3-8B79-37D633B846F1}">
+                <asvg:svgBlip xmlns:asvg="http://schemas.microsoft.com/office/drawing/2016/SVG/main" r:embed="rId4"/>
+              </a:ext>
+            </a:extLst>
+          </a:blip>
+          <a:stretch>
+            <a:fillRect/>
+          </a:stretch>
+        </p:blipFill>
+        <p:spPr>
+          <a:xfrm>
+            <a:off x="5624260" y="2012346"/>
+            <a:ext cx="174433" cy="174433"/>
+          </a:xfrm>
+          <a:prstGeom prst="rect">
+            <a:avLst/>
+          </a:prstGeom>
+        </p:spPr>
+      </p:pic>
+      <p:pic>
+        <p:nvPicPr>
+          <p:cNvPr id="33" name="Graphic 10" descr="Checkmark">
+            <a:extLst>
+              <a:ext uri="{FF2B5EF4-FFF2-40B4-BE49-F238E27FC236}">
+                <a16:creationId xmlns:a16="http://schemas.microsoft.com/office/drawing/2014/main" id="{5B2A5716-E391-4820-B7CE-6F3633954D65}"/>
+              </a:ext>
+            </a:extLst>
+          </p:cNvPr>
+          <p:cNvPicPr>
+            <a:picLocks noChangeAspect="1"/>
+          </p:cNvPicPr>
+          <p:nvPr/>
+        </p:nvPicPr>
+        <p:blipFill>
+          <a:blip r:embed="rId3">
+            <a:extLst>
+              <a:ext uri="{96DAC541-7B7A-43D3-8B79-37D633B846F1}">
+                <asvg:svgBlip xmlns:asvg="http://schemas.microsoft.com/office/drawing/2016/SVG/main" r:embed="rId4"/>
+              </a:ext>
+            </a:extLst>
+          </a:blip>
+          <a:stretch>
+            <a:fillRect/>
+          </a:stretch>
+        </p:blipFill>
+        <p:spPr>
+          <a:xfrm>
+            <a:off x="5624260" y="2268729"/>
+            <a:ext cx="174433" cy="174433"/>
+          </a:xfrm>
+          <a:prstGeom prst="rect">
+            <a:avLst/>
+          </a:prstGeom>
+        </p:spPr>
+      </p:pic>
+      <p:pic>
+        <p:nvPicPr>
+          <p:cNvPr id="34" name="Graphic 10" descr="Checkmark">
+            <a:extLst>
+              <a:ext uri="{FF2B5EF4-FFF2-40B4-BE49-F238E27FC236}">
+                <a16:creationId xmlns:a16="http://schemas.microsoft.com/office/drawing/2014/main" id="{E4840139-ACC8-4C92-B44E-AF404238CAA9}"/>
+              </a:ext>
+            </a:extLst>
+          </p:cNvPr>
+          <p:cNvPicPr>
+            <a:picLocks noChangeAspect="1"/>
+          </p:cNvPicPr>
+          <p:nvPr/>
+        </p:nvPicPr>
+        <p:blipFill>
+          <a:blip r:embed="rId3">
+            <a:extLst>
+              <a:ext uri="{96DAC541-7B7A-43D3-8B79-37D633B846F1}">
+                <asvg:svgBlip xmlns:asvg="http://schemas.microsoft.com/office/drawing/2016/SVG/main" r:embed="rId4"/>
+              </a:ext>
+            </a:extLst>
+          </a:blip>
+          <a:stretch>
+            <a:fillRect/>
+          </a:stretch>
+        </p:blipFill>
+        <p:spPr>
+          <a:xfrm>
+            <a:off x="5624259" y="2525112"/>
+            <a:ext cx="174433" cy="174433"/>
+          </a:xfrm>
+          <a:prstGeom prst="rect">
+            <a:avLst/>
+          </a:prstGeom>
+        </p:spPr>
+      </p:pic>
+      <p:pic>
+        <p:nvPicPr>
+          <p:cNvPr id="35" name="Graphic 10" descr="Checkmark">
+            <a:extLst>
+              <a:ext uri="{FF2B5EF4-FFF2-40B4-BE49-F238E27FC236}">
+                <a16:creationId xmlns:a16="http://schemas.microsoft.com/office/drawing/2014/main" id="{228DEB9F-15EF-4CD5-AC68-22240BAA7E96}"/>
+              </a:ext>
+            </a:extLst>
+          </p:cNvPr>
+          <p:cNvPicPr>
+            <a:picLocks noChangeAspect="1"/>
+          </p:cNvPicPr>
+          <p:nvPr/>
+        </p:nvPicPr>
+        <p:blipFill>
+          <a:blip r:embed="rId3">
+            <a:extLst>
+              <a:ext uri="{96DAC541-7B7A-43D3-8B79-37D633B846F1}">
+                <asvg:svgBlip xmlns:asvg="http://schemas.microsoft.com/office/drawing/2016/SVG/main" r:embed="rId4"/>
+              </a:ext>
+            </a:extLst>
+          </a:blip>
+          <a:stretch>
+            <a:fillRect/>
+          </a:stretch>
+        </p:blipFill>
+        <p:spPr>
+          <a:xfrm>
+            <a:off x="5624258" y="2786452"/>
+            <a:ext cx="174433" cy="174433"/>
+          </a:xfrm>
+          <a:prstGeom prst="rect">
+            <a:avLst/>
+          </a:prstGeom>
+        </p:spPr>
+      </p:pic>
+      <p:pic>
+        <p:nvPicPr>
+          <p:cNvPr id="36" name="Graphic 10" descr="Checkmark">
+            <a:extLst>
+              <a:ext uri="{FF2B5EF4-FFF2-40B4-BE49-F238E27FC236}">
+                <a16:creationId xmlns:a16="http://schemas.microsoft.com/office/drawing/2014/main" id="{93CC3B27-FBBE-4F84-A5D3-74BA9C0DAE59}"/>
+              </a:ext>
+            </a:extLst>
+          </p:cNvPr>
+          <p:cNvPicPr>
+            <a:picLocks noChangeAspect="1"/>
+          </p:cNvPicPr>
+          <p:nvPr/>
+        </p:nvPicPr>
+        <p:blipFill>
+          <a:blip r:embed="rId3">
+            <a:extLst>
+              <a:ext uri="{96DAC541-7B7A-43D3-8B79-37D633B846F1}">
+                <asvg:svgBlip xmlns:asvg="http://schemas.microsoft.com/office/drawing/2016/SVG/main" r:embed="rId4"/>
+              </a:ext>
+            </a:extLst>
+          </a:blip>
+          <a:stretch>
+            <a:fillRect/>
+          </a:stretch>
+        </p:blipFill>
+        <p:spPr>
+          <a:xfrm>
+            <a:off x="5624260" y="3037878"/>
+            <a:ext cx="174433" cy="174433"/>
+          </a:xfrm>
+          <a:prstGeom prst="rect">
+            <a:avLst/>
+          </a:prstGeom>
+        </p:spPr>
+      </p:pic>
+      <p:pic>
+        <p:nvPicPr>
+          <p:cNvPr id="37" name="Graphic 10" descr="Checkmark">
+            <a:extLst>
+              <a:ext uri="{FF2B5EF4-FFF2-40B4-BE49-F238E27FC236}">
+                <a16:creationId xmlns:a16="http://schemas.microsoft.com/office/drawing/2014/main" id="{8A0A3DEE-7E20-4333-934C-2C4C297A42AE}"/>
+              </a:ext>
+            </a:extLst>
+          </p:cNvPr>
+          <p:cNvPicPr>
+            <a:picLocks noChangeAspect="1"/>
+          </p:cNvPicPr>
+          <p:nvPr/>
+        </p:nvPicPr>
+        <p:blipFill>
+          <a:blip r:embed="rId3">
+            <a:extLst>
+              <a:ext uri="{96DAC541-7B7A-43D3-8B79-37D633B846F1}">
+                <asvg:svgBlip xmlns:asvg="http://schemas.microsoft.com/office/drawing/2016/SVG/main" r:embed="rId4"/>
+              </a:ext>
+            </a:extLst>
+          </a:blip>
+          <a:stretch>
+            <a:fillRect/>
+          </a:stretch>
+        </p:blipFill>
+        <p:spPr>
+          <a:xfrm>
+            <a:off x="5624260" y="3254567"/>
+            <a:ext cx="174433" cy="174433"/>
+          </a:xfrm>
+          <a:prstGeom prst="rect">
+            <a:avLst/>
+          </a:prstGeom>
+        </p:spPr>
+      </p:pic>
+      <p:pic>
+        <p:nvPicPr>
+          <p:cNvPr id="38" name="Graphic 10" descr="Checkmark">
+            <a:extLst>
+              <a:ext uri="{FF2B5EF4-FFF2-40B4-BE49-F238E27FC236}">
+                <a16:creationId xmlns:a16="http://schemas.microsoft.com/office/drawing/2014/main" id="{0B649153-8A52-4F54-8F7D-7CA5D4319557}"/>
+              </a:ext>
+            </a:extLst>
+          </p:cNvPr>
+          <p:cNvPicPr>
+            <a:picLocks noChangeAspect="1"/>
+          </p:cNvPicPr>
+          <p:nvPr/>
+        </p:nvPicPr>
+        <p:blipFill>
+          <a:blip r:embed="rId3">
+            <a:extLst>
+              <a:ext uri="{96DAC541-7B7A-43D3-8B79-37D633B846F1}">
+                <asvg:svgBlip xmlns:asvg="http://schemas.microsoft.com/office/drawing/2016/SVG/main" r:embed="rId4"/>
+              </a:ext>
+            </a:extLst>
+          </a:blip>
+          <a:stretch>
+            <a:fillRect/>
+          </a:stretch>
+        </p:blipFill>
+        <p:spPr>
+          <a:xfrm>
+            <a:off x="5624260" y="3499507"/>
+            <a:ext cx="174433" cy="174433"/>
+          </a:xfrm>
+          <a:prstGeom prst="rect">
+            <a:avLst/>
+          </a:prstGeom>
+        </p:spPr>
+      </p:pic>
+      <p:pic>
+        <p:nvPicPr>
+          <p:cNvPr id="39" name="Graphic 10" descr="Checkmark">
+            <a:extLst>
+              <a:ext uri="{FF2B5EF4-FFF2-40B4-BE49-F238E27FC236}">
+                <a16:creationId xmlns:a16="http://schemas.microsoft.com/office/drawing/2014/main" id="{A349AF50-0A6D-4FDE-B8A2-8CBE3D32891A}"/>
+              </a:ext>
+            </a:extLst>
+          </p:cNvPr>
+          <p:cNvPicPr>
+            <a:picLocks noChangeAspect="1"/>
+          </p:cNvPicPr>
+          <p:nvPr/>
+        </p:nvPicPr>
+        <p:blipFill>
+          <a:blip r:embed="rId3">
+            <a:extLst>
+              <a:ext uri="{96DAC541-7B7A-43D3-8B79-37D633B846F1}">
+                <asvg:svgBlip xmlns:asvg="http://schemas.microsoft.com/office/drawing/2016/SVG/main" r:embed="rId4"/>
+              </a:ext>
+            </a:extLst>
+          </a:blip>
+          <a:stretch>
+            <a:fillRect/>
+          </a:stretch>
+        </p:blipFill>
+        <p:spPr>
+          <a:xfrm>
+            <a:off x="5624260" y="3962202"/>
+            <a:ext cx="174433" cy="174433"/>
+          </a:xfrm>
+          <a:prstGeom prst="rect">
+            <a:avLst/>
+          </a:prstGeom>
+        </p:spPr>
+      </p:pic>
+      <p:pic>
+        <p:nvPicPr>
+          <p:cNvPr id="40" name="Graphic 10" descr="Checkmark">
+            <a:extLst>
+              <a:ext uri="{FF2B5EF4-FFF2-40B4-BE49-F238E27FC236}">
+                <a16:creationId xmlns:a16="http://schemas.microsoft.com/office/drawing/2014/main" id="{E76AC5AB-E178-4E11-A06E-5131D76ABDC9}"/>
+              </a:ext>
+            </a:extLst>
+          </p:cNvPr>
+          <p:cNvPicPr>
+            <a:picLocks noChangeAspect="1"/>
+          </p:cNvPicPr>
+          <p:nvPr/>
+        </p:nvPicPr>
+        <p:blipFill>
+          <a:blip r:embed="rId3">
+            <a:extLst>
+              <a:ext uri="{96DAC541-7B7A-43D3-8B79-37D633B846F1}">
+                <asvg:svgBlip xmlns:asvg="http://schemas.microsoft.com/office/drawing/2016/SVG/main" r:embed="rId4"/>
+              </a:ext>
+            </a:extLst>
+          </a:blip>
+          <a:stretch>
+            <a:fillRect/>
+          </a:stretch>
+        </p:blipFill>
+        <p:spPr>
+          <a:xfrm>
+            <a:off x="5624260" y="4206534"/>
+            <a:ext cx="174433" cy="174433"/>
+          </a:xfrm>
+          <a:prstGeom prst="rect">
+            <a:avLst/>
+          </a:prstGeom>
+        </p:spPr>
+      </p:pic>
+      <p:pic>
+        <p:nvPicPr>
+          <p:cNvPr id="41" name="Graphic 16" descr="Close">
+            <a:extLst>
+              <a:ext uri="{FF2B5EF4-FFF2-40B4-BE49-F238E27FC236}">
+                <a16:creationId xmlns:a16="http://schemas.microsoft.com/office/drawing/2014/main" id="{72AC2994-D52C-47E8-BB6B-1365AAFC55B3}"/>
+              </a:ext>
+            </a:extLst>
+          </p:cNvPr>
+          <p:cNvPicPr>
+            <a:picLocks noChangeAspect="1"/>
+          </p:cNvPicPr>
+          <p:nvPr/>
+        </p:nvPicPr>
+        <p:blipFill>
+          <a:blip r:embed="rId5">
+            <a:extLst>
+              <a:ext uri="{96DAC541-7B7A-43D3-8B79-37D633B846F1}">
+                <asvg:svgBlip xmlns:asvg="http://schemas.microsoft.com/office/drawing/2016/SVG/main" r:embed="rId6"/>
+              </a:ext>
+            </a:extLst>
+          </a:blip>
+          <a:stretch>
+            <a:fillRect/>
+          </a:stretch>
+        </p:blipFill>
+        <p:spPr>
+          <a:xfrm>
+            <a:off x="5624257" y="4924455"/>
+            <a:ext cx="174433" cy="174433"/>
+          </a:xfrm>
+          <a:prstGeom prst="rect">
+            <a:avLst/>
+          </a:prstGeom>
+        </p:spPr>
+      </p:pic>
+      <p:pic>
+        <p:nvPicPr>
+          <p:cNvPr id="42" name="Graphic 16" descr="Close">
+            <a:extLst>
+              <a:ext uri="{FF2B5EF4-FFF2-40B4-BE49-F238E27FC236}">
+                <a16:creationId xmlns:a16="http://schemas.microsoft.com/office/drawing/2014/main" id="{7C1075AD-11EA-4F2C-8DA5-867D599C46E6}"/>
+              </a:ext>
+            </a:extLst>
+          </p:cNvPr>
+          <p:cNvPicPr>
+            <a:picLocks noChangeAspect="1"/>
+          </p:cNvPicPr>
+          <p:nvPr/>
+        </p:nvPicPr>
+        <p:blipFill>
+          <a:blip r:embed="rId5">
+            <a:extLst>
+              <a:ext uri="{96DAC541-7B7A-43D3-8B79-37D633B846F1}">
+                <asvg:svgBlip xmlns:asvg="http://schemas.microsoft.com/office/drawing/2016/SVG/main" r:embed="rId6"/>
+              </a:ext>
+            </a:extLst>
+          </a:blip>
+          <a:stretch>
+            <a:fillRect/>
+          </a:stretch>
+        </p:blipFill>
+        <p:spPr>
+          <a:xfrm>
+            <a:off x="5630446" y="3722683"/>
+            <a:ext cx="174433" cy="174433"/>
+          </a:xfrm>
+          <a:prstGeom prst="rect">
+            <a:avLst/>
+          </a:prstGeom>
+        </p:spPr>
+      </p:pic>
+      <p:pic>
+        <p:nvPicPr>
+          <p:cNvPr id="43" name="Graphic 16" descr="Close">
+            <a:extLst>
+              <a:ext uri="{FF2B5EF4-FFF2-40B4-BE49-F238E27FC236}">
+                <a16:creationId xmlns:a16="http://schemas.microsoft.com/office/drawing/2014/main" id="{792EFFA4-010B-4F77-8DFB-520A17312010}"/>
+              </a:ext>
+            </a:extLst>
+          </p:cNvPr>
+          <p:cNvPicPr>
+            <a:picLocks noChangeAspect="1"/>
+          </p:cNvPicPr>
+          <p:nvPr/>
+        </p:nvPicPr>
+        <p:blipFill>
+          <a:blip r:embed="rId5">
+            <a:extLst>
+              <a:ext uri="{96DAC541-7B7A-43D3-8B79-37D633B846F1}">
+                <asvg:svgBlip xmlns:asvg="http://schemas.microsoft.com/office/drawing/2016/SVG/main" r:embed="rId6"/>
+              </a:ext>
+            </a:extLst>
+          </a:blip>
+          <a:stretch>
+            <a:fillRect/>
+          </a:stretch>
+        </p:blipFill>
+        <p:spPr>
+          <a:xfrm>
+            <a:off x="5624255" y="4443396"/>
+            <a:ext cx="174433" cy="174433"/>
+          </a:xfrm>
+          <a:prstGeom prst="rect">
+            <a:avLst/>
+          </a:prstGeom>
+        </p:spPr>
+      </p:pic>
+      <p:pic>
+        <p:nvPicPr>
+          <p:cNvPr id="44" name="Graphic 16" descr="Close">
+            <a:extLst>
+              <a:ext uri="{FF2B5EF4-FFF2-40B4-BE49-F238E27FC236}">
+                <a16:creationId xmlns:a16="http://schemas.microsoft.com/office/drawing/2014/main" id="{45AA7691-B6CF-4E91-AB4D-C4C240F0D47D}"/>
+              </a:ext>
+            </a:extLst>
+          </p:cNvPr>
+          <p:cNvPicPr>
+            <a:picLocks noChangeAspect="1"/>
+          </p:cNvPicPr>
+          <p:nvPr/>
+        </p:nvPicPr>
+        <p:blipFill>
+          <a:blip r:embed="rId5">
+            <a:extLst>
+              <a:ext uri="{96DAC541-7B7A-43D3-8B79-37D633B846F1}">
+                <asvg:svgBlip xmlns:asvg="http://schemas.microsoft.com/office/drawing/2016/SVG/main" r:embed="rId6"/>
+              </a:ext>
+            </a:extLst>
+          </a:blip>
+          <a:stretch>
+            <a:fillRect/>
+          </a:stretch>
+        </p:blipFill>
+        <p:spPr>
+          <a:xfrm>
+            <a:off x="5630446" y="4706568"/>
+            <a:ext cx="174433" cy="174433"/>
+          </a:xfrm>
+          <a:prstGeom prst="rect">
+            <a:avLst/>
+          </a:prstGeom>
+        </p:spPr>
+      </p:pic>
+      <p:pic>
+        <p:nvPicPr>
+          <p:cNvPr id="45" name="Graphic 10" descr="Checkmark">
+            <a:extLst>
+              <a:ext uri="{FF2B5EF4-FFF2-40B4-BE49-F238E27FC236}">
+                <a16:creationId xmlns:a16="http://schemas.microsoft.com/office/drawing/2014/main" id="{9891B777-7F0F-43B4-851F-FBCDCD7E5DF4}"/>
+              </a:ext>
+            </a:extLst>
+          </p:cNvPr>
+          <p:cNvPicPr>
+            <a:picLocks noChangeAspect="1"/>
+          </p:cNvPicPr>
+          <p:nvPr/>
+        </p:nvPicPr>
+        <p:blipFill>
+          <a:blip r:embed="rId3">
+            <a:extLst>
+              <a:ext uri="{96DAC541-7B7A-43D3-8B79-37D633B846F1}">
+                <asvg:svgBlip xmlns:asvg="http://schemas.microsoft.com/office/drawing/2016/SVG/main" r:embed="rId4"/>
+              </a:ext>
+            </a:extLst>
+          </a:blip>
+          <a:stretch>
+            <a:fillRect/>
+          </a:stretch>
+        </p:blipFill>
+        <p:spPr>
+          <a:xfrm>
+            <a:off x="5624255" y="5661661"/>
+            <a:ext cx="174433" cy="174433"/>
+          </a:xfrm>
+          <a:prstGeom prst="rect">
+            <a:avLst/>
+          </a:prstGeom>
+        </p:spPr>
+      </p:pic>
+      <p:pic>
+        <p:nvPicPr>
+          <p:cNvPr id="46" name="Graphic 16" descr="Close">
+            <a:extLst>
+              <a:ext uri="{FF2B5EF4-FFF2-40B4-BE49-F238E27FC236}">
+                <a16:creationId xmlns:a16="http://schemas.microsoft.com/office/drawing/2014/main" id="{1A162C43-5DF9-4223-BFB7-5E168D0D4127}"/>
+              </a:ext>
+            </a:extLst>
+          </p:cNvPr>
+          <p:cNvPicPr>
+            <a:picLocks noChangeAspect="1"/>
+          </p:cNvPicPr>
+          <p:nvPr/>
+        </p:nvPicPr>
+        <p:blipFill>
+          <a:blip r:embed="rId5">
+            <a:extLst>
+              <a:ext uri="{96DAC541-7B7A-43D3-8B79-37D633B846F1}">
+                <asvg:svgBlip xmlns:asvg="http://schemas.microsoft.com/office/drawing/2016/SVG/main" r:embed="rId6"/>
+              </a:ext>
+            </a:extLst>
+          </a:blip>
+          <a:stretch>
+            <a:fillRect/>
+          </a:stretch>
+        </p:blipFill>
+        <p:spPr>
+          <a:xfrm>
+            <a:off x="5630446" y="5908172"/>
+            <a:ext cx="174433" cy="174433"/>
+          </a:xfrm>
+          <a:prstGeom prst="rect">
+            <a:avLst/>
+          </a:prstGeom>
         </p:spPr>
       </p:pic>
     </p:spTree>

</xml_diff>

<commit_message>
Diapos Menoyo + Manual + CRM
</commit_message>
<xml_diff>
--- a/P2/ppt.pptx
+++ b/P2/ppt.pptx
@@ -14,10 +14,11 @@
     <p:sldId id="260" r:id="rId8"/>
     <p:sldId id="263" r:id="rId9"/>
     <p:sldId id="265" r:id="rId10"/>
-    <p:sldId id="266" r:id="rId11"/>
-    <p:sldId id="267" r:id="rId12"/>
-    <p:sldId id="268" r:id="rId13"/>
-    <p:sldId id="269" r:id="rId14"/>
+    <p:sldId id="270" r:id="rId11"/>
+    <p:sldId id="266" r:id="rId12"/>
+    <p:sldId id="267" r:id="rId13"/>
+    <p:sldId id="268" r:id="rId14"/>
+    <p:sldId id="269" r:id="rId15"/>
   </p:sldIdLst>
   <p:sldSz cx="12192000" cy="6858000"/>
   <p:notesSz cx="6858000" cy="9144000"/>
@@ -273,7 +274,7 @@
           <a:p>
             <a:fld id="{85CE5CD3-CA6B-8A47-A3EF-5457F8D1AA2D}" type="datetimeFigureOut">
               <a:rPr lang="es-ES_tradnl" smtClean="0"/>
-              <a:t>05/05/2019</a:t>
+              <a:t>06/05/2019</a:t>
             </a:fld>
             <a:endParaRPr lang="es-ES_tradnl"/>
           </a:p>
@@ -473,7 +474,7 @@
           <a:p>
             <a:fld id="{85CE5CD3-CA6B-8A47-A3EF-5457F8D1AA2D}" type="datetimeFigureOut">
               <a:rPr lang="es-ES_tradnl" smtClean="0"/>
-              <a:t>05/05/2019</a:t>
+              <a:t>06/05/2019</a:t>
             </a:fld>
             <a:endParaRPr lang="es-ES_tradnl"/>
           </a:p>
@@ -683,7 +684,7 @@
           <a:p>
             <a:fld id="{85CE5CD3-CA6B-8A47-A3EF-5457F8D1AA2D}" type="datetimeFigureOut">
               <a:rPr lang="es-ES_tradnl" smtClean="0"/>
-              <a:t>05/05/2019</a:t>
+              <a:t>06/05/2019</a:t>
             </a:fld>
             <a:endParaRPr lang="es-ES_tradnl"/>
           </a:p>
@@ -883,7 +884,7 @@
           <a:p>
             <a:fld id="{85CE5CD3-CA6B-8A47-A3EF-5457F8D1AA2D}" type="datetimeFigureOut">
               <a:rPr lang="es-ES_tradnl" smtClean="0"/>
-              <a:t>05/05/2019</a:t>
+              <a:t>06/05/2019</a:t>
             </a:fld>
             <a:endParaRPr lang="es-ES_tradnl"/>
           </a:p>
@@ -1159,7 +1160,7 @@
           <a:p>
             <a:fld id="{85CE5CD3-CA6B-8A47-A3EF-5457F8D1AA2D}" type="datetimeFigureOut">
               <a:rPr lang="es-ES_tradnl" smtClean="0"/>
-              <a:t>05/05/2019</a:t>
+              <a:t>06/05/2019</a:t>
             </a:fld>
             <a:endParaRPr lang="es-ES_tradnl"/>
           </a:p>
@@ -1427,7 +1428,7 @@
           <a:p>
             <a:fld id="{85CE5CD3-CA6B-8A47-A3EF-5457F8D1AA2D}" type="datetimeFigureOut">
               <a:rPr lang="es-ES_tradnl" smtClean="0"/>
-              <a:t>05/05/2019</a:t>
+              <a:t>06/05/2019</a:t>
             </a:fld>
             <a:endParaRPr lang="es-ES_tradnl"/>
           </a:p>
@@ -1842,7 +1843,7 @@
           <a:p>
             <a:fld id="{85CE5CD3-CA6B-8A47-A3EF-5457F8D1AA2D}" type="datetimeFigureOut">
               <a:rPr lang="es-ES_tradnl" smtClean="0"/>
-              <a:t>05/05/2019</a:t>
+              <a:t>06/05/2019</a:t>
             </a:fld>
             <a:endParaRPr lang="es-ES_tradnl"/>
           </a:p>
@@ -1984,7 +1985,7 @@
           <a:p>
             <a:fld id="{85CE5CD3-CA6B-8A47-A3EF-5457F8D1AA2D}" type="datetimeFigureOut">
               <a:rPr lang="es-ES_tradnl" smtClean="0"/>
-              <a:t>05/05/2019</a:t>
+              <a:t>06/05/2019</a:t>
             </a:fld>
             <a:endParaRPr lang="es-ES_tradnl"/>
           </a:p>
@@ -2097,7 +2098,7 @@
           <a:p>
             <a:fld id="{85CE5CD3-CA6B-8A47-A3EF-5457F8D1AA2D}" type="datetimeFigureOut">
               <a:rPr lang="es-ES_tradnl" smtClean="0"/>
-              <a:t>05/05/2019</a:t>
+              <a:t>06/05/2019</a:t>
             </a:fld>
             <a:endParaRPr lang="es-ES_tradnl"/>
           </a:p>
@@ -2410,7 +2411,7 @@
           <a:p>
             <a:fld id="{85CE5CD3-CA6B-8A47-A3EF-5457F8D1AA2D}" type="datetimeFigureOut">
               <a:rPr lang="es-ES_tradnl" smtClean="0"/>
-              <a:t>05/05/2019</a:t>
+              <a:t>06/05/2019</a:t>
             </a:fld>
             <a:endParaRPr lang="es-ES_tradnl"/>
           </a:p>
@@ -2699,7 +2700,7 @@
           <a:p>
             <a:fld id="{85CE5CD3-CA6B-8A47-A3EF-5457F8D1AA2D}" type="datetimeFigureOut">
               <a:rPr lang="es-ES_tradnl" smtClean="0"/>
-              <a:t>05/05/2019</a:t>
+              <a:t>06/05/2019</a:t>
             </a:fld>
             <a:endParaRPr lang="es-ES_tradnl"/>
           </a:p>
@@ -2942,7 +2943,7 @@
           <a:p>
             <a:fld id="{85CE5CD3-CA6B-8A47-A3EF-5457F8D1AA2D}" type="datetimeFigureOut">
               <a:rPr lang="es-ES_tradnl" smtClean="0"/>
-              <a:t>05/05/2019</a:t>
+              <a:t>06/05/2019</a:t>
             </a:fld>
             <a:endParaRPr lang="es-ES_tradnl"/>
           </a:p>
@@ -3477,7 +3478,7 @@
           <p:cNvPr id="2" name="Title 1">
             <a:extLst>
               <a:ext uri="{FF2B5EF4-FFF2-40B4-BE49-F238E27FC236}">
-                <a16:creationId xmlns:a16="http://schemas.microsoft.com/office/drawing/2014/main" id="{3A0ED5DF-9378-9B43-8F1A-9AE79F2FA4FC}"/>
+                <a16:creationId xmlns:a16="http://schemas.microsoft.com/office/drawing/2014/main" id="{5D8A47AE-FC95-AA4C-B73E-275E1ED78815}"/>
               </a:ext>
             </a:extLst>
           </p:cNvPr>
@@ -3495,186 +3496,17 @@
           <a:p>
             <a:r>
               <a:rPr lang="es-ES_tradnl" dirty="0"/>
-              <a:t>Plataforma electrónica</a:t>
-            </a:r>
-          </a:p>
-        </p:txBody>
-      </p:sp>
-      <p:pic>
-        <p:nvPicPr>
-          <p:cNvPr id="1026" name="Picture 2" descr="/var/folders/s3/wwp7g3hn3r94628zwgkf5f800000gn/T/com.microsoft.Powerpoint/WebArchiveCopyPasteTempFiles/2Q==">
-            <a:extLst>
-              <a:ext uri="{FF2B5EF4-FFF2-40B4-BE49-F238E27FC236}">
-                <a16:creationId xmlns:a16="http://schemas.microsoft.com/office/drawing/2014/main" id="{17029D5D-B602-FB44-99A4-3717E61F8078}"/>
-              </a:ext>
-            </a:extLst>
-          </p:cNvPr>
-          <p:cNvPicPr>
-            <a:picLocks noGrp="1" noChangeAspect="1" noChangeArrowheads="1"/>
-          </p:cNvPicPr>
-          <p:nvPr>
-            <p:ph idx="1"/>
-          </p:nvPr>
-        </p:nvPicPr>
-        <p:blipFill>
-          <a:blip r:embed="rId2">
-            <a:extLst>
-              <a:ext uri="{28A0092B-C50C-407E-A947-70E740481C1C}">
-                <a14:useLocalDpi xmlns:a14="http://schemas.microsoft.com/office/drawing/2010/main" val="0"/>
-              </a:ext>
-            </a:extLst>
-          </a:blip>
-          <a:srcRect/>
-          <a:stretch>
-            <a:fillRect/>
-          </a:stretch>
-        </p:blipFill>
-        <p:spPr bwMode="auto">
-          <a:xfrm>
-            <a:off x="838200" y="1986962"/>
-            <a:ext cx="6502400" cy="3962400"/>
-          </a:xfrm>
-          <a:prstGeom prst="rect">
-            <a:avLst/>
-          </a:prstGeom>
-          <a:noFill/>
-          <a:extLst>
-            <a:ext uri="{909E8E84-426E-40DD-AFC4-6F175D3DCCD1}">
-              <a14:hiddenFill xmlns:a14="http://schemas.microsoft.com/office/drawing/2010/main">
-                <a:solidFill>
-                  <a:srgbClr val="FFFFFF"/>
-                </a:solidFill>
-              </a14:hiddenFill>
-            </a:ext>
-          </a:extLst>
-        </p:spPr>
-      </p:pic>
-      <p:sp>
-        <p:nvSpPr>
-          <p:cNvPr id="4" name="TextBox 3">
-            <a:extLst>
-              <a:ext uri="{FF2B5EF4-FFF2-40B4-BE49-F238E27FC236}">
-                <a16:creationId xmlns:a16="http://schemas.microsoft.com/office/drawing/2014/main" id="{E9F9E150-E408-8749-80A0-7C522CA71B62}"/>
-              </a:ext>
-            </a:extLst>
-          </p:cNvPr>
-          <p:cNvSpPr txBox="1"/>
-          <p:nvPr/>
-        </p:nvSpPr>
-        <p:spPr>
-          <a:xfrm>
-            <a:off x="8330184" y="2675500"/>
-            <a:ext cx="2832763" cy="2585323"/>
-          </a:xfrm>
-          <a:prstGeom prst="rect">
-            <a:avLst/>
-          </a:prstGeom>
-          <a:noFill/>
-        </p:spPr>
-        <p:txBody>
-          <a:bodyPr wrap="none" rtlCol="0">
-            <a:spAutoFit/>
-          </a:bodyPr>
-          <a:lstStyle/>
-          <a:p>
-            <a:pPr marL="285750" indent="-285750">
-              <a:buFont typeface="Arial" panose="020B0604020202020204" pitchFamily="34" charset="0"/>
-              <a:buChar char="•"/>
-            </a:pPr>
-            <a:r>
-              <a:rPr lang="es-ES_tradnl" dirty="0"/>
-              <a:t>Sede electrónica</a:t>
-            </a:r>
-          </a:p>
-          <a:p>
-            <a:pPr marL="285750" indent="-285750">
-              <a:buFont typeface="Arial" panose="020B0604020202020204" pitchFamily="34" charset="0"/>
-              <a:buChar char="•"/>
-            </a:pPr>
-            <a:r>
-              <a:rPr lang="es-ES_tradnl" dirty="0"/>
-              <a:t>Gestor de formularios  </a:t>
-            </a:r>
-          </a:p>
-          <a:p>
-            <a:pPr marL="285750" indent="-285750">
-              <a:buFont typeface="Arial" panose="020B0604020202020204" pitchFamily="34" charset="0"/>
-              <a:buChar char="•"/>
-            </a:pPr>
-            <a:r>
-              <a:rPr lang="es-ES_tradnl" dirty="0"/>
-              <a:t>Registro electrónico </a:t>
-            </a:r>
-          </a:p>
-          <a:p>
-            <a:pPr marL="285750" indent="-285750">
-              <a:buFont typeface="Arial" panose="020B0604020202020204" pitchFamily="34" charset="0"/>
-              <a:buChar char="•"/>
-            </a:pPr>
-            <a:r>
-              <a:rPr lang="es-ES_tradnl" dirty="0"/>
-              <a:t>Pasarela de pagos </a:t>
-            </a:r>
-          </a:p>
-          <a:p>
-            <a:pPr marL="285750" indent="-285750">
-              <a:buFont typeface="Arial" panose="020B0604020202020204" pitchFamily="34" charset="0"/>
-              <a:buChar char="•"/>
-            </a:pPr>
-            <a:r>
-              <a:rPr lang="es-ES" dirty="0"/>
-              <a:t>Gestor de expedientes </a:t>
-            </a:r>
-          </a:p>
-          <a:p>
-            <a:pPr marL="285750" indent="-285750">
-              <a:buFont typeface="Arial" panose="020B0604020202020204" pitchFamily="34" charset="0"/>
-              <a:buChar char="•"/>
-            </a:pPr>
-            <a:r>
-              <a:rPr lang="es-ES" dirty="0"/>
-              <a:t>Notificación electrónica </a:t>
-            </a:r>
-          </a:p>
-          <a:p>
-            <a:pPr marL="285750" indent="-285750">
-              <a:buFont typeface="Arial" panose="020B0604020202020204" pitchFamily="34" charset="0"/>
-              <a:buChar char="•"/>
-            </a:pPr>
-            <a:r>
-              <a:rPr lang="es-ES" dirty="0"/>
-              <a:t>Identificación electrónica</a:t>
-            </a:r>
-          </a:p>
-          <a:p>
-            <a:pPr marL="285750" indent="-285750">
-              <a:buFont typeface="Arial" panose="020B0604020202020204" pitchFamily="34" charset="0"/>
-              <a:buChar char="•"/>
-            </a:pPr>
-            <a:r>
-              <a:rPr lang="es-ES" dirty="0"/>
-              <a:t>Archivo electrónico  </a:t>
-            </a:r>
-          </a:p>
-          <a:p>
-            <a:pPr marL="285750" indent="-285750">
-              <a:buFont typeface="Arial" panose="020B0604020202020204" pitchFamily="34" charset="0"/>
-              <a:buChar char="•"/>
-            </a:pPr>
-            <a:r>
-              <a:rPr lang="es-ES" dirty="0"/>
-              <a:t>Interoperabilidad </a:t>
-            </a:r>
-            <a:endParaRPr lang="es-ES_tradnl" dirty="0"/>
+              <a:t>Ayto. de Torrelodones</a:t>
+            </a:r>
           </a:p>
         </p:txBody>
       </p:sp>
       <p:sp>
         <p:nvSpPr>
-          <p:cNvPr id="5" name="TextBox 4">
-            <a:extLst>
-              <a:ext uri="{FF2B5EF4-FFF2-40B4-BE49-F238E27FC236}">
-                <a16:creationId xmlns:a16="http://schemas.microsoft.com/office/drawing/2014/main" id="{DD5B5F20-F0DF-B541-A66C-0E21C42C33D7}"/>
+          <p:cNvPr id="6" name="TextBox 5">
+            <a:extLst>
+              <a:ext uri="{FF2B5EF4-FFF2-40B4-BE49-F238E27FC236}">
+                <a16:creationId xmlns:a16="http://schemas.microsoft.com/office/drawing/2014/main" id="{D832FBDB-B8B9-F24D-96CF-CCE1EB8E3499}"/>
               </a:ext>
             </a:extLst>
           </p:cNvPr>
@@ -3683,8 +3515,8 @@
         </p:nvSpPr>
         <p:spPr>
           <a:xfrm>
-            <a:off x="8330184" y="843240"/>
-            <a:ext cx="2547172" cy="369332"/>
+            <a:off x="838200" y="1690688"/>
+            <a:ext cx="4343400" cy="6247864"/>
           </a:xfrm>
           <a:prstGeom prst="rect">
             <a:avLst/>
@@ -3692,22 +3524,1726 @@
           <a:noFill/>
         </p:spPr>
         <p:txBody>
-          <a:bodyPr wrap="none" rtlCol="0">
+          <a:bodyPr wrap="square" rtlCol="0">
             <a:spAutoFit/>
           </a:bodyPr>
           <a:lstStyle/>
           <a:p>
-            <a:r>
-              <a:rPr lang="es-ES_tradnl" dirty="0"/>
-              <a:t>Componentes + Procesos</a:t>
-            </a:r>
+            <a:pPr marL="285750" indent="-285750">
+              <a:buFont typeface="Arial" panose="020B0604020202020204" pitchFamily="34" charset="0"/>
+              <a:buChar char="•"/>
+            </a:pPr>
+            <a:r>
+              <a:rPr lang="es-ES" sz="1600" dirty="0"/>
+              <a:t>Dirección de la sede</a:t>
+            </a:r>
+          </a:p>
+          <a:p>
+            <a:pPr marL="285750" indent="-285750">
+              <a:buFont typeface="Arial" panose="020B0604020202020204" pitchFamily="34" charset="0"/>
+              <a:buChar char="•"/>
+            </a:pPr>
+            <a:r>
+              <a:rPr lang="es-ES" sz="1600" dirty="0"/>
+              <a:t>Identificación de su titular. </a:t>
+            </a:r>
+          </a:p>
+          <a:p>
+            <a:pPr marL="285750" indent="-285750">
+              <a:buFont typeface="Arial" panose="020B0604020202020204" pitchFamily="34" charset="0"/>
+              <a:buChar char="•"/>
+            </a:pPr>
+            <a:r>
+              <a:rPr lang="es-ES" sz="1600" dirty="0"/>
+              <a:t>Canales de acceso a los servicios</a:t>
+            </a:r>
+          </a:p>
+          <a:p>
+            <a:pPr marL="285750" indent="-285750">
+              <a:buFont typeface="Arial" panose="020B0604020202020204" pitchFamily="34" charset="0"/>
+              <a:buChar char="•"/>
+            </a:pPr>
+            <a:r>
+              <a:rPr lang="es-ES" sz="1600" dirty="0"/>
+              <a:t>Quejas y sugerencias</a:t>
+            </a:r>
+          </a:p>
+          <a:p>
+            <a:pPr marL="285750" indent="-285750">
+              <a:buFont typeface="Arial" panose="020B0604020202020204" pitchFamily="34" charset="0"/>
+              <a:buChar char="•"/>
+            </a:pPr>
+            <a:r>
+              <a:rPr lang="es-ES" sz="1600" dirty="0"/>
+              <a:t>Identificación de la sede</a:t>
+            </a:r>
+          </a:p>
+          <a:p>
+            <a:pPr marL="285750" indent="-285750">
+              <a:buFont typeface="Arial" panose="020B0604020202020204" pitchFamily="34" charset="0"/>
+              <a:buChar char="•"/>
+            </a:pPr>
+            <a:r>
+              <a:rPr lang="es-ES" sz="1600" dirty="0"/>
+              <a:t>Sedes compartidas</a:t>
+            </a:r>
+          </a:p>
+          <a:p>
+            <a:pPr marL="285750" indent="-285750">
+              <a:buFont typeface="Arial" panose="020B0604020202020204" pitchFamily="34" charset="0"/>
+              <a:buChar char="•"/>
+            </a:pPr>
+            <a:r>
+              <a:rPr lang="es-ES" sz="1600" dirty="0"/>
+              <a:t>Subsedes</a:t>
+            </a:r>
+          </a:p>
+          <a:p>
+            <a:pPr marL="285750" indent="-285750">
+              <a:buFont typeface="Arial" panose="020B0604020202020204" pitchFamily="34" charset="0"/>
+              <a:buChar char="•"/>
+            </a:pPr>
+            <a:r>
+              <a:rPr lang="es-ES" sz="1600" dirty="0"/>
+              <a:t>Instrumento de creación.</a:t>
+            </a:r>
+          </a:p>
+          <a:p>
+            <a:pPr marL="285750" indent="-285750">
+              <a:buFont typeface="Arial" panose="020B0604020202020204" pitchFamily="34" charset="0"/>
+              <a:buChar char="•"/>
+            </a:pPr>
+            <a:r>
+              <a:rPr lang="es-ES" sz="1600" dirty="0"/>
+              <a:t>Mapa de la sede </a:t>
+            </a:r>
+          </a:p>
+          <a:p>
+            <a:pPr marL="285750" indent="-285750">
+              <a:buFont typeface="Arial" panose="020B0604020202020204" pitchFamily="34" charset="0"/>
+              <a:buChar char="•"/>
+            </a:pPr>
+            <a:r>
+              <a:rPr lang="es-ES" sz="1600" dirty="0"/>
+              <a:t>Estructura de navegación. </a:t>
+            </a:r>
+          </a:p>
+          <a:p>
+            <a:pPr marL="285750" indent="-285750">
+              <a:buFont typeface="Arial" panose="020B0604020202020204" pitchFamily="34" charset="0"/>
+              <a:buChar char="•"/>
+            </a:pPr>
+            <a:r>
+              <a:rPr lang="es-ES" sz="1600" dirty="0"/>
+              <a:t>Secciones disponibles. </a:t>
+            </a:r>
+          </a:p>
+          <a:p>
+            <a:pPr marL="285750" indent="-285750">
+              <a:buFont typeface="Arial" panose="020B0604020202020204" pitchFamily="34" charset="0"/>
+              <a:buChar char="•"/>
+            </a:pPr>
+            <a:r>
+              <a:rPr lang="es-ES" sz="1600" dirty="0"/>
+              <a:t>Propiedad intelectual. </a:t>
+            </a:r>
+          </a:p>
+          <a:p>
+            <a:pPr marL="285750" indent="-285750">
+              <a:buFont typeface="Arial" panose="020B0604020202020204" pitchFamily="34" charset="0"/>
+              <a:buChar char="•"/>
+            </a:pPr>
+            <a:r>
+              <a:rPr lang="es-ES" sz="1600" dirty="0"/>
+              <a:t>Protección de Datos de Carácter Personal.</a:t>
+            </a:r>
+          </a:p>
+          <a:p>
+            <a:pPr marL="285750" indent="-285750">
+              <a:buFont typeface="Arial" panose="020B0604020202020204" pitchFamily="34" charset="0"/>
+              <a:buChar char="•"/>
+            </a:pPr>
+            <a:r>
+              <a:rPr lang="es-ES" sz="1600" dirty="0"/>
+              <a:t>Enlace con las sedes electrónicas de las Agencias de Protección de Datos. </a:t>
+            </a:r>
+          </a:p>
+          <a:p>
+            <a:pPr marL="285750" indent="-285750">
+              <a:buFont typeface="Arial" panose="020B0604020202020204" pitchFamily="34" charset="0"/>
+              <a:buChar char="•"/>
+            </a:pPr>
+            <a:r>
+              <a:rPr lang="es-ES" sz="1600" dirty="0"/>
+              <a:t>Asesoramiento electrónico</a:t>
+            </a:r>
+          </a:p>
+          <a:p>
+            <a:pPr marL="285750" indent="-285750">
+              <a:buFont typeface="Arial" panose="020B0604020202020204" pitchFamily="34" charset="0"/>
+              <a:buChar char="•"/>
+            </a:pPr>
+            <a:r>
+              <a:rPr lang="es-ES" sz="1600" dirty="0"/>
+              <a:t>Sistema de verificación de los certificados.</a:t>
+            </a:r>
+          </a:p>
+          <a:p>
+            <a:pPr marL="285750" indent="-285750">
+              <a:buFont typeface="Arial" panose="020B0604020202020204" pitchFamily="34" charset="0"/>
+              <a:buChar char="•"/>
+            </a:pPr>
+            <a:r>
+              <a:rPr lang="es-ES" sz="1600" dirty="0"/>
+              <a:t>Sistemas de firma electrónica.</a:t>
+            </a:r>
+          </a:p>
+          <a:p>
+            <a:pPr marL="285750" indent="-285750">
+              <a:buFont typeface="Arial" panose="020B0604020202020204" pitchFamily="34" charset="0"/>
+              <a:buChar char="•"/>
+            </a:pPr>
+            <a:r>
+              <a:rPr lang="es-ES" sz="1600" dirty="0"/>
+              <a:t>Normas de creación del registro electrónico.</a:t>
+            </a:r>
+          </a:p>
+          <a:p>
+            <a:pPr marL="285750" indent="-285750">
+              <a:buFont typeface="Arial" panose="020B0604020202020204" pitchFamily="34" charset="0"/>
+              <a:buChar char="•"/>
+            </a:pPr>
+            <a:endParaRPr lang="es-ES" sz="1600" dirty="0"/>
+          </a:p>
+          <a:p>
+            <a:pPr marL="285750" indent="-285750">
+              <a:buFont typeface="Arial" panose="020B0604020202020204" pitchFamily="34" charset="0"/>
+              <a:buChar char="•"/>
+            </a:pPr>
+            <a:endParaRPr lang="es-ES" sz="1600" dirty="0"/>
+          </a:p>
+          <a:p>
+            <a:pPr marL="285750" indent="-285750">
+              <a:buFont typeface="Arial" panose="020B0604020202020204" pitchFamily="34" charset="0"/>
+              <a:buChar char="•"/>
+            </a:pPr>
+            <a:endParaRPr lang="es-ES" sz="1600" dirty="0"/>
+          </a:p>
+          <a:p>
+            <a:pPr marL="285750" indent="-285750">
+              <a:buFont typeface="Arial" panose="020B0604020202020204" pitchFamily="34" charset="0"/>
+              <a:buChar char="•"/>
+            </a:pPr>
+            <a:endParaRPr lang="es-ES" sz="1600" dirty="0"/>
+          </a:p>
+          <a:p>
+            <a:pPr marL="285750" indent="-285750">
+              <a:buFont typeface="Arial" panose="020B0604020202020204" pitchFamily="34" charset="0"/>
+              <a:buChar char="•"/>
+            </a:pPr>
+            <a:endParaRPr lang="es-ES" sz="1600" dirty="0"/>
+          </a:p>
+          <a:p>
+            <a:pPr marL="285750" indent="-285750">
+              <a:buFont typeface="Arial" panose="020B0604020202020204" pitchFamily="34" charset="0"/>
+              <a:buChar char="•"/>
+            </a:pPr>
+            <a:endParaRPr lang="es-ES" sz="1600" dirty="0"/>
           </a:p>
         </p:txBody>
       </p:sp>
+      <p:sp>
+        <p:nvSpPr>
+          <p:cNvPr id="8" name="TextBox 7">
+            <a:extLst>
+              <a:ext uri="{FF2B5EF4-FFF2-40B4-BE49-F238E27FC236}">
+                <a16:creationId xmlns:a16="http://schemas.microsoft.com/office/drawing/2014/main" id="{6316ECC4-031D-4F42-83E0-485019ACAC1D}"/>
+              </a:ext>
+            </a:extLst>
+          </p:cNvPr>
+          <p:cNvSpPr txBox="1"/>
+          <p:nvPr/>
+        </p:nvSpPr>
+        <p:spPr>
+          <a:xfrm>
+            <a:off x="5798693" y="1690687"/>
+            <a:ext cx="5769863" cy="4524315"/>
+          </a:xfrm>
+          <a:prstGeom prst="rect">
+            <a:avLst/>
+          </a:prstGeom>
+          <a:noFill/>
+        </p:spPr>
+        <p:txBody>
+          <a:bodyPr wrap="square" rtlCol="0">
+            <a:spAutoFit/>
+          </a:bodyPr>
+          <a:lstStyle/>
+          <a:p>
+            <a:pPr marL="285750" indent="-285750">
+              <a:buFont typeface="Arial" panose="020B0604020202020204" pitchFamily="34" charset="0"/>
+              <a:buChar char="•"/>
+            </a:pPr>
+            <a:r>
+              <a:rPr lang="es-ES" sz="1600" dirty="0"/>
+              <a:t>Relación de los servicios disponibles en la sede electrónica. </a:t>
+            </a:r>
+          </a:p>
+          <a:p>
+            <a:pPr marL="285750" indent="-285750">
+              <a:buFont typeface="Arial" panose="020B0604020202020204" pitchFamily="34" charset="0"/>
+              <a:buChar char="•"/>
+            </a:pPr>
+            <a:r>
+              <a:rPr lang="es-ES" sz="1600" dirty="0"/>
+              <a:t>Carta de servicios. </a:t>
+            </a:r>
+          </a:p>
+          <a:p>
+            <a:pPr marL="285750" indent="-285750">
+              <a:buFont typeface="Arial" panose="020B0604020202020204" pitchFamily="34" charset="0"/>
+              <a:buChar char="•"/>
+            </a:pPr>
+            <a:r>
+              <a:rPr lang="es-ES" sz="1600" dirty="0"/>
+              <a:t>Carta de servicios electrónicos. </a:t>
+            </a:r>
+          </a:p>
+          <a:p>
+            <a:pPr marL="285750" indent="-285750">
+              <a:buFont typeface="Arial" panose="020B0604020202020204" pitchFamily="34" charset="0"/>
+              <a:buChar char="•"/>
+            </a:pPr>
+            <a:r>
+              <a:rPr lang="es-ES" sz="1600" dirty="0"/>
+              <a:t>Medios electrónicos que los usuarios pueden utilizar. </a:t>
+            </a:r>
+          </a:p>
+          <a:p>
+            <a:pPr marL="285750" indent="-285750">
+              <a:buFont typeface="Arial" panose="020B0604020202020204" pitchFamily="34" charset="0"/>
+              <a:buChar char="•"/>
+            </a:pPr>
+            <a:r>
+              <a:rPr lang="es-ES" sz="1600" dirty="0"/>
+              <a:t>Sistema de sugerencias y quejas ante otros órganos.</a:t>
+            </a:r>
+          </a:p>
+          <a:p>
+            <a:pPr marL="285750" indent="-285750">
+              <a:buFont typeface="Arial" panose="020B0604020202020204" pitchFamily="34" charset="0"/>
+              <a:buChar char="•"/>
+            </a:pPr>
+            <a:r>
+              <a:rPr lang="es-ES" sz="1600" dirty="0"/>
+              <a:t>Acceso al estado de tramitación del expediente. </a:t>
+            </a:r>
+          </a:p>
+          <a:p>
+            <a:pPr marL="285750" indent="-285750">
+              <a:buFont typeface="Arial" panose="020B0604020202020204" pitchFamily="34" charset="0"/>
+              <a:buChar char="•"/>
+            </a:pPr>
+            <a:r>
+              <a:rPr lang="es-ES" sz="1600" dirty="0"/>
+              <a:t>Publicación de los diarios o boletines. </a:t>
+            </a:r>
+          </a:p>
+          <a:p>
+            <a:pPr marL="285750" indent="-285750">
+              <a:buFont typeface="Arial" panose="020B0604020202020204" pitchFamily="34" charset="0"/>
+              <a:buChar char="•"/>
+            </a:pPr>
+            <a:r>
+              <a:rPr lang="es-ES" sz="1600" dirty="0"/>
+              <a:t>Tablón de anuncios.</a:t>
+            </a:r>
+          </a:p>
+          <a:p>
+            <a:pPr marL="285750" indent="-285750">
+              <a:buFont typeface="Arial" panose="020B0604020202020204" pitchFamily="34" charset="0"/>
+              <a:buChar char="•"/>
+            </a:pPr>
+            <a:r>
+              <a:rPr lang="es-ES" sz="1600" dirty="0"/>
+              <a:t>Verificación de los sellos electrónicos.</a:t>
+            </a:r>
+          </a:p>
+          <a:p>
+            <a:pPr marL="285750" indent="-285750">
+              <a:buFont typeface="Arial" panose="020B0604020202020204" pitchFamily="34" charset="0"/>
+              <a:buChar char="•"/>
+            </a:pPr>
+            <a:r>
+              <a:rPr lang="es-ES" sz="1600" dirty="0"/>
+              <a:t>Comprobación de la autenticidad e integridad.</a:t>
+            </a:r>
+          </a:p>
+          <a:p>
+            <a:pPr marL="285750" indent="-285750">
+              <a:buFont typeface="Arial" panose="020B0604020202020204" pitchFamily="34" charset="0"/>
+              <a:buChar char="•"/>
+            </a:pPr>
+            <a:r>
+              <a:rPr lang="es-ES" sz="1600" dirty="0"/>
+              <a:t>Indicación de la fecha y hora oficial. </a:t>
+            </a:r>
+          </a:p>
+          <a:p>
+            <a:pPr marL="285750" indent="-285750">
+              <a:buFont typeface="Arial" panose="020B0604020202020204" pitchFamily="34" charset="0"/>
+              <a:buChar char="•"/>
+            </a:pPr>
+            <a:r>
+              <a:rPr lang="es-ES" sz="1600" dirty="0"/>
+              <a:t>Lista con los días considerados inhábiles. </a:t>
+            </a:r>
+          </a:p>
+          <a:p>
+            <a:pPr marL="285750" indent="-285750">
+              <a:buFont typeface="Arial" panose="020B0604020202020204" pitchFamily="34" charset="0"/>
+              <a:buChar char="•"/>
+            </a:pPr>
+            <a:r>
+              <a:rPr lang="es-ES" sz="1600" dirty="0"/>
+              <a:t>Otros servicios o contenidos. </a:t>
+            </a:r>
+          </a:p>
+          <a:p>
+            <a:pPr marL="285750" indent="-285750">
+              <a:buFont typeface="Arial" panose="020B0604020202020204" pitchFamily="34" charset="0"/>
+              <a:buChar char="•"/>
+            </a:pPr>
+            <a:r>
+              <a:rPr lang="es-ES" sz="1600" dirty="0"/>
+              <a:t>Lenguas cooficiales. </a:t>
+            </a:r>
+          </a:p>
+          <a:p>
+            <a:pPr marL="285750" indent="-285750">
+              <a:buFont typeface="Arial" panose="020B0604020202020204" pitchFamily="34" charset="0"/>
+              <a:buChar char="•"/>
+            </a:pPr>
+            <a:r>
+              <a:rPr lang="es-ES" sz="1600" dirty="0"/>
+              <a:t>Información sobre cuando se está navegando dentro o fuera de la sede.</a:t>
+            </a:r>
+          </a:p>
+          <a:p>
+            <a:pPr marL="285750" indent="-285750">
+              <a:buFont typeface="Arial" panose="020B0604020202020204" pitchFamily="34" charset="0"/>
+              <a:buChar char="•"/>
+            </a:pPr>
+            <a:r>
+              <a:rPr lang="es-ES" sz="1600" dirty="0"/>
+              <a:t>Verifica los principios de accesibilidad y usabilidad. </a:t>
+            </a:r>
+          </a:p>
+          <a:p>
+            <a:pPr marL="285750" indent="-285750">
+              <a:buFont typeface="Arial" panose="020B0604020202020204" pitchFamily="34" charset="0"/>
+              <a:buChar char="•"/>
+            </a:pPr>
+            <a:r>
+              <a:rPr lang="es-ES" sz="1600" dirty="0"/>
+              <a:t>Elementos basados en estándares abiertos</a:t>
+            </a:r>
+          </a:p>
+        </p:txBody>
+      </p:sp>
+      <p:pic>
+        <p:nvPicPr>
+          <p:cNvPr id="9" name="Content Placeholder 8">
+            <a:extLst>
+              <a:ext uri="{FF2B5EF4-FFF2-40B4-BE49-F238E27FC236}">
+                <a16:creationId xmlns:a16="http://schemas.microsoft.com/office/drawing/2014/main" id="{3BDBB666-B0B7-E84B-9248-CEDDAAED96EA}"/>
+              </a:ext>
+            </a:extLst>
+          </p:cNvPr>
+          <p:cNvPicPr>
+            <a:picLocks noGrp="1" noChangeAspect="1"/>
+          </p:cNvPicPr>
+          <p:nvPr>
+            <p:ph idx="1"/>
+          </p:nvPr>
+        </p:nvPicPr>
+        <p:blipFill>
+          <a:blip r:embed="rId2"/>
+          <a:stretch>
+            <a:fillRect/>
+          </a:stretch>
+        </p:blipFill>
+        <p:spPr>
+          <a:xfrm>
+            <a:off x="6293422" y="732717"/>
+            <a:ext cx="5060378" cy="590377"/>
+          </a:xfrm>
+        </p:spPr>
+      </p:pic>
+      <p:pic>
+        <p:nvPicPr>
+          <p:cNvPr id="7" name="Graphic 10" descr="Checkmark">
+            <a:extLst>
+              <a:ext uri="{FF2B5EF4-FFF2-40B4-BE49-F238E27FC236}">
+                <a16:creationId xmlns:a16="http://schemas.microsoft.com/office/drawing/2014/main" id="{DFAB3C12-931D-4D7A-A205-F2299F0A8FA2}"/>
+              </a:ext>
+            </a:extLst>
+          </p:cNvPr>
+          <p:cNvPicPr>
+            <a:picLocks noChangeAspect="1"/>
+          </p:cNvPicPr>
+          <p:nvPr/>
+        </p:nvPicPr>
+        <p:blipFill>
+          <a:blip r:embed="rId3">
+            <a:extLst>
+              <a:ext uri="{96DAC541-7B7A-43D3-8B79-37D633B846F1}">
+                <asvg:svgBlip xmlns:asvg="http://schemas.microsoft.com/office/drawing/2016/SVG/main" r:embed="rId4"/>
+              </a:ext>
+            </a:extLst>
+          </a:blip>
+          <a:stretch>
+            <a:fillRect/>
+          </a:stretch>
+        </p:blipFill>
+        <p:spPr>
+          <a:xfrm>
+            <a:off x="663767" y="1773522"/>
+            <a:ext cx="174433" cy="174433"/>
+          </a:xfrm>
+          <a:prstGeom prst="rect">
+            <a:avLst/>
+          </a:prstGeom>
+        </p:spPr>
+      </p:pic>
+      <p:pic>
+        <p:nvPicPr>
+          <p:cNvPr id="10" name="Graphic 16" descr="Close">
+            <a:extLst>
+              <a:ext uri="{FF2B5EF4-FFF2-40B4-BE49-F238E27FC236}">
+                <a16:creationId xmlns:a16="http://schemas.microsoft.com/office/drawing/2014/main" id="{5EC0146D-CC17-4959-BBF0-27384A3C68C5}"/>
+              </a:ext>
+            </a:extLst>
+          </p:cNvPr>
+          <p:cNvPicPr>
+            <a:picLocks noChangeAspect="1"/>
+          </p:cNvPicPr>
+          <p:nvPr/>
+        </p:nvPicPr>
+        <p:blipFill>
+          <a:blip r:embed="rId5">
+            <a:extLst>
+              <a:ext uri="{96DAC541-7B7A-43D3-8B79-37D633B846F1}">
+                <asvg:svgBlip xmlns:asvg="http://schemas.microsoft.com/office/drawing/2016/SVG/main" r:embed="rId6"/>
+              </a:ext>
+            </a:extLst>
+          </a:blip>
+          <a:stretch>
+            <a:fillRect/>
+          </a:stretch>
+        </p:blipFill>
+        <p:spPr>
+          <a:xfrm>
+            <a:off x="664352" y="2987670"/>
+            <a:ext cx="174433" cy="174433"/>
+          </a:xfrm>
+          <a:prstGeom prst="rect">
+            <a:avLst/>
+          </a:prstGeom>
+        </p:spPr>
+      </p:pic>
+      <p:pic>
+        <p:nvPicPr>
+          <p:cNvPr id="11" name="Graphic 10" descr="Checkmark">
+            <a:extLst>
+              <a:ext uri="{FF2B5EF4-FFF2-40B4-BE49-F238E27FC236}">
+                <a16:creationId xmlns:a16="http://schemas.microsoft.com/office/drawing/2014/main" id="{99FE28A2-C9AD-4ACB-8EE8-AA5480FFACF9}"/>
+              </a:ext>
+            </a:extLst>
+          </p:cNvPr>
+          <p:cNvPicPr>
+            <a:picLocks noChangeAspect="1"/>
+          </p:cNvPicPr>
+          <p:nvPr/>
+        </p:nvPicPr>
+        <p:blipFill>
+          <a:blip r:embed="rId3">
+            <a:extLst>
+              <a:ext uri="{96DAC541-7B7A-43D3-8B79-37D633B846F1}">
+                <asvg:svgBlip xmlns:asvg="http://schemas.microsoft.com/office/drawing/2016/SVG/main" r:embed="rId4"/>
+              </a:ext>
+            </a:extLst>
+          </a:blip>
+          <a:stretch>
+            <a:fillRect/>
+          </a:stretch>
+        </p:blipFill>
+        <p:spPr>
+          <a:xfrm>
+            <a:off x="663767" y="2030789"/>
+            <a:ext cx="174433" cy="174433"/>
+          </a:xfrm>
+          <a:prstGeom prst="rect">
+            <a:avLst/>
+          </a:prstGeom>
+        </p:spPr>
+      </p:pic>
+      <p:pic>
+        <p:nvPicPr>
+          <p:cNvPr id="12" name="Graphic 10" descr="Checkmark">
+            <a:extLst>
+              <a:ext uri="{FF2B5EF4-FFF2-40B4-BE49-F238E27FC236}">
+                <a16:creationId xmlns:a16="http://schemas.microsoft.com/office/drawing/2014/main" id="{E8D537D6-F1E8-4B60-A6DE-B270C425E88C}"/>
+              </a:ext>
+            </a:extLst>
+          </p:cNvPr>
+          <p:cNvPicPr>
+            <a:picLocks noChangeAspect="1"/>
+          </p:cNvPicPr>
+          <p:nvPr/>
+        </p:nvPicPr>
+        <p:blipFill>
+          <a:blip r:embed="rId3">
+            <a:extLst>
+              <a:ext uri="{96DAC541-7B7A-43D3-8B79-37D633B846F1}">
+                <asvg:svgBlip xmlns:asvg="http://schemas.microsoft.com/office/drawing/2016/SVG/main" r:embed="rId4"/>
+              </a:ext>
+            </a:extLst>
+          </a:blip>
+          <a:stretch>
+            <a:fillRect/>
+          </a:stretch>
+        </p:blipFill>
+        <p:spPr>
+          <a:xfrm>
+            <a:off x="663767" y="2270405"/>
+            <a:ext cx="174433" cy="174433"/>
+          </a:xfrm>
+          <a:prstGeom prst="rect">
+            <a:avLst/>
+          </a:prstGeom>
+        </p:spPr>
+      </p:pic>
+      <p:pic>
+        <p:nvPicPr>
+          <p:cNvPr id="14" name="Graphic 10" descr="Checkmark">
+            <a:extLst>
+              <a:ext uri="{FF2B5EF4-FFF2-40B4-BE49-F238E27FC236}">
+                <a16:creationId xmlns:a16="http://schemas.microsoft.com/office/drawing/2014/main" id="{E0A4A0A2-C452-4265-A2C8-9DF2BF3BF0C7}"/>
+              </a:ext>
+            </a:extLst>
+          </p:cNvPr>
+          <p:cNvPicPr>
+            <a:picLocks noChangeAspect="1"/>
+          </p:cNvPicPr>
+          <p:nvPr/>
+        </p:nvPicPr>
+        <p:blipFill>
+          <a:blip r:embed="rId3">
+            <a:extLst>
+              <a:ext uri="{96DAC541-7B7A-43D3-8B79-37D633B846F1}">
+                <asvg:svgBlip xmlns:asvg="http://schemas.microsoft.com/office/drawing/2016/SVG/main" r:embed="rId4"/>
+              </a:ext>
+            </a:extLst>
+          </a:blip>
+          <a:stretch>
+            <a:fillRect/>
+          </a:stretch>
+        </p:blipFill>
+        <p:spPr>
+          <a:xfrm>
+            <a:off x="664352" y="2749637"/>
+            <a:ext cx="174433" cy="174433"/>
+          </a:xfrm>
+          <a:prstGeom prst="rect">
+            <a:avLst/>
+          </a:prstGeom>
+        </p:spPr>
+      </p:pic>
+      <p:pic>
+        <p:nvPicPr>
+          <p:cNvPr id="15" name="Graphic 42" descr="Pause">
+            <a:extLst>
+              <a:ext uri="{FF2B5EF4-FFF2-40B4-BE49-F238E27FC236}">
+                <a16:creationId xmlns:a16="http://schemas.microsoft.com/office/drawing/2014/main" id="{48988207-60C5-4437-BDF2-A0512BAD62AF}"/>
+              </a:ext>
+            </a:extLst>
+          </p:cNvPr>
+          <p:cNvPicPr>
+            <a:picLocks noChangeAspect="1"/>
+          </p:cNvPicPr>
+          <p:nvPr/>
+        </p:nvPicPr>
+        <p:blipFill>
+          <a:blip r:embed="rId7">
+            <a:extLst>
+              <a:ext uri="{96DAC541-7B7A-43D3-8B79-37D633B846F1}">
+                <asvg:svgBlip xmlns:asvg="http://schemas.microsoft.com/office/drawing/2016/SVG/main" r:embed="rId8"/>
+              </a:ext>
+            </a:extLst>
+          </a:blip>
+          <a:stretch>
+            <a:fillRect/>
+          </a:stretch>
+        </p:blipFill>
+        <p:spPr>
+          <a:xfrm>
+            <a:off x="663766" y="2508438"/>
+            <a:ext cx="174433" cy="174433"/>
+          </a:xfrm>
+          <a:prstGeom prst="rect">
+            <a:avLst/>
+          </a:prstGeom>
+        </p:spPr>
+      </p:pic>
+      <p:pic>
+        <p:nvPicPr>
+          <p:cNvPr id="16" name="Graphic 16" descr="Close">
+            <a:extLst>
+              <a:ext uri="{FF2B5EF4-FFF2-40B4-BE49-F238E27FC236}">
+                <a16:creationId xmlns:a16="http://schemas.microsoft.com/office/drawing/2014/main" id="{BBB5D431-56DF-4320-AF63-36AC0AB5E4A6}"/>
+              </a:ext>
+            </a:extLst>
+          </p:cNvPr>
+          <p:cNvPicPr>
+            <a:picLocks noChangeAspect="1"/>
+          </p:cNvPicPr>
+          <p:nvPr/>
+        </p:nvPicPr>
+        <p:blipFill>
+          <a:blip r:embed="rId5">
+            <a:extLst>
+              <a:ext uri="{96DAC541-7B7A-43D3-8B79-37D633B846F1}">
+                <asvg:svgBlip xmlns:asvg="http://schemas.microsoft.com/office/drawing/2016/SVG/main" r:embed="rId6"/>
+              </a:ext>
+            </a:extLst>
+          </a:blip>
+          <a:stretch>
+            <a:fillRect/>
+          </a:stretch>
+        </p:blipFill>
+        <p:spPr>
+          <a:xfrm>
+            <a:off x="664352" y="3243354"/>
+            <a:ext cx="174433" cy="174433"/>
+          </a:xfrm>
+          <a:prstGeom prst="rect">
+            <a:avLst/>
+          </a:prstGeom>
+        </p:spPr>
+      </p:pic>
+      <p:pic>
+        <p:nvPicPr>
+          <p:cNvPr id="17" name="Graphic 10" descr="Checkmark">
+            <a:extLst>
+              <a:ext uri="{FF2B5EF4-FFF2-40B4-BE49-F238E27FC236}">
+                <a16:creationId xmlns:a16="http://schemas.microsoft.com/office/drawing/2014/main" id="{867C8598-0C13-4CF1-BA50-7AE60FE4070F}"/>
+              </a:ext>
+            </a:extLst>
+          </p:cNvPr>
+          <p:cNvPicPr>
+            <a:picLocks noChangeAspect="1"/>
+          </p:cNvPicPr>
+          <p:nvPr/>
+        </p:nvPicPr>
+        <p:blipFill>
+          <a:blip r:embed="rId3">
+            <a:extLst>
+              <a:ext uri="{96DAC541-7B7A-43D3-8B79-37D633B846F1}">
+                <asvg:svgBlip xmlns:asvg="http://schemas.microsoft.com/office/drawing/2016/SVG/main" r:embed="rId4"/>
+              </a:ext>
+            </a:extLst>
+          </a:blip>
+          <a:stretch>
+            <a:fillRect/>
+          </a:stretch>
+        </p:blipFill>
+        <p:spPr>
+          <a:xfrm>
+            <a:off x="664352" y="3962202"/>
+            <a:ext cx="174433" cy="174433"/>
+          </a:xfrm>
+          <a:prstGeom prst="rect">
+            <a:avLst/>
+          </a:prstGeom>
+        </p:spPr>
+      </p:pic>
+      <p:pic>
+        <p:nvPicPr>
+          <p:cNvPr id="18" name="Graphic 10" descr="Checkmark">
+            <a:extLst>
+              <a:ext uri="{FF2B5EF4-FFF2-40B4-BE49-F238E27FC236}">
+                <a16:creationId xmlns:a16="http://schemas.microsoft.com/office/drawing/2014/main" id="{555B2EE8-2024-4DC5-A388-CCB2C9B753D7}"/>
+              </a:ext>
+            </a:extLst>
+          </p:cNvPr>
+          <p:cNvPicPr>
+            <a:picLocks noChangeAspect="1"/>
+          </p:cNvPicPr>
+          <p:nvPr/>
+        </p:nvPicPr>
+        <p:blipFill>
+          <a:blip r:embed="rId3">
+            <a:extLst>
+              <a:ext uri="{96DAC541-7B7A-43D3-8B79-37D633B846F1}">
+                <asvg:svgBlip xmlns:asvg="http://schemas.microsoft.com/office/drawing/2016/SVG/main" r:embed="rId4"/>
+              </a:ext>
+            </a:extLst>
+          </a:blip>
+          <a:stretch>
+            <a:fillRect/>
+          </a:stretch>
+        </p:blipFill>
+        <p:spPr>
+          <a:xfrm>
+            <a:off x="664352" y="3716241"/>
+            <a:ext cx="174433" cy="174433"/>
+          </a:xfrm>
+          <a:prstGeom prst="rect">
+            <a:avLst/>
+          </a:prstGeom>
+        </p:spPr>
+      </p:pic>
+      <p:pic>
+        <p:nvPicPr>
+          <p:cNvPr id="19" name="Graphic 10" descr="Checkmark">
+            <a:extLst>
+              <a:ext uri="{FF2B5EF4-FFF2-40B4-BE49-F238E27FC236}">
+                <a16:creationId xmlns:a16="http://schemas.microsoft.com/office/drawing/2014/main" id="{20D6033D-32E2-4358-8E4B-E43E0A9EB8F0}"/>
+              </a:ext>
+            </a:extLst>
+          </p:cNvPr>
+          <p:cNvPicPr>
+            <a:picLocks noChangeAspect="1"/>
+          </p:cNvPicPr>
+          <p:nvPr/>
+        </p:nvPicPr>
+        <p:blipFill>
+          <a:blip r:embed="rId3">
+            <a:extLst>
+              <a:ext uri="{96DAC541-7B7A-43D3-8B79-37D633B846F1}">
+                <asvg:svgBlip xmlns:asvg="http://schemas.microsoft.com/office/drawing/2016/SVG/main" r:embed="rId4"/>
+              </a:ext>
+            </a:extLst>
+          </a:blip>
+          <a:stretch>
+            <a:fillRect/>
+          </a:stretch>
+        </p:blipFill>
+        <p:spPr>
+          <a:xfrm>
+            <a:off x="663765" y="4198851"/>
+            <a:ext cx="174433" cy="174433"/>
+          </a:xfrm>
+          <a:prstGeom prst="rect">
+            <a:avLst/>
+          </a:prstGeom>
+        </p:spPr>
+      </p:pic>
+      <p:pic>
+        <p:nvPicPr>
+          <p:cNvPr id="20" name="Graphic 10" descr="Checkmark">
+            <a:extLst>
+              <a:ext uri="{FF2B5EF4-FFF2-40B4-BE49-F238E27FC236}">
+                <a16:creationId xmlns:a16="http://schemas.microsoft.com/office/drawing/2014/main" id="{BB5E463A-A03C-4BDF-98EA-663D3730FCEC}"/>
+              </a:ext>
+            </a:extLst>
+          </p:cNvPr>
+          <p:cNvPicPr>
+            <a:picLocks noChangeAspect="1"/>
+          </p:cNvPicPr>
+          <p:nvPr/>
+        </p:nvPicPr>
+        <p:blipFill>
+          <a:blip r:embed="rId3">
+            <a:extLst>
+              <a:ext uri="{96DAC541-7B7A-43D3-8B79-37D633B846F1}">
+                <asvg:svgBlip xmlns:asvg="http://schemas.microsoft.com/office/drawing/2016/SVG/main" r:embed="rId4"/>
+              </a:ext>
+            </a:extLst>
+          </a:blip>
+          <a:stretch>
+            <a:fillRect/>
+          </a:stretch>
+        </p:blipFill>
+        <p:spPr>
+          <a:xfrm>
+            <a:off x="663764" y="4446424"/>
+            <a:ext cx="174433" cy="174433"/>
+          </a:xfrm>
+          <a:prstGeom prst="rect">
+            <a:avLst/>
+          </a:prstGeom>
+        </p:spPr>
+      </p:pic>
+      <p:pic>
+        <p:nvPicPr>
+          <p:cNvPr id="21" name="Graphic 10" descr="Checkmark">
+            <a:extLst>
+              <a:ext uri="{FF2B5EF4-FFF2-40B4-BE49-F238E27FC236}">
+                <a16:creationId xmlns:a16="http://schemas.microsoft.com/office/drawing/2014/main" id="{99D32EE2-629F-49D7-9D1D-ED330E49B5BF}"/>
+              </a:ext>
+            </a:extLst>
+          </p:cNvPr>
+          <p:cNvPicPr>
+            <a:picLocks noChangeAspect="1"/>
+          </p:cNvPicPr>
+          <p:nvPr/>
+        </p:nvPicPr>
+        <p:blipFill>
+          <a:blip r:embed="rId3">
+            <a:extLst>
+              <a:ext uri="{96DAC541-7B7A-43D3-8B79-37D633B846F1}">
+                <asvg:svgBlip xmlns:asvg="http://schemas.microsoft.com/office/drawing/2016/SVG/main" r:embed="rId4"/>
+              </a:ext>
+            </a:extLst>
+          </a:blip>
+          <a:stretch>
+            <a:fillRect/>
+          </a:stretch>
+        </p:blipFill>
+        <p:spPr>
+          <a:xfrm>
+            <a:off x="664352" y="4681263"/>
+            <a:ext cx="174433" cy="174433"/>
+          </a:xfrm>
+          <a:prstGeom prst="rect">
+            <a:avLst/>
+          </a:prstGeom>
+        </p:spPr>
+      </p:pic>
+      <p:pic>
+        <p:nvPicPr>
+          <p:cNvPr id="22" name="Graphic 10" descr="Checkmark">
+            <a:extLst>
+              <a:ext uri="{FF2B5EF4-FFF2-40B4-BE49-F238E27FC236}">
+                <a16:creationId xmlns:a16="http://schemas.microsoft.com/office/drawing/2014/main" id="{2E1DFA79-1952-4500-A121-3E5AC3D0AB0C}"/>
+              </a:ext>
+            </a:extLst>
+          </p:cNvPr>
+          <p:cNvPicPr>
+            <a:picLocks noChangeAspect="1"/>
+          </p:cNvPicPr>
+          <p:nvPr/>
+        </p:nvPicPr>
+        <p:blipFill>
+          <a:blip r:embed="rId3">
+            <a:extLst>
+              <a:ext uri="{96DAC541-7B7A-43D3-8B79-37D633B846F1}">
+                <asvg:svgBlip xmlns:asvg="http://schemas.microsoft.com/office/drawing/2016/SVG/main" r:embed="rId4"/>
+              </a:ext>
+            </a:extLst>
+          </a:blip>
+          <a:stretch>
+            <a:fillRect/>
+          </a:stretch>
+        </p:blipFill>
+        <p:spPr>
+          <a:xfrm>
+            <a:off x="664352" y="4932001"/>
+            <a:ext cx="174433" cy="174433"/>
+          </a:xfrm>
+          <a:prstGeom prst="rect">
+            <a:avLst/>
+          </a:prstGeom>
+        </p:spPr>
+      </p:pic>
+      <p:pic>
+        <p:nvPicPr>
+          <p:cNvPr id="23" name="Graphic 42" descr="Pause">
+            <a:extLst>
+              <a:ext uri="{FF2B5EF4-FFF2-40B4-BE49-F238E27FC236}">
+                <a16:creationId xmlns:a16="http://schemas.microsoft.com/office/drawing/2014/main" id="{AE70BF19-EA61-47C4-9C37-5FCC012808B8}"/>
+              </a:ext>
+            </a:extLst>
+          </p:cNvPr>
+          <p:cNvPicPr>
+            <a:picLocks noChangeAspect="1"/>
+          </p:cNvPicPr>
+          <p:nvPr/>
+        </p:nvPicPr>
+        <p:blipFill>
+          <a:blip r:embed="rId7">
+            <a:extLst>
+              <a:ext uri="{96DAC541-7B7A-43D3-8B79-37D633B846F1}">
+                <asvg:svgBlip xmlns:asvg="http://schemas.microsoft.com/office/drawing/2016/SVG/main" r:embed="rId8"/>
+              </a:ext>
+            </a:extLst>
+          </a:blip>
+          <a:stretch>
+            <a:fillRect/>
+          </a:stretch>
+        </p:blipFill>
+        <p:spPr>
+          <a:xfrm>
+            <a:off x="664352" y="5417989"/>
+            <a:ext cx="174433" cy="174433"/>
+          </a:xfrm>
+          <a:prstGeom prst="rect">
+            <a:avLst/>
+          </a:prstGeom>
+        </p:spPr>
+      </p:pic>
+      <p:pic>
+        <p:nvPicPr>
+          <p:cNvPr id="26" name="Graphic 10" descr="Checkmark">
+            <a:extLst>
+              <a:ext uri="{FF2B5EF4-FFF2-40B4-BE49-F238E27FC236}">
+                <a16:creationId xmlns:a16="http://schemas.microsoft.com/office/drawing/2014/main" id="{924E917A-D700-45AA-891C-1C31927CEA1E}"/>
+              </a:ext>
+            </a:extLst>
+          </p:cNvPr>
+          <p:cNvPicPr>
+            <a:picLocks noChangeAspect="1"/>
+          </p:cNvPicPr>
+          <p:nvPr/>
+        </p:nvPicPr>
+        <p:blipFill>
+          <a:blip r:embed="rId3">
+            <a:extLst>
+              <a:ext uri="{96DAC541-7B7A-43D3-8B79-37D633B846F1}">
+                <asvg:svgBlip xmlns:asvg="http://schemas.microsoft.com/office/drawing/2016/SVG/main" r:embed="rId4"/>
+              </a:ext>
+            </a:extLst>
+          </a:blip>
+          <a:stretch>
+            <a:fillRect/>
+          </a:stretch>
+        </p:blipFill>
+        <p:spPr>
+          <a:xfrm>
+            <a:off x="663763" y="6155429"/>
+            <a:ext cx="174433" cy="174433"/>
+          </a:xfrm>
+          <a:prstGeom prst="rect">
+            <a:avLst/>
+          </a:prstGeom>
+        </p:spPr>
+      </p:pic>
+      <p:pic>
+        <p:nvPicPr>
+          <p:cNvPr id="27" name="Graphic 10" descr="Checkmark">
+            <a:extLst>
+              <a:ext uri="{FF2B5EF4-FFF2-40B4-BE49-F238E27FC236}">
+                <a16:creationId xmlns:a16="http://schemas.microsoft.com/office/drawing/2014/main" id="{2DBFDAC0-0930-407A-AAF1-4F95107B34B7}"/>
+              </a:ext>
+            </a:extLst>
+          </p:cNvPr>
+          <p:cNvPicPr>
+            <a:picLocks noChangeAspect="1"/>
+          </p:cNvPicPr>
+          <p:nvPr/>
+        </p:nvPicPr>
+        <p:blipFill>
+          <a:blip r:embed="rId3">
+            <a:extLst>
+              <a:ext uri="{96DAC541-7B7A-43D3-8B79-37D633B846F1}">
+                <asvg:svgBlip xmlns:asvg="http://schemas.microsoft.com/office/drawing/2016/SVG/main" r:embed="rId4"/>
+              </a:ext>
+            </a:extLst>
+          </a:blip>
+          <a:stretch>
+            <a:fillRect/>
+          </a:stretch>
+        </p:blipFill>
+        <p:spPr>
+          <a:xfrm>
+            <a:off x="663762" y="3477462"/>
+            <a:ext cx="174433" cy="174433"/>
+          </a:xfrm>
+          <a:prstGeom prst="rect">
+            <a:avLst/>
+          </a:prstGeom>
+        </p:spPr>
+      </p:pic>
+      <p:pic>
+        <p:nvPicPr>
+          <p:cNvPr id="28" name="Graphic 10" descr="Checkmark">
+            <a:extLst>
+              <a:ext uri="{FF2B5EF4-FFF2-40B4-BE49-F238E27FC236}">
+                <a16:creationId xmlns:a16="http://schemas.microsoft.com/office/drawing/2014/main" id="{4AC2CC5A-1BE0-4D2A-9929-17C32C91594D}"/>
+              </a:ext>
+            </a:extLst>
+          </p:cNvPr>
+          <p:cNvPicPr>
+            <a:picLocks noChangeAspect="1"/>
+          </p:cNvPicPr>
+          <p:nvPr/>
+        </p:nvPicPr>
+        <p:blipFill>
+          <a:blip r:embed="rId3">
+            <a:extLst>
+              <a:ext uri="{96DAC541-7B7A-43D3-8B79-37D633B846F1}">
+                <asvg:svgBlip xmlns:asvg="http://schemas.microsoft.com/office/drawing/2016/SVG/main" r:embed="rId4"/>
+              </a:ext>
+            </a:extLst>
+          </a:blip>
+          <a:stretch>
+            <a:fillRect/>
+          </a:stretch>
+        </p:blipFill>
+        <p:spPr>
+          <a:xfrm>
+            <a:off x="663761" y="5649129"/>
+            <a:ext cx="174433" cy="174433"/>
+          </a:xfrm>
+          <a:prstGeom prst="rect">
+            <a:avLst/>
+          </a:prstGeom>
+        </p:spPr>
+      </p:pic>
+      <p:pic>
+        <p:nvPicPr>
+          <p:cNvPr id="29" name="Graphic 10" descr="Checkmark">
+            <a:extLst>
+              <a:ext uri="{FF2B5EF4-FFF2-40B4-BE49-F238E27FC236}">
+                <a16:creationId xmlns:a16="http://schemas.microsoft.com/office/drawing/2014/main" id="{3304B8B1-1397-430B-AC80-9709475F4801}"/>
+              </a:ext>
+            </a:extLst>
+          </p:cNvPr>
+          <p:cNvPicPr>
+            <a:picLocks noChangeAspect="1"/>
+          </p:cNvPicPr>
+          <p:nvPr/>
+        </p:nvPicPr>
+        <p:blipFill>
+          <a:blip r:embed="rId3">
+            <a:extLst>
+              <a:ext uri="{96DAC541-7B7A-43D3-8B79-37D633B846F1}">
+                <asvg:svgBlip xmlns:asvg="http://schemas.microsoft.com/office/drawing/2016/SVG/main" r:embed="rId4"/>
+              </a:ext>
+            </a:extLst>
+          </a:blip>
+          <a:stretch>
+            <a:fillRect/>
+          </a:stretch>
+        </p:blipFill>
+        <p:spPr>
+          <a:xfrm>
+            <a:off x="663760" y="5898434"/>
+            <a:ext cx="174433" cy="174433"/>
+          </a:xfrm>
+          <a:prstGeom prst="rect">
+            <a:avLst/>
+          </a:prstGeom>
+        </p:spPr>
+      </p:pic>
+      <p:pic>
+        <p:nvPicPr>
+          <p:cNvPr id="30" name="Graphic 42" descr="Pause">
+            <a:extLst>
+              <a:ext uri="{FF2B5EF4-FFF2-40B4-BE49-F238E27FC236}">
+                <a16:creationId xmlns:a16="http://schemas.microsoft.com/office/drawing/2014/main" id="{97FD80C8-F6DC-42ED-BA62-090CC2E2852C}"/>
+              </a:ext>
+            </a:extLst>
+          </p:cNvPr>
+          <p:cNvPicPr>
+            <a:picLocks noChangeAspect="1"/>
+          </p:cNvPicPr>
+          <p:nvPr/>
+        </p:nvPicPr>
+        <p:blipFill>
+          <a:blip r:embed="rId7">
+            <a:extLst>
+              <a:ext uri="{96DAC541-7B7A-43D3-8B79-37D633B846F1}">
+                <asvg:svgBlip xmlns:asvg="http://schemas.microsoft.com/office/drawing/2016/SVG/main" r:embed="rId8"/>
+              </a:ext>
+            </a:extLst>
+          </a:blip>
+          <a:stretch>
+            <a:fillRect/>
+          </a:stretch>
+        </p:blipFill>
+        <p:spPr>
+          <a:xfrm>
+            <a:off x="5624256" y="5185795"/>
+            <a:ext cx="174433" cy="174433"/>
+          </a:xfrm>
+          <a:prstGeom prst="rect">
+            <a:avLst/>
+          </a:prstGeom>
+        </p:spPr>
+      </p:pic>
+      <p:pic>
+        <p:nvPicPr>
+          <p:cNvPr id="31" name="Graphic 10" descr="Checkmark">
+            <a:extLst>
+              <a:ext uri="{FF2B5EF4-FFF2-40B4-BE49-F238E27FC236}">
+                <a16:creationId xmlns:a16="http://schemas.microsoft.com/office/drawing/2014/main" id="{977686C8-FA2E-4E2D-A6CA-C02C932B94F2}"/>
+              </a:ext>
+            </a:extLst>
+          </p:cNvPr>
+          <p:cNvPicPr>
+            <a:picLocks noChangeAspect="1"/>
+          </p:cNvPicPr>
+          <p:nvPr/>
+        </p:nvPicPr>
+        <p:blipFill>
+          <a:blip r:embed="rId3">
+            <a:extLst>
+              <a:ext uri="{96DAC541-7B7A-43D3-8B79-37D633B846F1}">
+                <asvg:svgBlip xmlns:asvg="http://schemas.microsoft.com/office/drawing/2016/SVG/main" r:embed="rId4"/>
+              </a:ext>
+            </a:extLst>
+          </a:blip>
+          <a:stretch>
+            <a:fillRect/>
+          </a:stretch>
+        </p:blipFill>
+        <p:spPr>
+          <a:xfrm>
+            <a:off x="5624260" y="1773521"/>
+            <a:ext cx="174433" cy="174433"/>
+          </a:xfrm>
+          <a:prstGeom prst="rect">
+            <a:avLst/>
+          </a:prstGeom>
+        </p:spPr>
+      </p:pic>
+      <p:pic>
+        <p:nvPicPr>
+          <p:cNvPr id="32" name="Graphic 10" descr="Checkmark">
+            <a:extLst>
+              <a:ext uri="{FF2B5EF4-FFF2-40B4-BE49-F238E27FC236}">
+                <a16:creationId xmlns:a16="http://schemas.microsoft.com/office/drawing/2014/main" id="{119C37D7-7BF8-4A64-B423-CBFE2ECAC8A6}"/>
+              </a:ext>
+            </a:extLst>
+          </p:cNvPr>
+          <p:cNvPicPr>
+            <a:picLocks noChangeAspect="1"/>
+          </p:cNvPicPr>
+          <p:nvPr/>
+        </p:nvPicPr>
+        <p:blipFill>
+          <a:blip r:embed="rId3">
+            <a:extLst>
+              <a:ext uri="{96DAC541-7B7A-43D3-8B79-37D633B846F1}">
+                <asvg:svgBlip xmlns:asvg="http://schemas.microsoft.com/office/drawing/2016/SVG/main" r:embed="rId4"/>
+              </a:ext>
+            </a:extLst>
+          </a:blip>
+          <a:stretch>
+            <a:fillRect/>
+          </a:stretch>
+        </p:blipFill>
+        <p:spPr>
+          <a:xfrm>
+            <a:off x="5624260" y="2012346"/>
+            <a:ext cx="174433" cy="174433"/>
+          </a:xfrm>
+          <a:prstGeom prst="rect">
+            <a:avLst/>
+          </a:prstGeom>
+        </p:spPr>
+      </p:pic>
+      <p:pic>
+        <p:nvPicPr>
+          <p:cNvPr id="33" name="Graphic 10" descr="Checkmark">
+            <a:extLst>
+              <a:ext uri="{FF2B5EF4-FFF2-40B4-BE49-F238E27FC236}">
+                <a16:creationId xmlns:a16="http://schemas.microsoft.com/office/drawing/2014/main" id="{896A20F6-A8C7-49B9-8D48-80B39BA8BA97}"/>
+              </a:ext>
+            </a:extLst>
+          </p:cNvPr>
+          <p:cNvPicPr>
+            <a:picLocks noChangeAspect="1"/>
+          </p:cNvPicPr>
+          <p:nvPr/>
+        </p:nvPicPr>
+        <p:blipFill>
+          <a:blip r:embed="rId3">
+            <a:extLst>
+              <a:ext uri="{96DAC541-7B7A-43D3-8B79-37D633B846F1}">
+                <asvg:svgBlip xmlns:asvg="http://schemas.microsoft.com/office/drawing/2016/SVG/main" r:embed="rId4"/>
+              </a:ext>
+            </a:extLst>
+          </a:blip>
+          <a:stretch>
+            <a:fillRect/>
+          </a:stretch>
+        </p:blipFill>
+        <p:spPr>
+          <a:xfrm>
+            <a:off x="5624260" y="2268729"/>
+            <a:ext cx="174433" cy="174433"/>
+          </a:xfrm>
+          <a:prstGeom prst="rect">
+            <a:avLst/>
+          </a:prstGeom>
+        </p:spPr>
+      </p:pic>
+      <p:pic>
+        <p:nvPicPr>
+          <p:cNvPr id="34" name="Graphic 10" descr="Checkmark">
+            <a:extLst>
+              <a:ext uri="{FF2B5EF4-FFF2-40B4-BE49-F238E27FC236}">
+                <a16:creationId xmlns:a16="http://schemas.microsoft.com/office/drawing/2014/main" id="{71A96DE1-DE92-401D-BB26-4250FA72B7E8}"/>
+              </a:ext>
+            </a:extLst>
+          </p:cNvPr>
+          <p:cNvPicPr>
+            <a:picLocks noChangeAspect="1"/>
+          </p:cNvPicPr>
+          <p:nvPr/>
+        </p:nvPicPr>
+        <p:blipFill>
+          <a:blip r:embed="rId3">
+            <a:extLst>
+              <a:ext uri="{96DAC541-7B7A-43D3-8B79-37D633B846F1}">
+                <asvg:svgBlip xmlns:asvg="http://schemas.microsoft.com/office/drawing/2016/SVG/main" r:embed="rId4"/>
+              </a:ext>
+            </a:extLst>
+          </a:blip>
+          <a:stretch>
+            <a:fillRect/>
+          </a:stretch>
+        </p:blipFill>
+        <p:spPr>
+          <a:xfrm>
+            <a:off x="5624259" y="2525112"/>
+            <a:ext cx="174433" cy="174433"/>
+          </a:xfrm>
+          <a:prstGeom prst="rect">
+            <a:avLst/>
+          </a:prstGeom>
+        </p:spPr>
+      </p:pic>
+      <p:pic>
+        <p:nvPicPr>
+          <p:cNvPr id="36" name="Graphic 10" descr="Checkmark">
+            <a:extLst>
+              <a:ext uri="{FF2B5EF4-FFF2-40B4-BE49-F238E27FC236}">
+                <a16:creationId xmlns:a16="http://schemas.microsoft.com/office/drawing/2014/main" id="{2DAC181D-92BB-47A2-A1F1-73742D9BD1A5}"/>
+              </a:ext>
+            </a:extLst>
+          </p:cNvPr>
+          <p:cNvPicPr>
+            <a:picLocks noChangeAspect="1"/>
+          </p:cNvPicPr>
+          <p:nvPr/>
+        </p:nvPicPr>
+        <p:blipFill>
+          <a:blip r:embed="rId3">
+            <a:extLst>
+              <a:ext uri="{96DAC541-7B7A-43D3-8B79-37D633B846F1}">
+                <asvg:svgBlip xmlns:asvg="http://schemas.microsoft.com/office/drawing/2016/SVG/main" r:embed="rId4"/>
+              </a:ext>
+            </a:extLst>
+          </a:blip>
+          <a:stretch>
+            <a:fillRect/>
+          </a:stretch>
+        </p:blipFill>
+        <p:spPr>
+          <a:xfrm>
+            <a:off x="5624260" y="3037878"/>
+            <a:ext cx="174433" cy="174433"/>
+          </a:xfrm>
+          <a:prstGeom prst="rect">
+            <a:avLst/>
+          </a:prstGeom>
+        </p:spPr>
+      </p:pic>
+      <p:pic>
+        <p:nvPicPr>
+          <p:cNvPr id="37" name="Graphic 10" descr="Checkmark">
+            <a:extLst>
+              <a:ext uri="{FF2B5EF4-FFF2-40B4-BE49-F238E27FC236}">
+                <a16:creationId xmlns:a16="http://schemas.microsoft.com/office/drawing/2014/main" id="{2002377F-7A91-4F98-9FAC-9A78337504CA}"/>
+              </a:ext>
+            </a:extLst>
+          </p:cNvPr>
+          <p:cNvPicPr>
+            <a:picLocks noChangeAspect="1"/>
+          </p:cNvPicPr>
+          <p:nvPr/>
+        </p:nvPicPr>
+        <p:blipFill>
+          <a:blip r:embed="rId3">
+            <a:extLst>
+              <a:ext uri="{96DAC541-7B7A-43D3-8B79-37D633B846F1}">
+                <asvg:svgBlip xmlns:asvg="http://schemas.microsoft.com/office/drawing/2016/SVG/main" r:embed="rId4"/>
+              </a:ext>
+            </a:extLst>
+          </a:blip>
+          <a:stretch>
+            <a:fillRect/>
+          </a:stretch>
+        </p:blipFill>
+        <p:spPr>
+          <a:xfrm>
+            <a:off x="5624260" y="3254567"/>
+            <a:ext cx="174433" cy="174433"/>
+          </a:xfrm>
+          <a:prstGeom prst="rect">
+            <a:avLst/>
+          </a:prstGeom>
+        </p:spPr>
+      </p:pic>
+      <p:pic>
+        <p:nvPicPr>
+          <p:cNvPr id="38" name="Graphic 10" descr="Checkmark">
+            <a:extLst>
+              <a:ext uri="{FF2B5EF4-FFF2-40B4-BE49-F238E27FC236}">
+                <a16:creationId xmlns:a16="http://schemas.microsoft.com/office/drawing/2014/main" id="{17123EAD-C48E-4E43-B53C-3B35304189AC}"/>
+              </a:ext>
+            </a:extLst>
+          </p:cNvPr>
+          <p:cNvPicPr>
+            <a:picLocks noChangeAspect="1"/>
+          </p:cNvPicPr>
+          <p:nvPr/>
+        </p:nvPicPr>
+        <p:blipFill>
+          <a:blip r:embed="rId3">
+            <a:extLst>
+              <a:ext uri="{96DAC541-7B7A-43D3-8B79-37D633B846F1}">
+                <asvg:svgBlip xmlns:asvg="http://schemas.microsoft.com/office/drawing/2016/SVG/main" r:embed="rId4"/>
+              </a:ext>
+            </a:extLst>
+          </a:blip>
+          <a:stretch>
+            <a:fillRect/>
+          </a:stretch>
+        </p:blipFill>
+        <p:spPr>
+          <a:xfrm>
+            <a:off x="5624260" y="3499507"/>
+            <a:ext cx="174433" cy="174433"/>
+          </a:xfrm>
+          <a:prstGeom prst="rect">
+            <a:avLst/>
+          </a:prstGeom>
+        </p:spPr>
+      </p:pic>
+      <p:pic>
+        <p:nvPicPr>
+          <p:cNvPr id="39" name="Graphic 10" descr="Checkmark">
+            <a:extLst>
+              <a:ext uri="{FF2B5EF4-FFF2-40B4-BE49-F238E27FC236}">
+                <a16:creationId xmlns:a16="http://schemas.microsoft.com/office/drawing/2014/main" id="{5FE82606-DC32-41A8-A811-D8EF6FF1A7BB}"/>
+              </a:ext>
+            </a:extLst>
+          </p:cNvPr>
+          <p:cNvPicPr>
+            <a:picLocks noChangeAspect="1"/>
+          </p:cNvPicPr>
+          <p:nvPr/>
+        </p:nvPicPr>
+        <p:blipFill>
+          <a:blip r:embed="rId3">
+            <a:extLst>
+              <a:ext uri="{96DAC541-7B7A-43D3-8B79-37D633B846F1}">
+                <asvg:svgBlip xmlns:asvg="http://schemas.microsoft.com/office/drawing/2016/SVG/main" r:embed="rId4"/>
+              </a:ext>
+            </a:extLst>
+          </a:blip>
+          <a:stretch>
+            <a:fillRect/>
+          </a:stretch>
+        </p:blipFill>
+        <p:spPr>
+          <a:xfrm>
+            <a:off x="5624260" y="3962202"/>
+            <a:ext cx="174433" cy="174433"/>
+          </a:xfrm>
+          <a:prstGeom prst="rect">
+            <a:avLst/>
+          </a:prstGeom>
+        </p:spPr>
+      </p:pic>
+      <p:pic>
+        <p:nvPicPr>
+          <p:cNvPr id="40" name="Graphic 10" descr="Checkmark">
+            <a:extLst>
+              <a:ext uri="{FF2B5EF4-FFF2-40B4-BE49-F238E27FC236}">
+                <a16:creationId xmlns:a16="http://schemas.microsoft.com/office/drawing/2014/main" id="{C30FA359-C03D-4610-B4FA-0FF4F37C52C3}"/>
+              </a:ext>
+            </a:extLst>
+          </p:cNvPr>
+          <p:cNvPicPr>
+            <a:picLocks noChangeAspect="1"/>
+          </p:cNvPicPr>
+          <p:nvPr/>
+        </p:nvPicPr>
+        <p:blipFill>
+          <a:blip r:embed="rId3">
+            <a:extLst>
+              <a:ext uri="{96DAC541-7B7A-43D3-8B79-37D633B846F1}">
+                <asvg:svgBlip xmlns:asvg="http://schemas.microsoft.com/office/drawing/2016/SVG/main" r:embed="rId4"/>
+              </a:ext>
+            </a:extLst>
+          </a:blip>
+          <a:stretch>
+            <a:fillRect/>
+          </a:stretch>
+        </p:blipFill>
+        <p:spPr>
+          <a:xfrm>
+            <a:off x="5624260" y="4206534"/>
+            <a:ext cx="174433" cy="174433"/>
+          </a:xfrm>
+          <a:prstGeom prst="rect">
+            <a:avLst/>
+          </a:prstGeom>
+        </p:spPr>
+      </p:pic>
+      <p:pic>
+        <p:nvPicPr>
+          <p:cNvPr id="41" name="Graphic 16" descr="Close">
+            <a:extLst>
+              <a:ext uri="{FF2B5EF4-FFF2-40B4-BE49-F238E27FC236}">
+                <a16:creationId xmlns:a16="http://schemas.microsoft.com/office/drawing/2014/main" id="{1D136C57-EAD8-4DA4-AD8E-F53AC52AD942}"/>
+              </a:ext>
+            </a:extLst>
+          </p:cNvPr>
+          <p:cNvPicPr>
+            <a:picLocks noChangeAspect="1"/>
+          </p:cNvPicPr>
+          <p:nvPr/>
+        </p:nvPicPr>
+        <p:blipFill>
+          <a:blip r:embed="rId5">
+            <a:extLst>
+              <a:ext uri="{96DAC541-7B7A-43D3-8B79-37D633B846F1}">
+                <asvg:svgBlip xmlns:asvg="http://schemas.microsoft.com/office/drawing/2016/SVG/main" r:embed="rId6"/>
+              </a:ext>
+            </a:extLst>
+          </a:blip>
+          <a:stretch>
+            <a:fillRect/>
+          </a:stretch>
+        </p:blipFill>
+        <p:spPr>
+          <a:xfrm>
+            <a:off x="5624257" y="4924455"/>
+            <a:ext cx="174433" cy="174433"/>
+          </a:xfrm>
+          <a:prstGeom prst="rect">
+            <a:avLst/>
+          </a:prstGeom>
+        </p:spPr>
+      </p:pic>
+      <p:pic>
+        <p:nvPicPr>
+          <p:cNvPr id="46" name="Graphic 16" descr="Close">
+            <a:extLst>
+              <a:ext uri="{FF2B5EF4-FFF2-40B4-BE49-F238E27FC236}">
+                <a16:creationId xmlns:a16="http://schemas.microsoft.com/office/drawing/2014/main" id="{A61E4023-0BE0-4E21-8917-E920014D0ABD}"/>
+              </a:ext>
+            </a:extLst>
+          </p:cNvPr>
+          <p:cNvPicPr>
+            <a:picLocks noChangeAspect="1"/>
+          </p:cNvPicPr>
+          <p:nvPr/>
+        </p:nvPicPr>
+        <p:blipFill>
+          <a:blip r:embed="rId5">
+            <a:extLst>
+              <a:ext uri="{96DAC541-7B7A-43D3-8B79-37D633B846F1}">
+                <asvg:svgBlip xmlns:asvg="http://schemas.microsoft.com/office/drawing/2016/SVG/main" r:embed="rId6"/>
+              </a:ext>
+            </a:extLst>
+          </a:blip>
+          <a:stretch>
+            <a:fillRect/>
+          </a:stretch>
+        </p:blipFill>
+        <p:spPr>
+          <a:xfrm>
+            <a:off x="5630446" y="5908172"/>
+            <a:ext cx="174433" cy="174433"/>
+          </a:xfrm>
+          <a:prstGeom prst="rect">
+            <a:avLst/>
+          </a:prstGeom>
+        </p:spPr>
+      </p:pic>
+      <p:pic>
+        <p:nvPicPr>
+          <p:cNvPr id="47" name="Graphic 16" descr="Close">
+            <a:extLst>
+              <a:ext uri="{FF2B5EF4-FFF2-40B4-BE49-F238E27FC236}">
+                <a16:creationId xmlns:a16="http://schemas.microsoft.com/office/drawing/2014/main" id="{6186DC35-0907-44FB-8094-4FE2C0A016DE}"/>
+              </a:ext>
+            </a:extLst>
+          </p:cNvPr>
+          <p:cNvPicPr>
+            <a:picLocks noChangeAspect="1"/>
+          </p:cNvPicPr>
+          <p:nvPr/>
+        </p:nvPicPr>
+        <p:blipFill>
+          <a:blip r:embed="rId5">
+            <a:extLst>
+              <a:ext uri="{96DAC541-7B7A-43D3-8B79-37D633B846F1}">
+                <asvg:svgBlip xmlns:asvg="http://schemas.microsoft.com/office/drawing/2016/SVG/main" r:embed="rId6"/>
+              </a:ext>
+            </a:extLst>
+          </a:blip>
+          <a:stretch>
+            <a:fillRect/>
+          </a:stretch>
+        </p:blipFill>
+        <p:spPr>
+          <a:xfrm>
+            <a:off x="5624254" y="2740190"/>
+            <a:ext cx="174433" cy="174433"/>
+          </a:xfrm>
+          <a:prstGeom prst="rect">
+            <a:avLst/>
+          </a:prstGeom>
+        </p:spPr>
+      </p:pic>
+      <p:pic>
+        <p:nvPicPr>
+          <p:cNvPr id="48" name="Graphic 10" descr="Checkmark">
+            <a:extLst>
+              <a:ext uri="{FF2B5EF4-FFF2-40B4-BE49-F238E27FC236}">
+                <a16:creationId xmlns:a16="http://schemas.microsoft.com/office/drawing/2014/main" id="{0358AB83-23EE-4CBF-9CF7-E1992FFA78A6}"/>
+              </a:ext>
+            </a:extLst>
+          </p:cNvPr>
+          <p:cNvPicPr>
+            <a:picLocks noChangeAspect="1"/>
+          </p:cNvPicPr>
+          <p:nvPr/>
+        </p:nvPicPr>
+        <p:blipFill>
+          <a:blip r:embed="rId3">
+            <a:extLst>
+              <a:ext uri="{96DAC541-7B7A-43D3-8B79-37D633B846F1}">
+                <asvg:svgBlip xmlns:asvg="http://schemas.microsoft.com/office/drawing/2016/SVG/main" r:embed="rId4"/>
+              </a:ext>
+            </a:extLst>
+          </a:blip>
+          <a:stretch>
+            <a:fillRect/>
+          </a:stretch>
+        </p:blipFill>
+        <p:spPr>
+          <a:xfrm>
+            <a:off x="5630446" y="3739123"/>
+            <a:ext cx="174433" cy="174433"/>
+          </a:xfrm>
+          <a:prstGeom prst="rect">
+            <a:avLst/>
+          </a:prstGeom>
+        </p:spPr>
+      </p:pic>
+      <p:pic>
+        <p:nvPicPr>
+          <p:cNvPr id="49" name="Graphic 42" descr="Pause">
+            <a:extLst>
+              <a:ext uri="{FF2B5EF4-FFF2-40B4-BE49-F238E27FC236}">
+                <a16:creationId xmlns:a16="http://schemas.microsoft.com/office/drawing/2014/main" id="{2A0B7610-03E5-4A80-8C4C-01EE051DF06B}"/>
+              </a:ext>
+            </a:extLst>
+          </p:cNvPr>
+          <p:cNvPicPr>
+            <a:picLocks noChangeAspect="1"/>
+          </p:cNvPicPr>
+          <p:nvPr/>
+        </p:nvPicPr>
+        <p:blipFill>
+          <a:blip r:embed="rId7">
+            <a:extLst>
+              <a:ext uri="{96DAC541-7B7A-43D3-8B79-37D633B846F1}">
+                <asvg:svgBlip xmlns:asvg="http://schemas.microsoft.com/office/drawing/2016/SVG/main" r:embed="rId8"/>
+              </a:ext>
+            </a:extLst>
+          </a:blip>
+          <a:stretch>
+            <a:fillRect/>
+          </a:stretch>
+        </p:blipFill>
+        <p:spPr>
+          <a:xfrm>
+            <a:off x="5630446" y="4681263"/>
+            <a:ext cx="174433" cy="174433"/>
+          </a:xfrm>
+          <a:prstGeom prst="rect">
+            <a:avLst/>
+          </a:prstGeom>
+        </p:spPr>
+      </p:pic>
+      <p:pic>
+        <p:nvPicPr>
+          <p:cNvPr id="50" name="Graphic 10" descr="Checkmark">
+            <a:extLst>
+              <a:ext uri="{FF2B5EF4-FFF2-40B4-BE49-F238E27FC236}">
+                <a16:creationId xmlns:a16="http://schemas.microsoft.com/office/drawing/2014/main" id="{CC280B4D-505A-49FF-B7C6-5D4B0178117A}"/>
+              </a:ext>
+            </a:extLst>
+          </p:cNvPr>
+          <p:cNvPicPr>
+            <a:picLocks noChangeAspect="1"/>
+          </p:cNvPicPr>
+          <p:nvPr/>
+        </p:nvPicPr>
+        <p:blipFill>
+          <a:blip r:embed="rId3">
+            <a:extLst>
+              <a:ext uri="{96DAC541-7B7A-43D3-8B79-37D633B846F1}">
+                <asvg:svgBlip xmlns:asvg="http://schemas.microsoft.com/office/drawing/2016/SVG/main" r:embed="rId4"/>
+              </a:ext>
+            </a:extLst>
+          </a:blip>
+          <a:stretch>
+            <a:fillRect/>
+          </a:stretch>
+        </p:blipFill>
+        <p:spPr>
+          <a:xfrm>
+            <a:off x="5624260" y="4444673"/>
+            <a:ext cx="174433" cy="174433"/>
+          </a:xfrm>
+          <a:prstGeom prst="rect">
+            <a:avLst/>
+          </a:prstGeom>
+        </p:spPr>
+      </p:pic>
+      <p:pic>
+        <p:nvPicPr>
+          <p:cNvPr id="51" name="Graphic 16" descr="Close">
+            <a:extLst>
+              <a:ext uri="{FF2B5EF4-FFF2-40B4-BE49-F238E27FC236}">
+                <a16:creationId xmlns:a16="http://schemas.microsoft.com/office/drawing/2014/main" id="{37C363BE-63A3-49EF-85F6-797581BBE64D}"/>
+              </a:ext>
+            </a:extLst>
+          </p:cNvPr>
+          <p:cNvPicPr>
+            <a:picLocks noChangeAspect="1"/>
+          </p:cNvPicPr>
+          <p:nvPr/>
+        </p:nvPicPr>
+        <p:blipFill>
+          <a:blip r:embed="rId5">
+            <a:extLst>
+              <a:ext uri="{96DAC541-7B7A-43D3-8B79-37D633B846F1}">
+                <asvg:svgBlip xmlns:asvg="http://schemas.microsoft.com/office/drawing/2016/SVG/main" r:embed="rId6"/>
+              </a:ext>
+            </a:extLst>
+          </a:blip>
+          <a:stretch>
+            <a:fillRect/>
+          </a:stretch>
+        </p:blipFill>
+        <p:spPr>
+          <a:xfrm>
+            <a:off x="5624253" y="5652791"/>
+            <a:ext cx="174433" cy="174433"/>
+          </a:xfrm>
+          <a:prstGeom prst="rect">
+            <a:avLst/>
+          </a:prstGeom>
+        </p:spPr>
+      </p:pic>
     </p:spTree>
     <p:extLst>
       <p:ext uri="{BB962C8B-B14F-4D97-AF65-F5344CB8AC3E}">
-        <p14:creationId xmlns:p14="http://schemas.microsoft.com/office/powerpoint/2010/main" val="1131964363"/>
+        <p14:creationId xmlns:p14="http://schemas.microsoft.com/office/powerpoint/2010/main" val="1640389907"/>
       </p:ext>
     </p:extLst>
   </p:cSld>
@@ -3739,7 +5275,7 @@
           <p:cNvPr id="2" name="Title 1">
             <a:extLst>
               <a:ext uri="{FF2B5EF4-FFF2-40B4-BE49-F238E27FC236}">
-                <a16:creationId xmlns:a16="http://schemas.microsoft.com/office/drawing/2014/main" id="{C299B638-D437-5844-9473-7CACDEEB2340}"/>
+                <a16:creationId xmlns:a16="http://schemas.microsoft.com/office/drawing/2014/main" id="{3A0ED5DF-9378-9B43-8F1A-9AE79F2FA4FC}"/>
               </a:ext>
             </a:extLst>
           </p:cNvPr>
@@ -3757,40 +5293,219 @@
           <a:p>
             <a:r>
               <a:rPr lang="es-ES_tradnl" dirty="0"/>
-              <a:t>Protección de datos</a:t>
-            </a:r>
+              <a:t>Plataforma electrónica</a:t>
+            </a:r>
+          </a:p>
+        </p:txBody>
+      </p:sp>
+      <p:pic>
+        <p:nvPicPr>
+          <p:cNvPr id="1026" name="Picture 2" descr="/var/folders/s3/wwp7g3hn3r94628zwgkf5f800000gn/T/com.microsoft.Powerpoint/WebArchiveCopyPasteTempFiles/2Q==">
+            <a:extLst>
+              <a:ext uri="{FF2B5EF4-FFF2-40B4-BE49-F238E27FC236}">
+                <a16:creationId xmlns:a16="http://schemas.microsoft.com/office/drawing/2014/main" id="{17029D5D-B602-FB44-99A4-3717E61F8078}"/>
+              </a:ext>
+            </a:extLst>
+          </p:cNvPr>
+          <p:cNvPicPr>
+            <a:picLocks noGrp="1" noChangeAspect="1" noChangeArrowheads="1"/>
+          </p:cNvPicPr>
+          <p:nvPr>
+            <p:ph idx="1"/>
+          </p:nvPr>
+        </p:nvPicPr>
+        <p:blipFill>
+          <a:blip r:embed="rId2">
+            <a:extLst>
+              <a:ext uri="{28A0092B-C50C-407E-A947-70E740481C1C}">
+                <a14:useLocalDpi xmlns:a14="http://schemas.microsoft.com/office/drawing/2010/main" val="0"/>
+              </a:ext>
+            </a:extLst>
+          </a:blip>
+          <a:srcRect/>
+          <a:stretch>
+            <a:fillRect/>
+          </a:stretch>
+        </p:blipFill>
+        <p:spPr bwMode="auto">
+          <a:xfrm>
+            <a:off x="838200" y="1986962"/>
+            <a:ext cx="6502400" cy="3962400"/>
+          </a:xfrm>
+          <a:prstGeom prst="rect">
+            <a:avLst/>
+          </a:prstGeom>
+          <a:noFill/>
+          <a:extLst>
+            <a:ext uri="{909E8E84-426E-40DD-AFC4-6F175D3DCCD1}">
+              <a14:hiddenFill xmlns:a14="http://schemas.microsoft.com/office/drawing/2010/main">
+                <a:solidFill>
+                  <a:srgbClr val="FFFFFF"/>
+                </a:solidFill>
+              </a14:hiddenFill>
+            </a:ext>
+          </a:extLst>
+        </p:spPr>
+      </p:pic>
+      <p:sp>
+        <p:nvSpPr>
+          <p:cNvPr id="4" name="TextBox 3">
+            <a:extLst>
+              <a:ext uri="{FF2B5EF4-FFF2-40B4-BE49-F238E27FC236}">
+                <a16:creationId xmlns:a16="http://schemas.microsoft.com/office/drawing/2014/main" id="{E9F9E150-E408-8749-80A0-7C522CA71B62}"/>
+              </a:ext>
+            </a:extLst>
+          </p:cNvPr>
+          <p:cNvSpPr txBox="1"/>
+          <p:nvPr/>
+        </p:nvSpPr>
+        <p:spPr>
+          <a:xfrm>
+            <a:off x="8330184" y="2675500"/>
+            <a:ext cx="2832763" cy="2585323"/>
+          </a:xfrm>
+          <a:prstGeom prst="rect">
+            <a:avLst/>
+          </a:prstGeom>
+          <a:noFill/>
+        </p:spPr>
+        <p:txBody>
+          <a:bodyPr wrap="none" rtlCol="0">
+            <a:spAutoFit/>
+          </a:bodyPr>
+          <a:lstStyle/>
+          <a:p>
+            <a:pPr marL="285750" indent="-285750">
+              <a:buFont typeface="Arial" panose="020B0604020202020204" pitchFamily="34" charset="0"/>
+              <a:buChar char="•"/>
+            </a:pPr>
+            <a:r>
+              <a:rPr lang="es-ES_tradnl" dirty="0"/>
+              <a:t>Sede electrónica</a:t>
+            </a:r>
+          </a:p>
+          <a:p>
+            <a:pPr marL="285750" indent="-285750">
+              <a:buFont typeface="Arial" panose="020B0604020202020204" pitchFamily="34" charset="0"/>
+              <a:buChar char="•"/>
+            </a:pPr>
+            <a:r>
+              <a:rPr lang="es-ES_tradnl" dirty="0"/>
+              <a:t>Gestor de formularios  </a:t>
+            </a:r>
+          </a:p>
+          <a:p>
+            <a:pPr marL="285750" indent="-285750">
+              <a:buFont typeface="Arial" panose="020B0604020202020204" pitchFamily="34" charset="0"/>
+              <a:buChar char="•"/>
+            </a:pPr>
+            <a:r>
+              <a:rPr lang="es-ES_tradnl" dirty="0"/>
+              <a:t>Registro electrónico </a:t>
+            </a:r>
+          </a:p>
+          <a:p>
+            <a:pPr marL="285750" indent="-285750">
+              <a:buFont typeface="Arial" panose="020B0604020202020204" pitchFamily="34" charset="0"/>
+              <a:buChar char="•"/>
+            </a:pPr>
+            <a:r>
+              <a:rPr lang="es-ES_tradnl" dirty="0"/>
+              <a:t>Pasarela de pagos </a:t>
+            </a:r>
+          </a:p>
+          <a:p>
+            <a:pPr marL="285750" indent="-285750">
+              <a:buFont typeface="Arial" panose="020B0604020202020204" pitchFamily="34" charset="0"/>
+              <a:buChar char="•"/>
+            </a:pPr>
+            <a:r>
+              <a:rPr lang="es-ES" dirty="0"/>
+              <a:t>Gestor de expedientes </a:t>
+            </a:r>
+          </a:p>
+          <a:p>
+            <a:pPr marL="285750" indent="-285750">
+              <a:buFont typeface="Arial" panose="020B0604020202020204" pitchFamily="34" charset="0"/>
+              <a:buChar char="•"/>
+            </a:pPr>
+            <a:r>
+              <a:rPr lang="es-ES" dirty="0"/>
+              <a:t>Notificación electrónica </a:t>
+            </a:r>
+          </a:p>
+          <a:p>
+            <a:pPr marL="285750" indent="-285750">
+              <a:buFont typeface="Arial" panose="020B0604020202020204" pitchFamily="34" charset="0"/>
+              <a:buChar char="•"/>
+            </a:pPr>
+            <a:r>
+              <a:rPr lang="es-ES" dirty="0"/>
+              <a:t>Identificación electrónica</a:t>
+            </a:r>
+          </a:p>
+          <a:p>
+            <a:pPr marL="285750" indent="-285750">
+              <a:buFont typeface="Arial" panose="020B0604020202020204" pitchFamily="34" charset="0"/>
+              <a:buChar char="•"/>
+            </a:pPr>
+            <a:r>
+              <a:rPr lang="es-ES" dirty="0"/>
+              <a:t>Archivo electrónico  </a:t>
+            </a:r>
+          </a:p>
+          <a:p>
+            <a:pPr marL="285750" indent="-285750">
+              <a:buFont typeface="Arial" panose="020B0604020202020204" pitchFamily="34" charset="0"/>
+              <a:buChar char="•"/>
+            </a:pPr>
+            <a:r>
+              <a:rPr lang="es-ES" dirty="0"/>
+              <a:t>Interoperabilidad </a:t>
+            </a:r>
+            <a:endParaRPr lang="es-ES_tradnl" dirty="0"/>
           </a:p>
         </p:txBody>
       </p:sp>
       <p:sp>
         <p:nvSpPr>
-          <p:cNvPr id="3" name="Content Placeholder 2">
-            <a:extLst>
-              <a:ext uri="{FF2B5EF4-FFF2-40B4-BE49-F238E27FC236}">
-                <a16:creationId xmlns:a16="http://schemas.microsoft.com/office/drawing/2014/main" id="{D872D86F-37FF-4944-BEE0-8912D6B6F8FB}"/>
-              </a:ext>
-            </a:extLst>
-          </p:cNvPr>
-          <p:cNvSpPr>
-            <a:spLocks noGrp="1"/>
-          </p:cNvSpPr>
-          <p:nvPr>
-            <p:ph idx="1"/>
-          </p:nvPr>
+          <p:cNvPr id="5" name="TextBox 4">
+            <a:extLst>
+              <a:ext uri="{FF2B5EF4-FFF2-40B4-BE49-F238E27FC236}">
+                <a16:creationId xmlns:a16="http://schemas.microsoft.com/office/drawing/2014/main" id="{DD5B5F20-F0DF-B541-A66C-0E21C42C33D7}"/>
+              </a:ext>
+            </a:extLst>
+          </p:cNvPr>
+          <p:cNvSpPr txBox="1"/>
+          <p:nvPr/>
         </p:nvSpPr>
-        <p:spPr/>
+        <p:spPr>
+          <a:xfrm>
+            <a:off x="8330184" y="843240"/>
+            <a:ext cx="2547172" cy="369332"/>
+          </a:xfrm>
+          <a:prstGeom prst="rect">
+            <a:avLst/>
+          </a:prstGeom>
+          <a:noFill/>
+        </p:spPr>
         <p:txBody>
-          <a:bodyPr/>
+          <a:bodyPr wrap="none" rtlCol="0">
+            <a:spAutoFit/>
+          </a:bodyPr>
           <a:lstStyle/>
           <a:p>
-            <a:endParaRPr lang="es-ES_tradnl"/>
+            <a:r>
+              <a:rPr lang="es-ES_tradnl" dirty="0"/>
+              <a:t>Componentes + Procesos</a:t>
+            </a:r>
           </a:p>
         </p:txBody>
       </p:sp>
     </p:spTree>
     <p:extLst>
       <p:ext uri="{BB962C8B-B14F-4D97-AF65-F5344CB8AC3E}">
-        <p14:creationId xmlns:p14="http://schemas.microsoft.com/office/powerpoint/2010/main" val="2368114116"/>
+        <p14:creationId xmlns:p14="http://schemas.microsoft.com/office/powerpoint/2010/main" val="1131964363"/>
       </p:ext>
     </p:extLst>
   </p:cSld>
@@ -3822,7 +5537,7 @@
           <p:cNvPr id="2" name="Title 1">
             <a:extLst>
               <a:ext uri="{FF2B5EF4-FFF2-40B4-BE49-F238E27FC236}">
-                <a16:creationId xmlns:a16="http://schemas.microsoft.com/office/drawing/2014/main" id="{41709DB8-628E-9041-8A74-1637C6B770EB}"/>
+                <a16:creationId xmlns:a16="http://schemas.microsoft.com/office/drawing/2014/main" id="{C299B638-D437-5844-9473-7CACDEEB2340}"/>
               </a:ext>
             </a:extLst>
           </p:cNvPr>
@@ -3840,109 +5555,431 @@
           <a:p>
             <a:r>
               <a:rPr lang="es-ES_tradnl" dirty="0"/>
-              <a:t>ERP</a:t>
+              <a:t>Protección de datos</a:t>
             </a:r>
           </a:p>
         </p:txBody>
       </p:sp>
-      <p:pic>
-        <p:nvPicPr>
-          <p:cNvPr id="5" name="Content Placeholder 4">
-            <a:extLst>
-              <a:ext uri="{FF2B5EF4-FFF2-40B4-BE49-F238E27FC236}">
-                <a16:creationId xmlns:a16="http://schemas.microsoft.com/office/drawing/2014/main" id="{10EC1A2E-A7B3-A740-ABD8-F578297A6466}"/>
-              </a:ext>
-            </a:extLst>
-          </p:cNvPr>
-          <p:cNvPicPr>
-            <a:picLocks noGrp="1" noChangeAspect="1"/>
-          </p:cNvPicPr>
+      <p:sp>
+        <p:nvSpPr>
+          <p:cNvPr id="3" name="Content Placeholder 2">
+            <a:extLst>
+              <a:ext uri="{FF2B5EF4-FFF2-40B4-BE49-F238E27FC236}">
+                <a16:creationId xmlns:a16="http://schemas.microsoft.com/office/drawing/2014/main" id="{D872D86F-37FF-4944-BEE0-8912D6B6F8FB}"/>
+              </a:ext>
+            </a:extLst>
+          </p:cNvPr>
+          <p:cNvSpPr>
+            <a:spLocks noGrp="1"/>
+          </p:cNvSpPr>
           <p:nvPr>
             <p:ph idx="1"/>
           </p:nvPr>
-        </p:nvPicPr>
-        <p:blipFill>
-          <a:blip r:embed="rId2"/>
-          <a:stretch>
-            <a:fillRect/>
-          </a:stretch>
-        </p:blipFill>
-        <p:spPr>
-          <a:xfrm>
-            <a:off x="7708390" y="2971800"/>
-            <a:ext cx="3733800" cy="914400"/>
-          </a:xfrm>
-        </p:spPr>
-      </p:pic>
-      <p:pic>
-        <p:nvPicPr>
-          <p:cNvPr id="7" name="Picture 6" descr="A close up of a logo&#10;&#10;Description automatically generated">
-            <a:extLst>
-              <a:ext uri="{FF2B5EF4-FFF2-40B4-BE49-F238E27FC236}">
-                <a16:creationId xmlns:a16="http://schemas.microsoft.com/office/drawing/2014/main" id="{4490F50A-6730-AA44-8857-96530D90E2B8}"/>
-              </a:ext>
-            </a:extLst>
-          </p:cNvPr>
-          <p:cNvPicPr>
-            <a:picLocks noChangeAspect="1"/>
-          </p:cNvPicPr>
-          <p:nvPr/>
-        </p:nvPicPr>
-        <p:blipFill>
-          <a:blip r:embed="rId3"/>
-          <a:stretch>
-            <a:fillRect/>
-          </a:stretch>
-        </p:blipFill>
-        <p:spPr>
-          <a:xfrm>
-            <a:off x="673609" y="2635250"/>
-            <a:ext cx="3810000" cy="1587500"/>
-          </a:xfrm>
-          <a:prstGeom prst="rect">
-            <a:avLst/>
-          </a:prstGeom>
-        </p:spPr>
-      </p:pic>
-      <p:sp>
-        <p:nvSpPr>
-          <p:cNvPr id="8" name="TextBox 7">
-            <a:extLst>
-              <a:ext uri="{FF2B5EF4-FFF2-40B4-BE49-F238E27FC236}">
-                <a16:creationId xmlns:a16="http://schemas.microsoft.com/office/drawing/2014/main" id="{5FE4F3CD-FD10-734B-B378-8CA9FE652255}"/>
-              </a:ext>
-            </a:extLst>
-          </p:cNvPr>
-          <p:cNvSpPr txBox="1"/>
-          <p:nvPr/>
         </p:nvSpPr>
         <p:spPr>
           <a:xfrm>
-            <a:off x="5898125" y="3244334"/>
-            <a:ext cx="395749" cy="369332"/>
-          </a:xfrm>
-          <a:prstGeom prst="rect">
-            <a:avLst/>
-          </a:prstGeom>
-          <a:noFill/>
+            <a:off x="195309" y="1305016"/>
+            <a:ext cx="11745157" cy="5299969"/>
+          </a:xfrm>
         </p:spPr>
         <p:txBody>
-          <a:bodyPr wrap="none" rtlCol="0">
-            <a:spAutoFit/>
+          <a:bodyPr numCol="2">
+            <a:noAutofit/>
           </a:bodyPr>
           <a:lstStyle/>
           <a:p>
-            <a:r>
-              <a:rPr lang="es-ES_tradnl" dirty="0"/>
-              <a:t>Vs</a:t>
+            <a:pPr marL="514350" indent="-514350">
+              <a:buFont typeface="+mj-lt"/>
+              <a:buAutoNum type="arabicPeriod"/>
+            </a:pPr>
+            <a:r>
+              <a:rPr lang="es-ES_tradnl" sz="1800" b="1" dirty="0"/>
+              <a:t>Ámbito de aplicación</a:t>
+            </a:r>
+            <a:r>
+              <a:rPr lang="es-ES_tradnl" sz="1800" dirty="0"/>
+              <a:t>:</a:t>
+            </a:r>
+          </a:p>
+          <a:p>
+            <a:pPr marL="971550" lvl="1" indent="-514350">
+              <a:buFont typeface="+mj-lt"/>
+              <a:buAutoNum type="alphaLcParenR"/>
+            </a:pPr>
+            <a:r>
+              <a:rPr lang="es-ES_tradnl" sz="1600" dirty="0"/>
+              <a:t>RGPD</a:t>
+            </a:r>
+          </a:p>
+          <a:p>
+            <a:pPr marL="971550" lvl="1" indent="-514350">
+              <a:buFont typeface="+mj-lt"/>
+              <a:buAutoNum type="alphaLcParenR"/>
+            </a:pPr>
+            <a:r>
+              <a:rPr lang="es-ES_tradnl" sz="1600" dirty="0" err="1"/>
+              <a:t>Privacy</a:t>
+            </a:r>
+            <a:r>
+              <a:rPr lang="es-ES_tradnl" sz="1600" dirty="0"/>
+              <a:t> </a:t>
+            </a:r>
+            <a:r>
+              <a:rPr lang="es-ES_tradnl" sz="1600" dirty="0" err="1"/>
+              <a:t>by</a:t>
+            </a:r>
+            <a:r>
+              <a:rPr lang="es-ES_tradnl" sz="1600" dirty="0"/>
+              <a:t> </a:t>
+            </a:r>
+            <a:r>
+              <a:rPr lang="es-ES_tradnl" sz="1600" dirty="0" err="1"/>
+              <a:t>Design</a:t>
+            </a:r>
+            <a:endParaRPr lang="es-ES_tradnl" sz="1600" dirty="0"/>
+          </a:p>
+          <a:p>
+            <a:pPr marL="971550" lvl="1" indent="-514350">
+              <a:buFont typeface="+mj-lt"/>
+              <a:buAutoNum type="alphaLcParenR"/>
+            </a:pPr>
+            <a:r>
+              <a:rPr lang="es-ES_tradnl" sz="1600" dirty="0" err="1"/>
+              <a:t>Accountability</a:t>
+            </a:r>
+            <a:r>
+              <a:rPr lang="es-ES_tradnl" sz="1600" dirty="0"/>
+              <a:t>-Principio de responsabilidad activa</a:t>
+            </a:r>
+          </a:p>
+          <a:p>
+            <a:pPr marL="971550" lvl="1" indent="-514350">
+              <a:buFont typeface="+mj-lt"/>
+              <a:buAutoNum type="alphaLcParenR"/>
+            </a:pPr>
+            <a:r>
+              <a:rPr lang="es-ES_tradnl" sz="1600" dirty="0"/>
+              <a:t>Códigos de Conducta</a:t>
+            </a:r>
+          </a:p>
+          <a:p>
+            <a:pPr marL="971550" lvl="1" indent="-514350">
+              <a:buFont typeface="+mj-lt"/>
+              <a:buAutoNum type="alphaLcParenR"/>
+            </a:pPr>
+            <a:r>
+              <a:rPr lang="es-ES_tradnl" sz="1600" dirty="0"/>
+              <a:t>Tipos de datos personales</a:t>
+            </a:r>
+          </a:p>
+          <a:p>
+            <a:pPr marL="971550" lvl="1" indent="-514350">
+              <a:buFont typeface="+mj-lt"/>
+              <a:buAutoNum type="alphaLcParenR"/>
+            </a:pPr>
+            <a:r>
+              <a:rPr lang="es-ES_tradnl" sz="1600" dirty="0" err="1"/>
+              <a:t>Anonimización</a:t>
+            </a:r>
+            <a:r>
+              <a:rPr lang="es-ES_tradnl" sz="1600" dirty="0"/>
+              <a:t> de datos</a:t>
+            </a:r>
+          </a:p>
+          <a:p>
+            <a:pPr marL="514350" indent="-514350">
+              <a:buFont typeface="+mj-lt"/>
+              <a:buAutoNum type="arabicPeriod"/>
+            </a:pPr>
+            <a:r>
+              <a:rPr lang="es-ES_tradnl" sz="1800" b="1" dirty="0"/>
+              <a:t>Tratamiento de datos</a:t>
+            </a:r>
+          </a:p>
+          <a:p>
+            <a:pPr marL="514350" indent="-514350">
+              <a:buFont typeface="+mj-lt"/>
+              <a:buAutoNum type="arabicPeriod"/>
+            </a:pPr>
+            <a:r>
+              <a:rPr lang="es-ES_tradnl" sz="1800" b="1" dirty="0"/>
+              <a:t>Consentimiento</a:t>
+            </a:r>
+          </a:p>
+          <a:p>
+            <a:pPr marL="971550" lvl="1" indent="-514350">
+              <a:buFont typeface="+mj-lt"/>
+              <a:buAutoNum type="alphaLcParenR"/>
+            </a:pPr>
+            <a:r>
+              <a:rPr lang="es-ES_tradnl" sz="1600" dirty="0"/>
+              <a:t>Consentimiento inequívoco</a:t>
+            </a:r>
+          </a:p>
+          <a:p>
+            <a:pPr marL="971550" lvl="1" indent="-514350">
+              <a:buFont typeface="+mj-lt"/>
+              <a:buAutoNum type="alphaLcParenR"/>
+            </a:pPr>
+            <a:r>
+              <a:rPr lang="es-ES_tradnl" sz="1600" dirty="0"/>
+              <a:t>Consentimiento explícito</a:t>
+            </a:r>
+          </a:p>
+          <a:p>
+            <a:pPr marL="971550" lvl="1" indent="-514350">
+              <a:buFont typeface="+mj-lt"/>
+              <a:buAutoNum type="alphaLcParenR"/>
+            </a:pPr>
+            <a:r>
+              <a:rPr lang="es-ES_tradnl" sz="1600" dirty="0"/>
+              <a:t>No consentimiento tácito, omitido o por  inanición.</a:t>
+            </a:r>
+          </a:p>
+          <a:p>
+            <a:pPr marL="514350" indent="-514350">
+              <a:buFont typeface="+mj-lt"/>
+              <a:buAutoNum type="arabicPeriod"/>
+            </a:pPr>
+            <a:r>
+              <a:rPr lang="es-ES_tradnl" sz="1800" b="1" dirty="0"/>
+              <a:t>Datos especialmente protegidos</a:t>
+            </a:r>
+          </a:p>
+          <a:p>
+            <a:pPr marL="971550" lvl="1" indent="-514350">
+              <a:buFont typeface="+mj-lt"/>
+              <a:buAutoNum type="alphaLcParenR"/>
+            </a:pPr>
+            <a:r>
+              <a:rPr lang="es-ES_tradnl" sz="1600" dirty="0"/>
+              <a:t>Datos genéticos</a:t>
+            </a:r>
+          </a:p>
+          <a:p>
+            <a:pPr marL="971550" lvl="1" indent="-514350">
+              <a:buFont typeface="+mj-lt"/>
+              <a:buAutoNum type="alphaLcParenR"/>
+            </a:pPr>
+            <a:r>
+              <a:rPr lang="es-ES_tradnl" sz="1600" dirty="0"/>
+              <a:t>Datos biométricos</a:t>
+            </a:r>
+          </a:p>
+          <a:p>
+            <a:pPr marL="971550" lvl="1" indent="-514350">
+              <a:buFont typeface="+mj-lt"/>
+              <a:buAutoNum type="alphaLcParenR"/>
+            </a:pPr>
+            <a:endParaRPr lang="es-ES_tradnl" sz="1600" dirty="0"/>
+          </a:p>
+          <a:p>
+            <a:pPr marL="971550" lvl="1" indent="-514350">
+              <a:buFont typeface="+mj-lt"/>
+              <a:buAutoNum type="alphaLcParenR"/>
+            </a:pPr>
+            <a:endParaRPr lang="es-ES_tradnl" sz="1600" dirty="0"/>
+          </a:p>
+          <a:p>
+            <a:pPr marL="971550" lvl="1" indent="-514350">
+              <a:buFont typeface="+mj-lt"/>
+              <a:buAutoNum type="alphaLcParenR"/>
+            </a:pPr>
+            <a:endParaRPr lang="es-ES_tradnl" sz="1600" dirty="0"/>
+          </a:p>
+          <a:p>
+            <a:pPr marL="514350" indent="-514350">
+              <a:buFont typeface="+mj-lt"/>
+              <a:buAutoNum type="arabicPeriod"/>
+            </a:pPr>
+            <a:r>
+              <a:rPr lang="es-ES_tradnl" sz="1800" dirty="0"/>
+              <a:t>Inscripción de ficheros</a:t>
+            </a:r>
+          </a:p>
+          <a:p>
+            <a:pPr marL="514350" indent="-514350">
+              <a:buFont typeface="+mj-lt"/>
+              <a:buAutoNum type="arabicPeriod"/>
+            </a:pPr>
+            <a:r>
+              <a:rPr lang="es-ES_tradnl" sz="1800" dirty="0"/>
+              <a:t>Deber y derechos de Información:</a:t>
+            </a:r>
+          </a:p>
+          <a:p>
+            <a:pPr marL="971550" lvl="1" indent="-514350">
+              <a:buFont typeface="+mj-lt"/>
+              <a:buAutoNum type="alphaLcParenR"/>
+            </a:pPr>
+            <a:r>
+              <a:rPr lang="es-ES_tradnl" sz="1600" dirty="0"/>
+              <a:t>Deberes:</a:t>
+            </a:r>
+          </a:p>
+          <a:p>
+            <a:pPr marL="1428750" lvl="2" indent="-514350">
+              <a:buFont typeface="+mj-lt"/>
+              <a:buAutoNum type="alphaLcParenR"/>
+            </a:pPr>
+            <a:r>
+              <a:rPr lang="es-ES_tradnl" sz="1600" dirty="0"/>
+              <a:t>Identidad del responsable del tratamiento</a:t>
+            </a:r>
+          </a:p>
+          <a:p>
+            <a:pPr marL="1428750" lvl="2" indent="-514350">
+              <a:buFont typeface="+mj-lt"/>
+              <a:buAutoNum type="alphaLcParenR"/>
+            </a:pPr>
+            <a:r>
+              <a:rPr lang="es-ES_tradnl" sz="1600" dirty="0"/>
+              <a:t>Descripción finalidad del tratamiento de los datos</a:t>
+            </a:r>
+          </a:p>
+          <a:p>
+            <a:pPr marL="1428750" lvl="2" indent="-514350">
+              <a:buFont typeface="+mj-lt"/>
+              <a:buAutoNum type="alphaLcParenR"/>
+            </a:pPr>
+            <a:r>
+              <a:rPr lang="es-ES_tradnl" sz="1600" dirty="0"/>
+              <a:t>Base jurídica del tratamiento</a:t>
+            </a:r>
+          </a:p>
+          <a:p>
+            <a:pPr marL="1428750" lvl="2" indent="-514350">
+              <a:buFont typeface="+mj-lt"/>
+              <a:buAutoNum type="alphaLcParenR"/>
+            </a:pPr>
+            <a:r>
+              <a:rPr lang="es-ES_tradnl" sz="1600" dirty="0"/>
+              <a:t>Informar sobre los destinatarios</a:t>
+            </a:r>
+          </a:p>
+          <a:p>
+            <a:pPr marL="1428750" lvl="2" indent="-514350">
+              <a:buFont typeface="+mj-lt"/>
+              <a:buAutoNum type="alphaLcParenR"/>
+            </a:pPr>
+            <a:r>
+              <a:rPr lang="es-ES_tradnl" sz="1600" dirty="0"/>
+              <a:t>Informar sobre los derechos de las personas interesadas</a:t>
+            </a:r>
+          </a:p>
+          <a:p>
+            <a:pPr marL="971550" lvl="1" indent="-514350">
+              <a:buFont typeface="+mj-lt"/>
+              <a:buAutoNum type="alphaLcParenR"/>
+            </a:pPr>
+            <a:r>
+              <a:rPr lang="es-ES_tradnl" sz="1600" dirty="0"/>
+              <a:t>Derechos</a:t>
+            </a:r>
+          </a:p>
+          <a:p>
+            <a:pPr marL="1428750" lvl="2" indent="-514350">
+              <a:buFont typeface="+mj-lt"/>
+              <a:buAutoNum type="alphaLcParenR"/>
+            </a:pPr>
+            <a:endParaRPr lang="es-ES_tradnl" sz="1600" dirty="0"/>
+          </a:p>
+          <a:p>
+            <a:pPr marL="514350" indent="-514350">
+              <a:buFont typeface="+mj-lt"/>
+              <a:buAutoNum type="arabicPeriod"/>
+            </a:pPr>
+            <a:r>
+              <a:rPr lang="es-ES_tradnl" sz="1800" dirty="0"/>
+              <a:t>Seguridad</a:t>
+            </a:r>
+          </a:p>
+          <a:p>
+            <a:pPr marL="514350" indent="-514350">
+              <a:buFont typeface="+mj-lt"/>
+              <a:buAutoNum type="arabicPeriod"/>
+            </a:pPr>
+            <a:r>
+              <a:rPr lang="es-ES_tradnl" sz="1800" dirty="0"/>
+              <a:t>Comunicación de datos con terceros</a:t>
+            </a:r>
+          </a:p>
+          <a:p>
+            <a:pPr marL="514350" indent="-514350">
+              <a:buFont typeface="+mj-lt"/>
+              <a:buAutoNum type="arabicPeriod"/>
+            </a:pPr>
+            <a:r>
+              <a:rPr lang="es-ES_tradnl" sz="1800" dirty="0"/>
+              <a:t>Cookies:</a:t>
+            </a:r>
+          </a:p>
+          <a:p>
+            <a:pPr marL="971550" lvl="1" indent="-514350">
+              <a:buFont typeface="+mj-lt"/>
+              <a:buAutoNum type="alphaLcParenR"/>
+            </a:pPr>
+            <a:r>
+              <a:rPr lang="es-ES_tradnl" sz="1600" dirty="0"/>
+              <a:t>Aclaraciones</a:t>
+            </a:r>
+          </a:p>
+          <a:p>
+            <a:pPr marL="971550" lvl="1" indent="-514350">
+              <a:buFont typeface="+mj-lt"/>
+              <a:buAutoNum type="alphaLcParenR"/>
+            </a:pPr>
+            <a:r>
+              <a:rPr lang="es-ES_tradnl" sz="1600" dirty="0"/>
+              <a:t>Información por capas</a:t>
+            </a:r>
+          </a:p>
+          <a:p>
+            <a:pPr marL="971550" lvl="1" indent="-514350">
+              <a:buFont typeface="+mj-lt"/>
+              <a:buAutoNum type="alphaLcParenR"/>
+            </a:pPr>
+            <a:r>
+              <a:rPr lang="es-ES_tradnl" sz="1600" dirty="0"/>
+              <a:t>Consentimiento</a:t>
             </a:r>
           </a:p>
         </p:txBody>
       </p:sp>
+      <p:pic>
+        <p:nvPicPr>
+          <p:cNvPr id="5" name="Imagen 4">
+            <a:extLst>
+              <a:ext uri="{FF2B5EF4-FFF2-40B4-BE49-F238E27FC236}">
+                <a16:creationId xmlns:a16="http://schemas.microsoft.com/office/drawing/2014/main" id="{E2C3EE52-E1CB-4F86-B9E9-B8B8089C585C}"/>
+              </a:ext>
+            </a:extLst>
+          </p:cNvPr>
+          <p:cNvPicPr>
+            <a:picLocks noChangeAspect="1"/>
+          </p:cNvPicPr>
+          <p:nvPr/>
+        </p:nvPicPr>
+        <p:blipFill>
+          <a:blip r:embed="rId2"/>
+          <a:stretch>
+            <a:fillRect/>
+          </a:stretch>
+        </p:blipFill>
+        <p:spPr>
+          <a:xfrm>
+            <a:off x="7998780" y="3953427"/>
+            <a:ext cx="3355020" cy="625214"/>
+          </a:xfrm>
+          <a:prstGeom prst="rect">
+            <a:avLst/>
+          </a:prstGeom>
+        </p:spPr>
+      </p:pic>
     </p:spTree>
     <p:extLst>
       <p:ext uri="{BB962C8B-B14F-4D97-AF65-F5344CB8AC3E}">
-        <p14:creationId xmlns:p14="http://schemas.microsoft.com/office/powerpoint/2010/main" val="1440128170"/>
+        <p14:creationId xmlns:p14="http://schemas.microsoft.com/office/powerpoint/2010/main" val="2368114116"/>
       </p:ext>
     </p:extLst>
   </p:cSld>
@@ -3974,7 +6011,7 @@
           <p:cNvPr id="2" name="Title 1">
             <a:extLst>
               <a:ext uri="{FF2B5EF4-FFF2-40B4-BE49-F238E27FC236}">
-                <a16:creationId xmlns:a16="http://schemas.microsoft.com/office/drawing/2014/main" id="{C17E4F72-A216-8A45-8376-FBB06209A341}"/>
+                <a16:creationId xmlns:a16="http://schemas.microsoft.com/office/drawing/2014/main" id="{41709DB8-628E-9041-8A74-1637C6B770EB}"/>
               </a:ext>
             </a:extLst>
           </p:cNvPr>
@@ -3992,17 +6029,141 @@
           <a:p>
             <a:r>
               <a:rPr lang="es-ES_tradnl" dirty="0"/>
-              <a:t>CRM</a:t>
+              <a:t>ERP</a:t>
             </a:r>
           </a:p>
         </p:txBody>
       </p:sp>
+      <p:pic>
+        <p:nvPicPr>
+          <p:cNvPr id="5" name="Content Placeholder 4">
+            <a:extLst>
+              <a:ext uri="{FF2B5EF4-FFF2-40B4-BE49-F238E27FC236}">
+                <a16:creationId xmlns:a16="http://schemas.microsoft.com/office/drawing/2014/main" id="{10EC1A2E-A7B3-A740-ABD8-F578297A6466}"/>
+              </a:ext>
+            </a:extLst>
+          </p:cNvPr>
+          <p:cNvPicPr>
+            <a:picLocks noGrp="1" noChangeAspect="1"/>
+          </p:cNvPicPr>
+          <p:nvPr>
+            <p:ph idx="1"/>
+          </p:nvPr>
+        </p:nvPicPr>
+        <p:blipFill>
+          <a:blip r:embed="rId2"/>
+          <a:stretch>
+            <a:fillRect/>
+          </a:stretch>
+        </p:blipFill>
+        <p:spPr>
+          <a:xfrm>
+            <a:off x="7708390" y="2971800"/>
+            <a:ext cx="3733800" cy="914400"/>
+          </a:xfrm>
+        </p:spPr>
+      </p:pic>
+      <p:pic>
+        <p:nvPicPr>
+          <p:cNvPr id="7" name="Picture 6" descr="A close up of a logo&#10;&#10;Description automatically generated">
+            <a:extLst>
+              <a:ext uri="{FF2B5EF4-FFF2-40B4-BE49-F238E27FC236}">
+                <a16:creationId xmlns:a16="http://schemas.microsoft.com/office/drawing/2014/main" id="{4490F50A-6730-AA44-8857-96530D90E2B8}"/>
+              </a:ext>
+            </a:extLst>
+          </p:cNvPr>
+          <p:cNvPicPr>
+            <a:picLocks noChangeAspect="1"/>
+          </p:cNvPicPr>
+          <p:nvPr/>
+        </p:nvPicPr>
+        <p:blipFill>
+          <a:blip r:embed="rId3"/>
+          <a:stretch>
+            <a:fillRect/>
+          </a:stretch>
+        </p:blipFill>
+        <p:spPr>
+          <a:xfrm>
+            <a:off x="673609" y="2635250"/>
+            <a:ext cx="3810000" cy="1587500"/>
+          </a:xfrm>
+          <a:prstGeom prst="rect">
+            <a:avLst/>
+          </a:prstGeom>
+        </p:spPr>
+      </p:pic>
       <p:sp>
         <p:nvSpPr>
-          <p:cNvPr id="3" name="Content Placeholder 2">
-            <a:extLst>
-              <a:ext uri="{FF2B5EF4-FFF2-40B4-BE49-F238E27FC236}">
-                <a16:creationId xmlns:a16="http://schemas.microsoft.com/office/drawing/2014/main" id="{0679014A-88D2-EC48-B25D-F2A2770B8B11}"/>
+          <p:cNvPr id="8" name="TextBox 7">
+            <a:extLst>
+              <a:ext uri="{FF2B5EF4-FFF2-40B4-BE49-F238E27FC236}">
+                <a16:creationId xmlns:a16="http://schemas.microsoft.com/office/drawing/2014/main" id="{5FE4F3CD-FD10-734B-B378-8CA9FE652255}"/>
+              </a:ext>
+            </a:extLst>
+          </p:cNvPr>
+          <p:cNvSpPr txBox="1"/>
+          <p:nvPr/>
+        </p:nvSpPr>
+        <p:spPr>
+          <a:xfrm>
+            <a:off x="5898125" y="3244334"/>
+            <a:ext cx="395749" cy="369332"/>
+          </a:xfrm>
+          <a:prstGeom prst="rect">
+            <a:avLst/>
+          </a:prstGeom>
+          <a:noFill/>
+        </p:spPr>
+        <p:txBody>
+          <a:bodyPr wrap="none" rtlCol="0">
+            <a:spAutoFit/>
+          </a:bodyPr>
+          <a:lstStyle/>
+          <a:p>
+            <a:r>
+              <a:rPr lang="es-ES_tradnl" dirty="0"/>
+              <a:t>Vs</a:t>
+            </a:r>
+          </a:p>
+        </p:txBody>
+      </p:sp>
+    </p:spTree>
+    <p:extLst>
+      <p:ext uri="{BB962C8B-B14F-4D97-AF65-F5344CB8AC3E}">
+        <p14:creationId xmlns:p14="http://schemas.microsoft.com/office/powerpoint/2010/main" val="1440128170"/>
+      </p:ext>
+    </p:extLst>
+  </p:cSld>
+  <p:clrMapOvr>
+    <a:masterClrMapping/>
+  </p:clrMapOvr>
+</p:sld>
+</file>
+
+<file path=ppt/slides/slide14.xml><?xml version="1.0" encoding="utf-8"?>
+<p:sld xmlns:a="http://schemas.openxmlformats.org/drawingml/2006/main" xmlns:r="http://schemas.openxmlformats.org/officeDocument/2006/relationships" xmlns:p="http://schemas.openxmlformats.org/presentationml/2006/main">
+  <p:cSld>
+    <p:spTree>
+      <p:nvGrpSpPr>
+        <p:cNvPr id="1" name=""/>
+        <p:cNvGrpSpPr/>
+        <p:nvPr/>
+      </p:nvGrpSpPr>
+      <p:grpSpPr>
+        <a:xfrm>
+          <a:off x="0" y="0"/>
+          <a:ext cx="0" cy="0"/>
+          <a:chOff x="0" y="0"/>
+          <a:chExt cx="0" cy="0"/>
+        </a:xfrm>
+      </p:grpSpPr>
+      <p:sp>
+        <p:nvSpPr>
+          <p:cNvPr id="2" name="Title 1">
+            <a:extLst>
+              <a:ext uri="{FF2B5EF4-FFF2-40B4-BE49-F238E27FC236}">
+                <a16:creationId xmlns:a16="http://schemas.microsoft.com/office/drawing/2014/main" id="{C17E4F72-A216-8A45-8376-FBB06209A341}"/>
               </a:ext>
             </a:extLst>
           </p:cNvPr>
@@ -4010,7 +6171,7 @@
             <a:spLocks noGrp="1"/>
           </p:cNvSpPr>
           <p:nvPr>
-            <p:ph idx="1"/>
+            <p:ph type="title"/>
           </p:nvPr>
         </p:nvSpPr>
         <p:spPr/>
@@ -4018,10 +6179,71 @@
           <a:bodyPr/>
           <a:lstStyle/>
           <a:p>
-            <a:endParaRPr lang="es-ES_tradnl"/>
+            <a:r>
+              <a:rPr lang="es-ES_tradnl" dirty="0"/>
+              <a:t>CRM</a:t>
+            </a:r>
           </a:p>
         </p:txBody>
       </p:sp>
+      <p:pic>
+        <p:nvPicPr>
+          <p:cNvPr id="5" name="Marcador de contenido 4">
+            <a:extLst>
+              <a:ext uri="{FF2B5EF4-FFF2-40B4-BE49-F238E27FC236}">
+                <a16:creationId xmlns:a16="http://schemas.microsoft.com/office/drawing/2014/main" id="{DB740046-77FF-484C-B78A-A87186E8157E}"/>
+              </a:ext>
+            </a:extLst>
+          </p:cNvPr>
+          <p:cNvPicPr>
+            <a:picLocks noGrp="1" noChangeAspect="1"/>
+          </p:cNvPicPr>
+          <p:nvPr>
+            <p:ph idx="1"/>
+          </p:nvPr>
+        </p:nvPicPr>
+        <p:blipFill rotWithShape="1">
+          <a:blip r:embed="rId2"/>
+          <a:srcRect b="6691"/>
+          <a:stretch/>
+        </p:blipFill>
+        <p:spPr>
+          <a:xfrm>
+            <a:off x="6127880" y="365125"/>
+            <a:ext cx="5878593" cy="6020923"/>
+          </a:xfrm>
+        </p:spPr>
+      </p:pic>
+      <p:pic>
+        <p:nvPicPr>
+          <p:cNvPr id="8" name="Imagen 7">
+            <a:extLst>
+              <a:ext uri="{FF2B5EF4-FFF2-40B4-BE49-F238E27FC236}">
+                <a16:creationId xmlns:a16="http://schemas.microsoft.com/office/drawing/2014/main" id="{0C81159A-92C8-4CA3-96BD-2DEF9042158E}"/>
+              </a:ext>
+            </a:extLst>
+          </p:cNvPr>
+          <p:cNvPicPr>
+            <a:picLocks noChangeAspect="1"/>
+          </p:cNvPicPr>
+          <p:nvPr/>
+        </p:nvPicPr>
+        <p:blipFill>
+          <a:blip r:embed="rId3"/>
+          <a:stretch>
+            <a:fillRect/>
+          </a:stretch>
+        </p:blipFill>
+        <p:spPr>
+          <a:xfrm>
+            <a:off x="185527" y="2117044"/>
+            <a:ext cx="5878593" cy="3455567"/>
+          </a:xfrm>
+          <a:prstGeom prst="rect">
+            <a:avLst/>
+          </a:prstGeom>
+        </p:spPr>
+      </p:pic>
     </p:spTree>
     <p:extLst>
       <p:ext uri="{BB962C8B-B14F-4D97-AF65-F5344CB8AC3E}">
@@ -13117,6 +15339,1266 @@
             <a:off x="6293422" y="620473"/>
             <a:ext cx="5060378" cy="814865"/>
           </a:xfrm>
+        </p:spPr>
+      </p:pic>
+      <p:pic>
+        <p:nvPicPr>
+          <p:cNvPr id="7" name="Graphic 10" descr="Checkmark">
+            <a:extLst>
+              <a:ext uri="{FF2B5EF4-FFF2-40B4-BE49-F238E27FC236}">
+                <a16:creationId xmlns:a16="http://schemas.microsoft.com/office/drawing/2014/main" id="{DFAB3C12-931D-4D7A-A205-F2299F0A8FA2}"/>
+              </a:ext>
+            </a:extLst>
+          </p:cNvPr>
+          <p:cNvPicPr>
+            <a:picLocks noChangeAspect="1"/>
+          </p:cNvPicPr>
+          <p:nvPr/>
+        </p:nvPicPr>
+        <p:blipFill>
+          <a:blip r:embed="rId3">
+            <a:extLst>
+              <a:ext uri="{96DAC541-7B7A-43D3-8B79-37D633B846F1}">
+                <asvg:svgBlip xmlns:asvg="http://schemas.microsoft.com/office/drawing/2016/SVG/main" r:embed="rId4"/>
+              </a:ext>
+            </a:extLst>
+          </a:blip>
+          <a:stretch>
+            <a:fillRect/>
+          </a:stretch>
+        </p:blipFill>
+        <p:spPr>
+          <a:xfrm>
+            <a:off x="663767" y="1773522"/>
+            <a:ext cx="174433" cy="174433"/>
+          </a:xfrm>
+          <a:prstGeom prst="rect">
+            <a:avLst/>
+          </a:prstGeom>
+        </p:spPr>
+      </p:pic>
+      <p:pic>
+        <p:nvPicPr>
+          <p:cNvPr id="10" name="Graphic 10" descr="Checkmark">
+            <a:extLst>
+              <a:ext uri="{FF2B5EF4-FFF2-40B4-BE49-F238E27FC236}">
+                <a16:creationId xmlns:a16="http://schemas.microsoft.com/office/drawing/2014/main" id="{B673FF57-0080-4E67-8183-61EF437A4FA5}"/>
+              </a:ext>
+            </a:extLst>
+          </p:cNvPr>
+          <p:cNvPicPr>
+            <a:picLocks noChangeAspect="1"/>
+          </p:cNvPicPr>
+          <p:nvPr/>
+        </p:nvPicPr>
+        <p:blipFill>
+          <a:blip r:embed="rId3">
+            <a:extLst>
+              <a:ext uri="{96DAC541-7B7A-43D3-8B79-37D633B846F1}">
+                <asvg:svgBlip xmlns:asvg="http://schemas.microsoft.com/office/drawing/2016/SVG/main" r:embed="rId4"/>
+              </a:ext>
+            </a:extLst>
+          </a:blip>
+          <a:stretch>
+            <a:fillRect/>
+          </a:stretch>
+        </p:blipFill>
+        <p:spPr>
+          <a:xfrm>
+            <a:off x="663767" y="2030789"/>
+            <a:ext cx="174433" cy="174433"/>
+          </a:xfrm>
+          <a:prstGeom prst="rect">
+            <a:avLst/>
+          </a:prstGeom>
+        </p:spPr>
+      </p:pic>
+      <p:pic>
+        <p:nvPicPr>
+          <p:cNvPr id="11" name="Graphic 10" descr="Checkmark">
+            <a:extLst>
+              <a:ext uri="{FF2B5EF4-FFF2-40B4-BE49-F238E27FC236}">
+                <a16:creationId xmlns:a16="http://schemas.microsoft.com/office/drawing/2014/main" id="{64AD8FCA-A370-4B0C-A35D-AE9E34B75AEF}"/>
+              </a:ext>
+            </a:extLst>
+          </p:cNvPr>
+          <p:cNvPicPr>
+            <a:picLocks noChangeAspect="1"/>
+          </p:cNvPicPr>
+          <p:nvPr/>
+        </p:nvPicPr>
+        <p:blipFill>
+          <a:blip r:embed="rId3">
+            <a:extLst>
+              <a:ext uri="{96DAC541-7B7A-43D3-8B79-37D633B846F1}">
+                <asvg:svgBlip xmlns:asvg="http://schemas.microsoft.com/office/drawing/2016/SVG/main" r:embed="rId4"/>
+              </a:ext>
+            </a:extLst>
+          </a:blip>
+          <a:stretch>
+            <a:fillRect/>
+          </a:stretch>
+        </p:blipFill>
+        <p:spPr>
+          <a:xfrm>
+            <a:off x="663767" y="2270405"/>
+            <a:ext cx="174433" cy="174433"/>
+          </a:xfrm>
+          <a:prstGeom prst="rect">
+            <a:avLst/>
+          </a:prstGeom>
+        </p:spPr>
+      </p:pic>
+      <p:pic>
+        <p:nvPicPr>
+          <p:cNvPr id="12" name="Graphic 10" descr="Checkmark">
+            <a:extLst>
+              <a:ext uri="{FF2B5EF4-FFF2-40B4-BE49-F238E27FC236}">
+                <a16:creationId xmlns:a16="http://schemas.microsoft.com/office/drawing/2014/main" id="{C4B9DD47-83B3-4397-B51B-C67B3A4948A3}"/>
+              </a:ext>
+            </a:extLst>
+          </p:cNvPr>
+          <p:cNvPicPr>
+            <a:picLocks noChangeAspect="1"/>
+          </p:cNvPicPr>
+          <p:nvPr/>
+        </p:nvPicPr>
+        <p:blipFill>
+          <a:blip r:embed="rId3">
+            <a:extLst>
+              <a:ext uri="{96DAC541-7B7A-43D3-8B79-37D633B846F1}">
+                <asvg:svgBlip xmlns:asvg="http://schemas.microsoft.com/office/drawing/2016/SVG/main" r:embed="rId4"/>
+              </a:ext>
+            </a:extLst>
+          </a:blip>
+          <a:stretch>
+            <a:fillRect/>
+          </a:stretch>
+        </p:blipFill>
+        <p:spPr>
+          <a:xfrm>
+            <a:off x="663767" y="2510021"/>
+            <a:ext cx="174433" cy="174433"/>
+          </a:xfrm>
+          <a:prstGeom prst="rect">
+            <a:avLst/>
+          </a:prstGeom>
+        </p:spPr>
+      </p:pic>
+      <p:pic>
+        <p:nvPicPr>
+          <p:cNvPr id="13" name="Graphic 10" descr="Checkmark">
+            <a:extLst>
+              <a:ext uri="{FF2B5EF4-FFF2-40B4-BE49-F238E27FC236}">
+                <a16:creationId xmlns:a16="http://schemas.microsoft.com/office/drawing/2014/main" id="{50FDFA2B-3E82-4990-9EC5-A96927E95D53}"/>
+              </a:ext>
+            </a:extLst>
+          </p:cNvPr>
+          <p:cNvPicPr>
+            <a:picLocks noChangeAspect="1"/>
+          </p:cNvPicPr>
+          <p:nvPr/>
+        </p:nvPicPr>
+        <p:blipFill>
+          <a:blip r:embed="rId3">
+            <a:extLst>
+              <a:ext uri="{96DAC541-7B7A-43D3-8B79-37D633B846F1}">
+                <asvg:svgBlip xmlns:asvg="http://schemas.microsoft.com/office/drawing/2016/SVG/main" r:embed="rId4"/>
+              </a:ext>
+            </a:extLst>
+          </a:blip>
+          <a:stretch>
+            <a:fillRect/>
+          </a:stretch>
+        </p:blipFill>
+        <p:spPr>
+          <a:xfrm>
+            <a:off x="663767" y="2749637"/>
+            <a:ext cx="174433" cy="174433"/>
+          </a:xfrm>
+          <a:prstGeom prst="rect">
+            <a:avLst/>
+          </a:prstGeom>
+        </p:spPr>
+      </p:pic>
+      <p:pic>
+        <p:nvPicPr>
+          <p:cNvPr id="17" name="Graphic 42" descr="Pause">
+            <a:extLst>
+              <a:ext uri="{FF2B5EF4-FFF2-40B4-BE49-F238E27FC236}">
+                <a16:creationId xmlns:a16="http://schemas.microsoft.com/office/drawing/2014/main" id="{BFC4260C-F91C-4237-996D-980407ADBACA}"/>
+              </a:ext>
+            </a:extLst>
+          </p:cNvPr>
+          <p:cNvPicPr>
+            <a:picLocks noChangeAspect="1"/>
+          </p:cNvPicPr>
+          <p:nvPr/>
+        </p:nvPicPr>
+        <p:blipFill>
+          <a:blip r:embed="rId5">
+            <a:extLst>
+              <a:ext uri="{96DAC541-7B7A-43D3-8B79-37D633B846F1}">
+                <asvg:svgBlip xmlns:asvg="http://schemas.microsoft.com/office/drawing/2016/SVG/main" r:embed="rId6"/>
+              </a:ext>
+            </a:extLst>
+          </a:blip>
+          <a:stretch>
+            <a:fillRect/>
+          </a:stretch>
+        </p:blipFill>
+        <p:spPr>
+          <a:xfrm>
+            <a:off x="5624256" y="5185795"/>
+            <a:ext cx="174433" cy="174433"/>
+          </a:xfrm>
+          <a:prstGeom prst="rect">
+            <a:avLst/>
+          </a:prstGeom>
+        </p:spPr>
+      </p:pic>
+      <p:pic>
+        <p:nvPicPr>
+          <p:cNvPr id="18" name="Graphic 10" descr="Checkmark">
+            <a:extLst>
+              <a:ext uri="{FF2B5EF4-FFF2-40B4-BE49-F238E27FC236}">
+                <a16:creationId xmlns:a16="http://schemas.microsoft.com/office/drawing/2014/main" id="{CF114E1A-95FB-4887-A1D8-157DC8BB9CCD}"/>
+              </a:ext>
+            </a:extLst>
+          </p:cNvPr>
+          <p:cNvPicPr>
+            <a:picLocks noChangeAspect="1"/>
+          </p:cNvPicPr>
+          <p:nvPr/>
+        </p:nvPicPr>
+        <p:blipFill>
+          <a:blip r:embed="rId3">
+            <a:extLst>
+              <a:ext uri="{96DAC541-7B7A-43D3-8B79-37D633B846F1}">
+                <asvg:svgBlip xmlns:asvg="http://schemas.microsoft.com/office/drawing/2016/SVG/main" r:embed="rId4"/>
+              </a:ext>
+            </a:extLst>
+          </a:blip>
+          <a:stretch>
+            <a:fillRect/>
+          </a:stretch>
+        </p:blipFill>
+        <p:spPr>
+          <a:xfrm>
+            <a:off x="5624260" y="1773521"/>
+            <a:ext cx="174433" cy="174433"/>
+          </a:xfrm>
+          <a:prstGeom prst="rect">
+            <a:avLst/>
+          </a:prstGeom>
+        </p:spPr>
+      </p:pic>
+      <p:pic>
+        <p:nvPicPr>
+          <p:cNvPr id="19" name="Graphic 10" descr="Checkmark">
+            <a:extLst>
+              <a:ext uri="{FF2B5EF4-FFF2-40B4-BE49-F238E27FC236}">
+                <a16:creationId xmlns:a16="http://schemas.microsoft.com/office/drawing/2014/main" id="{17024D08-C5CB-4F8B-A0C0-32E0CBF635F6}"/>
+              </a:ext>
+            </a:extLst>
+          </p:cNvPr>
+          <p:cNvPicPr>
+            <a:picLocks noChangeAspect="1"/>
+          </p:cNvPicPr>
+          <p:nvPr/>
+        </p:nvPicPr>
+        <p:blipFill>
+          <a:blip r:embed="rId3">
+            <a:extLst>
+              <a:ext uri="{96DAC541-7B7A-43D3-8B79-37D633B846F1}">
+                <asvg:svgBlip xmlns:asvg="http://schemas.microsoft.com/office/drawing/2016/SVG/main" r:embed="rId4"/>
+              </a:ext>
+            </a:extLst>
+          </a:blip>
+          <a:stretch>
+            <a:fillRect/>
+          </a:stretch>
+        </p:blipFill>
+        <p:spPr>
+          <a:xfrm>
+            <a:off x="5624260" y="2012346"/>
+            <a:ext cx="174433" cy="174433"/>
+          </a:xfrm>
+          <a:prstGeom prst="rect">
+            <a:avLst/>
+          </a:prstGeom>
+        </p:spPr>
+      </p:pic>
+      <p:pic>
+        <p:nvPicPr>
+          <p:cNvPr id="20" name="Graphic 10" descr="Checkmark">
+            <a:extLst>
+              <a:ext uri="{FF2B5EF4-FFF2-40B4-BE49-F238E27FC236}">
+                <a16:creationId xmlns:a16="http://schemas.microsoft.com/office/drawing/2014/main" id="{A4924097-899B-4FA7-9357-D5B19762CD3D}"/>
+              </a:ext>
+            </a:extLst>
+          </p:cNvPr>
+          <p:cNvPicPr>
+            <a:picLocks noChangeAspect="1"/>
+          </p:cNvPicPr>
+          <p:nvPr/>
+        </p:nvPicPr>
+        <p:blipFill>
+          <a:blip r:embed="rId3">
+            <a:extLst>
+              <a:ext uri="{96DAC541-7B7A-43D3-8B79-37D633B846F1}">
+                <asvg:svgBlip xmlns:asvg="http://schemas.microsoft.com/office/drawing/2016/SVG/main" r:embed="rId4"/>
+              </a:ext>
+            </a:extLst>
+          </a:blip>
+          <a:stretch>
+            <a:fillRect/>
+          </a:stretch>
+        </p:blipFill>
+        <p:spPr>
+          <a:xfrm>
+            <a:off x="5624260" y="2268729"/>
+            <a:ext cx="174433" cy="174433"/>
+          </a:xfrm>
+          <a:prstGeom prst="rect">
+            <a:avLst/>
+          </a:prstGeom>
+        </p:spPr>
+      </p:pic>
+      <p:pic>
+        <p:nvPicPr>
+          <p:cNvPr id="21" name="Graphic 10" descr="Checkmark">
+            <a:extLst>
+              <a:ext uri="{FF2B5EF4-FFF2-40B4-BE49-F238E27FC236}">
+                <a16:creationId xmlns:a16="http://schemas.microsoft.com/office/drawing/2014/main" id="{90EEED25-2C5E-4CF3-8780-D762AC0D71C2}"/>
+              </a:ext>
+            </a:extLst>
+          </p:cNvPr>
+          <p:cNvPicPr>
+            <a:picLocks noChangeAspect="1"/>
+          </p:cNvPicPr>
+          <p:nvPr/>
+        </p:nvPicPr>
+        <p:blipFill>
+          <a:blip r:embed="rId3">
+            <a:extLst>
+              <a:ext uri="{96DAC541-7B7A-43D3-8B79-37D633B846F1}">
+                <asvg:svgBlip xmlns:asvg="http://schemas.microsoft.com/office/drawing/2016/SVG/main" r:embed="rId4"/>
+              </a:ext>
+            </a:extLst>
+          </a:blip>
+          <a:stretch>
+            <a:fillRect/>
+          </a:stretch>
+        </p:blipFill>
+        <p:spPr>
+          <a:xfrm>
+            <a:off x="5624259" y="2525112"/>
+            <a:ext cx="174433" cy="174433"/>
+          </a:xfrm>
+          <a:prstGeom prst="rect">
+            <a:avLst/>
+          </a:prstGeom>
+        </p:spPr>
+      </p:pic>
+      <p:pic>
+        <p:nvPicPr>
+          <p:cNvPr id="22" name="Graphic 10" descr="Checkmark">
+            <a:extLst>
+              <a:ext uri="{FF2B5EF4-FFF2-40B4-BE49-F238E27FC236}">
+                <a16:creationId xmlns:a16="http://schemas.microsoft.com/office/drawing/2014/main" id="{5D0C70F1-ADF9-4F3E-B416-52CD380E0C7D}"/>
+              </a:ext>
+            </a:extLst>
+          </p:cNvPr>
+          <p:cNvPicPr>
+            <a:picLocks noChangeAspect="1"/>
+          </p:cNvPicPr>
+          <p:nvPr/>
+        </p:nvPicPr>
+        <p:blipFill>
+          <a:blip r:embed="rId3">
+            <a:extLst>
+              <a:ext uri="{96DAC541-7B7A-43D3-8B79-37D633B846F1}">
+                <asvg:svgBlip xmlns:asvg="http://schemas.microsoft.com/office/drawing/2016/SVG/main" r:embed="rId4"/>
+              </a:ext>
+            </a:extLst>
+          </a:blip>
+          <a:stretch>
+            <a:fillRect/>
+          </a:stretch>
+        </p:blipFill>
+        <p:spPr>
+          <a:xfrm>
+            <a:off x="5624258" y="2786452"/>
+            <a:ext cx="174433" cy="174433"/>
+          </a:xfrm>
+          <a:prstGeom prst="rect">
+            <a:avLst/>
+          </a:prstGeom>
+        </p:spPr>
+      </p:pic>
+      <p:pic>
+        <p:nvPicPr>
+          <p:cNvPr id="27" name="Graphic 10" descr="Checkmark">
+            <a:extLst>
+              <a:ext uri="{FF2B5EF4-FFF2-40B4-BE49-F238E27FC236}">
+                <a16:creationId xmlns:a16="http://schemas.microsoft.com/office/drawing/2014/main" id="{E5018AC8-6C29-427E-87D0-AA45330F0174}"/>
+              </a:ext>
+            </a:extLst>
+          </p:cNvPr>
+          <p:cNvPicPr>
+            <a:picLocks noChangeAspect="1"/>
+          </p:cNvPicPr>
+          <p:nvPr/>
+        </p:nvPicPr>
+        <p:blipFill>
+          <a:blip r:embed="rId3">
+            <a:extLst>
+              <a:ext uri="{96DAC541-7B7A-43D3-8B79-37D633B846F1}">
+                <asvg:svgBlip xmlns:asvg="http://schemas.microsoft.com/office/drawing/2016/SVG/main" r:embed="rId4"/>
+              </a:ext>
+            </a:extLst>
+          </a:blip>
+          <a:stretch>
+            <a:fillRect/>
+          </a:stretch>
+        </p:blipFill>
+        <p:spPr>
+          <a:xfrm>
+            <a:off x="5624260" y="4206534"/>
+            <a:ext cx="174433" cy="174433"/>
+          </a:xfrm>
+          <a:prstGeom prst="rect">
+            <a:avLst/>
+          </a:prstGeom>
+        </p:spPr>
+      </p:pic>
+      <p:pic>
+        <p:nvPicPr>
+          <p:cNvPr id="28" name="Graphic 16" descr="Close">
+            <a:extLst>
+              <a:ext uri="{FF2B5EF4-FFF2-40B4-BE49-F238E27FC236}">
+                <a16:creationId xmlns:a16="http://schemas.microsoft.com/office/drawing/2014/main" id="{D0DAE5BE-6A0F-43C7-BA8F-C817754A15E3}"/>
+              </a:ext>
+            </a:extLst>
+          </p:cNvPr>
+          <p:cNvPicPr>
+            <a:picLocks noChangeAspect="1"/>
+          </p:cNvPicPr>
+          <p:nvPr/>
+        </p:nvPicPr>
+        <p:blipFill>
+          <a:blip r:embed="rId7">
+            <a:extLst>
+              <a:ext uri="{96DAC541-7B7A-43D3-8B79-37D633B846F1}">
+                <asvg:svgBlip xmlns:asvg="http://schemas.microsoft.com/office/drawing/2016/SVG/main" r:embed="rId8"/>
+              </a:ext>
+            </a:extLst>
+          </a:blip>
+          <a:stretch>
+            <a:fillRect/>
+          </a:stretch>
+        </p:blipFill>
+        <p:spPr>
+          <a:xfrm>
+            <a:off x="5624257" y="4924455"/>
+            <a:ext cx="174433" cy="174433"/>
+          </a:xfrm>
+          <a:prstGeom prst="rect">
+            <a:avLst/>
+          </a:prstGeom>
+        </p:spPr>
+      </p:pic>
+      <p:pic>
+        <p:nvPicPr>
+          <p:cNvPr id="29" name="Graphic 16" descr="Close">
+            <a:extLst>
+              <a:ext uri="{FF2B5EF4-FFF2-40B4-BE49-F238E27FC236}">
+                <a16:creationId xmlns:a16="http://schemas.microsoft.com/office/drawing/2014/main" id="{4C40B613-009A-4D0F-B255-1CDAC2D6DAA3}"/>
+              </a:ext>
+            </a:extLst>
+          </p:cNvPr>
+          <p:cNvPicPr>
+            <a:picLocks noChangeAspect="1"/>
+          </p:cNvPicPr>
+          <p:nvPr/>
+        </p:nvPicPr>
+        <p:blipFill>
+          <a:blip r:embed="rId7">
+            <a:extLst>
+              <a:ext uri="{96DAC541-7B7A-43D3-8B79-37D633B846F1}">
+                <asvg:svgBlip xmlns:asvg="http://schemas.microsoft.com/office/drawing/2016/SVG/main" r:embed="rId8"/>
+              </a:ext>
+            </a:extLst>
+          </a:blip>
+          <a:stretch>
+            <a:fillRect/>
+          </a:stretch>
+        </p:blipFill>
+        <p:spPr>
+          <a:xfrm>
+            <a:off x="5630446" y="3722683"/>
+            <a:ext cx="174433" cy="174433"/>
+          </a:xfrm>
+          <a:prstGeom prst="rect">
+            <a:avLst/>
+          </a:prstGeom>
+        </p:spPr>
+      </p:pic>
+      <p:pic>
+        <p:nvPicPr>
+          <p:cNvPr id="30" name="Graphic 16" descr="Close">
+            <a:extLst>
+              <a:ext uri="{FF2B5EF4-FFF2-40B4-BE49-F238E27FC236}">
+                <a16:creationId xmlns:a16="http://schemas.microsoft.com/office/drawing/2014/main" id="{6F610EF1-32F9-4237-8F14-1D6C84CF49FA}"/>
+              </a:ext>
+            </a:extLst>
+          </p:cNvPr>
+          <p:cNvPicPr>
+            <a:picLocks noChangeAspect="1"/>
+          </p:cNvPicPr>
+          <p:nvPr/>
+        </p:nvPicPr>
+        <p:blipFill>
+          <a:blip r:embed="rId7">
+            <a:extLst>
+              <a:ext uri="{96DAC541-7B7A-43D3-8B79-37D633B846F1}">
+                <asvg:svgBlip xmlns:asvg="http://schemas.microsoft.com/office/drawing/2016/SVG/main" r:embed="rId8"/>
+              </a:ext>
+            </a:extLst>
+          </a:blip>
+          <a:stretch>
+            <a:fillRect/>
+          </a:stretch>
+        </p:blipFill>
+        <p:spPr>
+          <a:xfrm>
+            <a:off x="5624255" y="4443396"/>
+            <a:ext cx="174433" cy="174433"/>
+          </a:xfrm>
+          <a:prstGeom prst="rect">
+            <a:avLst/>
+          </a:prstGeom>
+        </p:spPr>
+      </p:pic>
+      <p:pic>
+        <p:nvPicPr>
+          <p:cNvPr id="32" name="Graphic 10" descr="Checkmark">
+            <a:extLst>
+              <a:ext uri="{FF2B5EF4-FFF2-40B4-BE49-F238E27FC236}">
+                <a16:creationId xmlns:a16="http://schemas.microsoft.com/office/drawing/2014/main" id="{78E888DA-6EA7-454E-ACF3-FCD26AE428A6}"/>
+              </a:ext>
+            </a:extLst>
+          </p:cNvPr>
+          <p:cNvPicPr>
+            <a:picLocks noChangeAspect="1"/>
+          </p:cNvPicPr>
+          <p:nvPr/>
+        </p:nvPicPr>
+        <p:blipFill>
+          <a:blip r:embed="rId3">
+            <a:extLst>
+              <a:ext uri="{96DAC541-7B7A-43D3-8B79-37D633B846F1}">
+                <asvg:svgBlip xmlns:asvg="http://schemas.microsoft.com/office/drawing/2016/SVG/main" r:embed="rId4"/>
+              </a:ext>
+            </a:extLst>
+          </a:blip>
+          <a:stretch>
+            <a:fillRect/>
+          </a:stretch>
+        </p:blipFill>
+        <p:spPr>
+          <a:xfrm>
+            <a:off x="5624255" y="5661661"/>
+            <a:ext cx="174433" cy="174433"/>
+          </a:xfrm>
+          <a:prstGeom prst="rect">
+            <a:avLst/>
+          </a:prstGeom>
+        </p:spPr>
+      </p:pic>
+      <p:pic>
+        <p:nvPicPr>
+          <p:cNvPr id="36" name="Graphic 10" descr="Checkmark">
+            <a:extLst>
+              <a:ext uri="{FF2B5EF4-FFF2-40B4-BE49-F238E27FC236}">
+                <a16:creationId xmlns:a16="http://schemas.microsoft.com/office/drawing/2014/main" id="{2FEF9BC0-9CA2-436D-B6B4-5BF0740C717E}"/>
+              </a:ext>
+            </a:extLst>
+          </p:cNvPr>
+          <p:cNvPicPr>
+            <a:picLocks noChangeAspect="1"/>
+          </p:cNvPicPr>
+          <p:nvPr/>
+        </p:nvPicPr>
+        <p:blipFill>
+          <a:blip r:embed="rId3">
+            <a:extLst>
+              <a:ext uri="{96DAC541-7B7A-43D3-8B79-37D633B846F1}">
+                <asvg:svgBlip xmlns:asvg="http://schemas.microsoft.com/office/drawing/2016/SVG/main" r:embed="rId4"/>
+              </a:ext>
+            </a:extLst>
+          </a:blip>
+          <a:stretch>
+            <a:fillRect/>
+          </a:stretch>
+        </p:blipFill>
+        <p:spPr>
+          <a:xfrm>
+            <a:off x="664352" y="3962202"/>
+            <a:ext cx="174433" cy="174433"/>
+          </a:xfrm>
+          <a:prstGeom prst="rect">
+            <a:avLst/>
+          </a:prstGeom>
+        </p:spPr>
+      </p:pic>
+      <p:pic>
+        <p:nvPicPr>
+          <p:cNvPr id="37" name="Graphic 10" descr="Checkmark">
+            <a:extLst>
+              <a:ext uri="{FF2B5EF4-FFF2-40B4-BE49-F238E27FC236}">
+                <a16:creationId xmlns:a16="http://schemas.microsoft.com/office/drawing/2014/main" id="{BD713F7B-8F41-40C4-B288-32FF9B773133}"/>
+              </a:ext>
+            </a:extLst>
+          </p:cNvPr>
+          <p:cNvPicPr>
+            <a:picLocks noChangeAspect="1"/>
+          </p:cNvPicPr>
+          <p:nvPr/>
+        </p:nvPicPr>
+        <p:blipFill>
+          <a:blip r:embed="rId3">
+            <a:extLst>
+              <a:ext uri="{96DAC541-7B7A-43D3-8B79-37D633B846F1}">
+                <asvg:svgBlip xmlns:asvg="http://schemas.microsoft.com/office/drawing/2016/SVG/main" r:embed="rId4"/>
+              </a:ext>
+            </a:extLst>
+          </a:blip>
+          <a:stretch>
+            <a:fillRect/>
+          </a:stretch>
+        </p:blipFill>
+        <p:spPr>
+          <a:xfrm>
+            <a:off x="664352" y="3716241"/>
+            <a:ext cx="174433" cy="174433"/>
+          </a:xfrm>
+          <a:prstGeom prst="rect">
+            <a:avLst/>
+          </a:prstGeom>
+        </p:spPr>
+      </p:pic>
+      <p:pic>
+        <p:nvPicPr>
+          <p:cNvPr id="38" name="Graphic 10" descr="Checkmark">
+            <a:extLst>
+              <a:ext uri="{FF2B5EF4-FFF2-40B4-BE49-F238E27FC236}">
+                <a16:creationId xmlns:a16="http://schemas.microsoft.com/office/drawing/2014/main" id="{D8C376F7-3C2B-4DF3-9E4E-E826B4F55A53}"/>
+              </a:ext>
+            </a:extLst>
+          </p:cNvPr>
+          <p:cNvPicPr>
+            <a:picLocks noChangeAspect="1"/>
+          </p:cNvPicPr>
+          <p:nvPr/>
+        </p:nvPicPr>
+        <p:blipFill>
+          <a:blip r:embed="rId3">
+            <a:extLst>
+              <a:ext uri="{96DAC541-7B7A-43D3-8B79-37D633B846F1}">
+                <asvg:svgBlip xmlns:asvg="http://schemas.microsoft.com/office/drawing/2016/SVG/main" r:embed="rId4"/>
+              </a:ext>
+            </a:extLst>
+          </a:blip>
+          <a:stretch>
+            <a:fillRect/>
+          </a:stretch>
+        </p:blipFill>
+        <p:spPr>
+          <a:xfrm>
+            <a:off x="663765" y="4198851"/>
+            <a:ext cx="174433" cy="174433"/>
+          </a:xfrm>
+          <a:prstGeom prst="rect">
+            <a:avLst/>
+          </a:prstGeom>
+        </p:spPr>
+      </p:pic>
+      <p:pic>
+        <p:nvPicPr>
+          <p:cNvPr id="39" name="Graphic 10" descr="Checkmark">
+            <a:extLst>
+              <a:ext uri="{FF2B5EF4-FFF2-40B4-BE49-F238E27FC236}">
+                <a16:creationId xmlns:a16="http://schemas.microsoft.com/office/drawing/2014/main" id="{39D77309-E02C-4ED8-92CD-5A0C5A74C3A7}"/>
+              </a:ext>
+            </a:extLst>
+          </p:cNvPr>
+          <p:cNvPicPr>
+            <a:picLocks noChangeAspect="1"/>
+          </p:cNvPicPr>
+          <p:nvPr/>
+        </p:nvPicPr>
+        <p:blipFill>
+          <a:blip r:embed="rId3">
+            <a:extLst>
+              <a:ext uri="{96DAC541-7B7A-43D3-8B79-37D633B846F1}">
+                <asvg:svgBlip xmlns:asvg="http://schemas.microsoft.com/office/drawing/2016/SVG/main" r:embed="rId4"/>
+              </a:ext>
+            </a:extLst>
+          </a:blip>
+          <a:stretch>
+            <a:fillRect/>
+          </a:stretch>
+        </p:blipFill>
+        <p:spPr>
+          <a:xfrm>
+            <a:off x="663764" y="4446424"/>
+            <a:ext cx="174433" cy="174433"/>
+          </a:xfrm>
+          <a:prstGeom prst="rect">
+            <a:avLst/>
+          </a:prstGeom>
+        </p:spPr>
+      </p:pic>
+      <p:pic>
+        <p:nvPicPr>
+          <p:cNvPr id="40" name="Graphic 10" descr="Checkmark">
+            <a:extLst>
+              <a:ext uri="{FF2B5EF4-FFF2-40B4-BE49-F238E27FC236}">
+                <a16:creationId xmlns:a16="http://schemas.microsoft.com/office/drawing/2014/main" id="{E31B73BC-5134-45FE-B026-B9C97A3C5107}"/>
+              </a:ext>
+            </a:extLst>
+          </p:cNvPr>
+          <p:cNvPicPr>
+            <a:picLocks noChangeAspect="1"/>
+          </p:cNvPicPr>
+          <p:nvPr/>
+        </p:nvPicPr>
+        <p:blipFill>
+          <a:blip r:embed="rId3">
+            <a:extLst>
+              <a:ext uri="{96DAC541-7B7A-43D3-8B79-37D633B846F1}">
+                <asvg:svgBlip xmlns:asvg="http://schemas.microsoft.com/office/drawing/2016/SVG/main" r:embed="rId4"/>
+              </a:ext>
+            </a:extLst>
+          </a:blip>
+          <a:stretch>
+            <a:fillRect/>
+          </a:stretch>
+        </p:blipFill>
+        <p:spPr>
+          <a:xfrm>
+            <a:off x="664352" y="4681263"/>
+            <a:ext cx="174433" cy="174433"/>
+          </a:xfrm>
+          <a:prstGeom prst="rect">
+            <a:avLst/>
+          </a:prstGeom>
+        </p:spPr>
+      </p:pic>
+      <p:pic>
+        <p:nvPicPr>
+          <p:cNvPr id="41" name="Graphic 10" descr="Checkmark">
+            <a:extLst>
+              <a:ext uri="{FF2B5EF4-FFF2-40B4-BE49-F238E27FC236}">
+                <a16:creationId xmlns:a16="http://schemas.microsoft.com/office/drawing/2014/main" id="{E3D6BBDE-BD91-4522-8EC8-8F1514A81D01}"/>
+              </a:ext>
+            </a:extLst>
+          </p:cNvPr>
+          <p:cNvPicPr>
+            <a:picLocks noChangeAspect="1"/>
+          </p:cNvPicPr>
+          <p:nvPr/>
+        </p:nvPicPr>
+        <p:blipFill>
+          <a:blip r:embed="rId3">
+            <a:extLst>
+              <a:ext uri="{96DAC541-7B7A-43D3-8B79-37D633B846F1}">
+                <asvg:svgBlip xmlns:asvg="http://schemas.microsoft.com/office/drawing/2016/SVG/main" r:embed="rId4"/>
+              </a:ext>
+            </a:extLst>
+          </a:blip>
+          <a:stretch>
+            <a:fillRect/>
+          </a:stretch>
+        </p:blipFill>
+        <p:spPr>
+          <a:xfrm>
+            <a:off x="664352" y="4932001"/>
+            <a:ext cx="174433" cy="174433"/>
+          </a:xfrm>
+          <a:prstGeom prst="rect">
+            <a:avLst/>
+          </a:prstGeom>
+        </p:spPr>
+      </p:pic>
+      <p:pic>
+        <p:nvPicPr>
+          <p:cNvPr id="44" name="Graphic 10" descr="Checkmark">
+            <a:extLst>
+              <a:ext uri="{FF2B5EF4-FFF2-40B4-BE49-F238E27FC236}">
+                <a16:creationId xmlns:a16="http://schemas.microsoft.com/office/drawing/2014/main" id="{47774013-CD06-459C-A76C-FA18015E2703}"/>
+              </a:ext>
+            </a:extLst>
+          </p:cNvPr>
+          <p:cNvPicPr>
+            <a:picLocks noChangeAspect="1"/>
+          </p:cNvPicPr>
+          <p:nvPr/>
+        </p:nvPicPr>
+        <p:blipFill>
+          <a:blip r:embed="rId3">
+            <a:extLst>
+              <a:ext uri="{96DAC541-7B7A-43D3-8B79-37D633B846F1}">
+                <asvg:svgBlip xmlns:asvg="http://schemas.microsoft.com/office/drawing/2016/SVG/main" r:embed="rId4"/>
+              </a:ext>
+            </a:extLst>
+          </a:blip>
+          <a:stretch>
+            <a:fillRect/>
+          </a:stretch>
+        </p:blipFill>
+        <p:spPr>
+          <a:xfrm>
+            <a:off x="663762" y="3477462"/>
+            <a:ext cx="174433" cy="174433"/>
+          </a:xfrm>
+          <a:prstGeom prst="rect">
+            <a:avLst/>
+          </a:prstGeom>
+        </p:spPr>
+      </p:pic>
+      <p:pic>
+        <p:nvPicPr>
+          <p:cNvPr id="45" name="Graphic 10" descr="Checkmark">
+            <a:extLst>
+              <a:ext uri="{FF2B5EF4-FFF2-40B4-BE49-F238E27FC236}">
+                <a16:creationId xmlns:a16="http://schemas.microsoft.com/office/drawing/2014/main" id="{71062D5B-1F6B-44C9-A9A6-62FF4E195C7B}"/>
+              </a:ext>
+            </a:extLst>
+          </p:cNvPr>
+          <p:cNvPicPr>
+            <a:picLocks noChangeAspect="1"/>
+          </p:cNvPicPr>
+          <p:nvPr/>
+        </p:nvPicPr>
+        <p:blipFill>
+          <a:blip r:embed="rId3">
+            <a:extLst>
+              <a:ext uri="{96DAC541-7B7A-43D3-8B79-37D633B846F1}">
+                <asvg:svgBlip xmlns:asvg="http://schemas.microsoft.com/office/drawing/2016/SVG/main" r:embed="rId4"/>
+              </a:ext>
+            </a:extLst>
+          </a:blip>
+          <a:stretch>
+            <a:fillRect/>
+          </a:stretch>
+        </p:blipFill>
+        <p:spPr>
+          <a:xfrm>
+            <a:off x="663761" y="5649129"/>
+            <a:ext cx="174433" cy="174433"/>
+          </a:xfrm>
+          <a:prstGeom prst="rect">
+            <a:avLst/>
+          </a:prstGeom>
+        </p:spPr>
+      </p:pic>
+      <p:pic>
+        <p:nvPicPr>
+          <p:cNvPr id="47" name="Graphic 10" descr="Checkmark">
+            <a:extLst>
+              <a:ext uri="{FF2B5EF4-FFF2-40B4-BE49-F238E27FC236}">
+                <a16:creationId xmlns:a16="http://schemas.microsoft.com/office/drawing/2014/main" id="{3B058F97-A11C-4F9A-9EE6-9511B110B198}"/>
+              </a:ext>
+            </a:extLst>
+          </p:cNvPr>
+          <p:cNvPicPr>
+            <a:picLocks noChangeAspect="1"/>
+          </p:cNvPicPr>
+          <p:nvPr/>
+        </p:nvPicPr>
+        <p:blipFill>
+          <a:blip r:embed="rId3">
+            <a:extLst>
+              <a:ext uri="{96DAC541-7B7A-43D3-8B79-37D633B846F1}">
+                <asvg:svgBlip xmlns:asvg="http://schemas.microsoft.com/office/drawing/2016/SVG/main" r:embed="rId4"/>
+              </a:ext>
+            </a:extLst>
+          </a:blip>
+          <a:stretch>
+            <a:fillRect/>
+          </a:stretch>
+        </p:blipFill>
+        <p:spPr>
+          <a:xfrm>
+            <a:off x="664352" y="2981356"/>
+            <a:ext cx="174433" cy="174433"/>
+          </a:xfrm>
+          <a:prstGeom prst="rect">
+            <a:avLst/>
+          </a:prstGeom>
+        </p:spPr>
+      </p:pic>
+      <p:pic>
+        <p:nvPicPr>
+          <p:cNvPr id="48" name="Graphic 10" descr="Checkmark">
+            <a:extLst>
+              <a:ext uri="{FF2B5EF4-FFF2-40B4-BE49-F238E27FC236}">
+                <a16:creationId xmlns:a16="http://schemas.microsoft.com/office/drawing/2014/main" id="{D0E7B24E-7703-4092-AF99-5D8EBDC3AE45}"/>
+              </a:ext>
+            </a:extLst>
+          </p:cNvPr>
+          <p:cNvPicPr>
+            <a:picLocks noChangeAspect="1"/>
+          </p:cNvPicPr>
+          <p:nvPr/>
+        </p:nvPicPr>
+        <p:blipFill>
+          <a:blip r:embed="rId3">
+            <a:extLst>
+              <a:ext uri="{96DAC541-7B7A-43D3-8B79-37D633B846F1}">
+                <asvg:svgBlip xmlns:asvg="http://schemas.microsoft.com/office/drawing/2016/SVG/main" r:embed="rId4"/>
+              </a:ext>
+            </a:extLst>
+          </a:blip>
+          <a:stretch>
+            <a:fillRect/>
+          </a:stretch>
+        </p:blipFill>
+        <p:spPr>
+          <a:xfrm>
+            <a:off x="663760" y="3230211"/>
+            <a:ext cx="174433" cy="174433"/>
+          </a:xfrm>
+          <a:prstGeom prst="rect">
+            <a:avLst/>
+          </a:prstGeom>
+        </p:spPr>
+      </p:pic>
+      <p:pic>
+        <p:nvPicPr>
+          <p:cNvPr id="49" name="Graphic 42" descr="Pause">
+            <a:extLst>
+              <a:ext uri="{FF2B5EF4-FFF2-40B4-BE49-F238E27FC236}">
+                <a16:creationId xmlns:a16="http://schemas.microsoft.com/office/drawing/2014/main" id="{8D035843-1B65-4DE0-8D81-CDAA1C72006B}"/>
+              </a:ext>
+            </a:extLst>
+          </p:cNvPr>
+          <p:cNvPicPr>
+            <a:picLocks noChangeAspect="1"/>
+          </p:cNvPicPr>
+          <p:nvPr/>
+        </p:nvPicPr>
+        <p:blipFill>
+          <a:blip r:embed="rId5">
+            <a:extLst>
+              <a:ext uri="{96DAC541-7B7A-43D3-8B79-37D633B846F1}">
+                <asvg:svgBlip xmlns:asvg="http://schemas.microsoft.com/office/drawing/2016/SVG/main" r:embed="rId6"/>
+              </a:ext>
+            </a:extLst>
+          </a:blip>
+          <a:stretch>
+            <a:fillRect/>
+          </a:stretch>
+        </p:blipFill>
+        <p:spPr>
+          <a:xfrm>
+            <a:off x="664713" y="5914401"/>
+            <a:ext cx="174433" cy="174433"/>
+          </a:xfrm>
+          <a:prstGeom prst="rect">
+            <a:avLst/>
+          </a:prstGeom>
+        </p:spPr>
+      </p:pic>
+      <p:pic>
+        <p:nvPicPr>
+          <p:cNvPr id="50" name="Graphic 10" descr="Checkmark">
+            <a:extLst>
+              <a:ext uri="{FF2B5EF4-FFF2-40B4-BE49-F238E27FC236}">
+                <a16:creationId xmlns:a16="http://schemas.microsoft.com/office/drawing/2014/main" id="{1F528372-5B69-4BF2-A455-166F69DAC559}"/>
+              </a:ext>
+            </a:extLst>
+          </p:cNvPr>
+          <p:cNvPicPr>
+            <a:picLocks noChangeAspect="1"/>
+          </p:cNvPicPr>
+          <p:nvPr/>
+        </p:nvPicPr>
+        <p:blipFill>
+          <a:blip r:embed="rId3">
+            <a:extLst>
+              <a:ext uri="{96DAC541-7B7A-43D3-8B79-37D633B846F1}">
+                <asvg:svgBlip xmlns:asvg="http://schemas.microsoft.com/office/drawing/2016/SVG/main" r:embed="rId4"/>
+              </a:ext>
+            </a:extLst>
+          </a:blip>
+          <a:stretch>
+            <a:fillRect/>
+          </a:stretch>
+        </p:blipFill>
+        <p:spPr>
+          <a:xfrm>
+            <a:off x="664713" y="5428371"/>
+            <a:ext cx="174433" cy="174433"/>
+          </a:xfrm>
+          <a:prstGeom prst="rect">
+            <a:avLst/>
+          </a:prstGeom>
+        </p:spPr>
+      </p:pic>
+      <p:pic>
+        <p:nvPicPr>
+          <p:cNvPr id="51" name="Graphic 42" descr="Pause">
+            <a:extLst>
+              <a:ext uri="{FF2B5EF4-FFF2-40B4-BE49-F238E27FC236}">
+                <a16:creationId xmlns:a16="http://schemas.microsoft.com/office/drawing/2014/main" id="{18D5F6C2-FB62-4939-A3B9-B43914C0EB7B}"/>
+              </a:ext>
+            </a:extLst>
+          </p:cNvPr>
+          <p:cNvPicPr>
+            <a:picLocks noChangeAspect="1"/>
+          </p:cNvPicPr>
+          <p:nvPr/>
+        </p:nvPicPr>
+        <p:blipFill>
+          <a:blip r:embed="rId5">
+            <a:extLst>
+              <a:ext uri="{96DAC541-7B7A-43D3-8B79-37D633B846F1}">
+                <asvg:svgBlip xmlns:asvg="http://schemas.microsoft.com/office/drawing/2016/SVG/main" r:embed="rId6"/>
+              </a:ext>
+            </a:extLst>
+          </a:blip>
+          <a:stretch>
+            <a:fillRect/>
+          </a:stretch>
+        </p:blipFill>
+        <p:spPr>
+          <a:xfrm>
+            <a:off x="664713" y="6175479"/>
+            <a:ext cx="174433" cy="174433"/>
+          </a:xfrm>
+          <a:prstGeom prst="rect">
+            <a:avLst/>
+          </a:prstGeom>
+        </p:spPr>
+      </p:pic>
+      <p:pic>
+        <p:nvPicPr>
+          <p:cNvPr id="52" name="Graphic 16" descr="Close">
+            <a:extLst>
+              <a:ext uri="{FF2B5EF4-FFF2-40B4-BE49-F238E27FC236}">
+                <a16:creationId xmlns:a16="http://schemas.microsoft.com/office/drawing/2014/main" id="{BF6DF1F4-02F3-433C-AEEE-300A4EE66A49}"/>
+              </a:ext>
+            </a:extLst>
+          </p:cNvPr>
+          <p:cNvPicPr>
+            <a:picLocks noChangeAspect="1"/>
+          </p:cNvPicPr>
+          <p:nvPr/>
+        </p:nvPicPr>
+        <p:blipFill>
+          <a:blip r:embed="rId7">
+            <a:extLst>
+              <a:ext uri="{96DAC541-7B7A-43D3-8B79-37D633B846F1}">
+                <asvg:svgBlip xmlns:asvg="http://schemas.microsoft.com/office/drawing/2016/SVG/main" r:embed="rId8"/>
+              </a:ext>
+            </a:extLst>
+          </a:blip>
+          <a:stretch>
+            <a:fillRect/>
+          </a:stretch>
+        </p:blipFill>
+        <p:spPr>
+          <a:xfrm>
+            <a:off x="5630446" y="3016634"/>
+            <a:ext cx="174433" cy="174433"/>
+          </a:xfrm>
+          <a:prstGeom prst="rect">
+            <a:avLst/>
+          </a:prstGeom>
+        </p:spPr>
+      </p:pic>
+      <p:pic>
+        <p:nvPicPr>
+          <p:cNvPr id="53" name="Graphic 42" descr="Pause">
+            <a:extLst>
+              <a:ext uri="{FF2B5EF4-FFF2-40B4-BE49-F238E27FC236}">
+                <a16:creationId xmlns:a16="http://schemas.microsoft.com/office/drawing/2014/main" id="{C8F299D6-3CEC-4134-91B6-230BEE05BF4F}"/>
+              </a:ext>
+            </a:extLst>
+          </p:cNvPr>
+          <p:cNvPicPr>
+            <a:picLocks noChangeAspect="1"/>
+          </p:cNvPicPr>
+          <p:nvPr/>
+        </p:nvPicPr>
+        <p:blipFill>
+          <a:blip r:embed="rId5">
+            <a:extLst>
+              <a:ext uri="{96DAC541-7B7A-43D3-8B79-37D633B846F1}">
+                <asvg:svgBlip xmlns:asvg="http://schemas.microsoft.com/office/drawing/2016/SVG/main" r:embed="rId6"/>
+              </a:ext>
+            </a:extLst>
+          </a:blip>
+          <a:stretch>
+            <a:fillRect/>
+          </a:stretch>
+        </p:blipFill>
+        <p:spPr>
+          <a:xfrm>
+            <a:off x="5624260" y="3234521"/>
+            <a:ext cx="174433" cy="174433"/>
+          </a:xfrm>
+          <a:prstGeom prst="rect">
+            <a:avLst/>
+          </a:prstGeom>
+        </p:spPr>
+      </p:pic>
+      <p:pic>
+        <p:nvPicPr>
+          <p:cNvPr id="54" name="Graphic 42" descr="Pause">
+            <a:extLst>
+              <a:ext uri="{FF2B5EF4-FFF2-40B4-BE49-F238E27FC236}">
+                <a16:creationId xmlns:a16="http://schemas.microsoft.com/office/drawing/2014/main" id="{3AAF4435-E93D-4D34-96C9-3B6166E72736}"/>
+              </a:ext>
+            </a:extLst>
+          </p:cNvPr>
+          <p:cNvPicPr>
+            <a:picLocks noChangeAspect="1"/>
+          </p:cNvPicPr>
+          <p:nvPr/>
+        </p:nvPicPr>
+        <p:blipFill>
+          <a:blip r:embed="rId5">
+            <a:extLst>
+              <a:ext uri="{96DAC541-7B7A-43D3-8B79-37D633B846F1}">
+                <asvg:svgBlip xmlns:asvg="http://schemas.microsoft.com/office/drawing/2016/SVG/main" r:embed="rId6"/>
+              </a:ext>
+            </a:extLst>
+          </a:blip>
+          <a:stretch>
+            <a:fillRect/>
+          </a:stretch>
+        </p:blipFill>
+        <p:spPr>
+          <a:xfrm>
+            <a:off x="5624254" y="3494180"/>
+            <a:ext cx="174433" cy="174433"/>
+          </a:xfrm>
+          <a:prstGeom prst="rect">
+            <a:avLst/>
+          </a:prstGeom>
+        </p:spPr>
+      </p:pic>
+      <p:pic>
+        <p:nvPicPr>
+          <p:cNvPr id="55" name="Graphic 42" descr="Pause">
+            <a:extLst>
+              <a:ext uri="{FF2B5EF4-FFF2-40B4-BE49-F238E27FC236}">
+                <a16:creationId xmlns:a16="http://schemas.microsoft.com/office/drawing/2014/main" id="{A9CF9818-7CE7-4E46-8350-C46AFAB3CA33}"/>
+              </a:ext>
+            </a:extLst>
+          </p:cNvPr>
+          <p:cNvPicPr>
+            <a:picLocks noChangeAspect="1"/>
+          </p:cNvPicPr>
+          <p:nvPr/>
+        </p:nvPicPr>
+        <p:blipFill>
+          <a:blip r:embed="rId5">
+            <a:extLst>
+              <a:ext uri="{96DAC541-7B7A-43D3-8B79-37D633B846F1}">
+                <asvg:svgBlip xmlns:asvg="http://schemas.microsoft.com/office/drawing/2016/SVG/main" r:embed="rId6"/>
+              </a:ext>
+            </a:extLst>
+          </a:blip>
+          <a:stretch>
+            <a:fillRect/>
+          </a:stretch>
+        </p:blipFill>
+        <p:spPr>
+          <a:xfrm>
+            <a:off x="5624253" y="3940570"/>
+            <a:ext cx="174433" cy="174433"/>
+          </a:xfrm>
+          <a:prstGeom prst="rect">
+            <a:avLst/>
+          </a:prstGeom>
+        </p:spPr>
+      </p:pic>
+      <p:pic>
+        <p:nvPicPr>
+          <p:cNvPr id="56" name="Graphic 10" descr="Checkmark">
+            <a:extLst>
+              <a:ext uri="{FF2B5EF4-FFF2-40B4-BE49-F238E27FC236}">
+                <a16:creationId xmlns:a16="http://schemas.microsoft.com/office/drawing/2014/main" id="{B3998E82-DC75-4C94-A28D-A089E5CDD676}"/>
+              </a:ext>
+            </a:extLst>
+          </p:cNvPr>
+          <p:cNvPicPr>
+            <a:picLocks noChangeAspect="1"/>
+          </p:cNvPicPr>
+          <p:nvPr/>
+        </p:nvPicPr>
+        <p:blipFill>
+          <a:blip r:embed="rId3">
+            <a:extLst>
+              <a:ext uri="{96DAC541-7B7A-43D3-8B79-37D633B846F1}">
+                <asvg:svgBlip xmlns:asvg="http://schemas.microsoft.com/office/drawing/2016/SVG/main" r:embed="rId4"/>
+              </a:ext>
+            </a:extLst>
+          </a:blip>
+          <a:stretch>
+            <a:fillRect/>
+          </a:stretch>
+        </p:blipFill>
+        <p:spPr>
+          <a:xfrm>
+            <a:off x="5624260" y="5914400"/>
+            <a:ext cx="174433" cy="174433"/>
+          </a:xfrm>
+          <a:prstGeom prst="rect">
+            <a:avLst/>
+          </a:prstGeom>
+        </p:spPr>
+      </p:pic>
+      <p:pic>
+        <p:nvPicPr>
+          <p:cNvPr id="57" name="Graphic 42" descr="Pause">
+            <a:extLst>
+              <a:ext uri="{FF2B5EF4-FFF2-40B4-BE49-F238E27FC236}">
+                <a16:creationId xmlns:a16="http://schemas.microsoft.com/office/drawing/2014/main" id="{CB11BF40-06AC-4DDF-906E-42585E271739}"/>
+              </a:ext>
+            </a:extLst>
+          </p:cNvPr>
+          <p:cNvPicPr>
+            <a:picLocks noChangeAspect="1"/>
+          </p:cNvPicPr>
+          <p:nvPr/>
+        </p:nvPicPr>
+        <p:blipFill>
+          <a:blip r:embed="rId5">
+            <a:extLst>
+              <a:ext uri="{96DAC541-7B7A-43D3-8B79-37D633B846F1}">
+                <asvg:svgBlip xmlns:asvg="http://schemas.microsoft.com/office/drawing/2016/SVG/main" r:embed="rId6"/>
+              </a:ext>
+            </a:extLst>
+          </a:blip>
+          <a:stretch>
+            <a:fillRect/>
+          </a:stretch>
+        </p:blipFill>
+        <p:spPr>
+          <a:xfrm>
+            <a:off x="5630446" y="4690073"/>
+            <a:ext cx="174433" cy="174433"/>
+          </a:xfrm>
+          <a:prstGeom prst="rect">
+            <a:avLst/>
+          </a:prstGeom>
         </p:spPr>
       </p:pic>
     </p:spTree>

</xml_diff>